<commit_message>
Add slide for team interactions
Create new slide to address issues #11 and #12
</commit_message>
<xml_diff>
--- a/docs/Presentations/Computer Vision Driving Aids Project Overview.pptx
+++ b/docs/Presentations/Computer Vision Driving Aids Project Overview.pptx
@@ -12,6 +12,7 @@
     <p:sldId id="259" r:id="rId6"/>
     <p:sldId id="260" r:id="rId7"/>
     <p:sldId id="262" r:id="rId8"/>
+    <p:sldId id="263" r:id="rId9"/>
   </p:sldIdLst>
   <p:sldSz cx="12192000" cy="6858000"/>
   <p:notesSz cx="6858000" cy="9144000"/>
@@ -116,11 +117,7 @@
 <file path=ppt/commentAuthors.xml><?xml version="1.0" encoding="utf-8"?>
 <p:cmAuthorLst xmlns:a="http://schemas.openxmlformats.org/drawingml/2006/main" xmlns:r="http://schemas.openxmlformats.org/officeDocument/2006/relationships" xmlns:p="http://schemas.openxmlformats.org/presentationml/2006/main">
   <p:cmAuthor id="1" name="Keith Roseberry" initials="KR" lastIdx="1" clrIdx="0">
-    <p:extLst>
-      <p:ext uri="{19B8F6BF-5375-455C-9EA6-DF929625EA0E}">
-        <p15:presenceInfo xmlns:p15="http://schemas.microsoft.com/office/powerpoint/2012/main" userId="341da7140644f0b4" providerId="Windows Live"/>
-      </p:ext>
-    </p:extLst>
+    <p:extLst/>
   </p:cmAuthor>
 </p:cmAuthorLst>
 </file>
@@ -188,8 +185,8 @@
           </a:prstGeom>
           <a:noFill/>
           <a:extLst>
-            <a:ext uri="{909E8E84-426E-40dd-AFC4-6F175D3DCCD1}">
-              <a14:hiddenFill xmlns:a14="http://schemas.microsoft.com/office/drawing/2010/main" xmlns="">
+            <a:ext uri="{909E8E84-426E-40DD-AFC4-6F175D3DCCD1}">
+              <a14:hiddenFill xmlns:a14="http://schemas.microsoft.com/office/drawing/2010/main">
                 <a:solidFill>
                   <a:srgbClr val="FFFFFF"/>
                 </a:solidFill>
@@ -248,8 +245,8 @@
               <a:noFill/>
             </a:ln>
             <a:extLst>
-              <a:ext uri="{91240B29-F687-4f45-9708-019B960494DF}">
-                <a14:hiddenLine xmlns:a14="http://schemas.microsoft.com/office/drawing/2010/main" xmlns="" w="9525">
+              <a:ext uri="{91240B29-F687-4F45-9708-019B960494DF}">
+                <a14:hiddenLine xmlns:a14="http://schemas.microsoft.com/office/drawing/2010/main" w="9525">
                   <a:solidFill>
                     <a:srgbClr val="000000"/>
                   </a:solidFill>
@@ -338,8 +335,8 @@
               <a:noFill/>
             </a:ln>
             <a:extLst>
-              <a:ext uri="{91240B29-F687-4f45-9708-019B960494DF}">
-                <a14:hiddenLine xmlns:a14="http://schemas.microsoft.com/office/drawing/2010/main" xmlns="" w="9525">
+              <a:ext uri="{91240B29-F687-4F45-9708-019B960494DF}">
+                <a14:hiddenLine xmlns:a14="http://schemas.microsoft.com/office/drawing/2010/main" w="9525">
                   <a:solidFill>
                     <a:srgbClr val="000000"/>
                   </a:solidFill>
@@ -428,8 +425,8 @@
               <a:noFill/>
             </a:ln>
             <a:extLst>
-              <a:ext uri="{91240B29-F687-4f45-9708-019B960494DF}">
-                <a14:hiddenLine xmlns:a14="http://schemas.microsoft.com/office/drawing/2010/main" xmlns="" w="9525">
+              <a:ext uri="{91240B29-F687-4F45-9708-019B960494DF}">
+                <a14:hiddenLine xmlns:a14="http://schemas.microsoft.com/office/drawing/2010/main" w="9525">
                   <a:solidFill>
                     <a:srgbClr val="000000"/>
                   </a:solidFill>
@@ -462,8 +459,8 @@
               <a:noFill/>
             </a:ln>
             <a:extLst>
-              <a:ext uri="{91240B29-F687-4f45-9708-019B960494DF}">
-                <a14:hiddenLine xmlns:a14="http://schemas.microsoft.com/office/drawing/2010/main" xmlns="" w="9525">
+              <a:ext uri="{91240B29-F687-4F45-9708-019B960494DF}">
+                <a14:hiddenLine xmlns:a14="http://schemas.microsoft.com/office/drawing/2010/main" w="9525">
                   <a:solidFill>
                     <a:srgbClr val="000000"/>
                   </a:solidFill>
@@ -552,8 +549,8 @@
               <a:noFill/>
             </a:ln>
             <a:extLst>
-              <a:ext uri="{91240B29-F687-4f45-9708-019B960494DF}">
-                <a14:hiddenLine xmlns:a14="http://schemas.microsoft.com/office/drawing/2010/main" xmlns="" w="9525">
+              <a:ext uri="{91240B29-F687-4F45-9708-019B960494DF}">
+                <a14:hiddenLine xmlns:a14="http://schemas.microsoft.com/office/drawing/2010/main" w="9525">
                   <a:solidFill>
                     <a:srgbClr val="000000"/>
                   </a:solidFill>
@@ -614,8 +611,8 @@
               <a:noFill/>
             </a:ln>
             <a:extLst>
-              <a:ext uri="{91240B29-F687-4f45-9708-019B960494DF}">
-                <a14:hiddenLine xmlns:a14="http://schemas.microsoft.com/office/drawing/2010/main" xmlns="" w="9525">
+              <a:ext uri="{91240B29-F687-4F45-9708-019B960494DF}">
+                <a14:hiddenLine xmlns:a14="http://schemas.microsoft.com/office/drawing/2010/main" w="9525">
                   <a:solidFill>
                     <a:srgbClr val="000000"/>
                   </a:solidFill>
@@ -676,8 +673,8 @@
               <a:noFill/>
             </a:ln>
             <a:extLst>
-              <a:ext uri="{91240B29-F687-4f45-9708-019B960494DF}">
-                <a14:hiddenLine xmlns:a14="http://schemas.microsoft.com/office/drawing/2010/main" xmlns="" w="9525">
+              <a:ext uri="{91240B29-F687-4F45-9708-019B960494DF}">
+                <a14:hiddenLine xmlns:a14="http://schemas.microsoft.com/office/drawing/2010/main" w="9525">
                   <a:solidFill>
                     <a:srgbClr val="000000"/>
                   </a:solidFill>
@@ -766,8 +763,8 @@
               <a:noFill/>
             </a:ln>
             <a:extLst>
-              <a:ext uri="{91240B29-F687-4f45-9708-019B960494DF}">
-                <a14:hiddenLine xmlns:a14="http://schemas.microsoft.com/office/drawing/2010/main" xmlns="" w="9525">
+              <a:ext uri="{91240B29-F687-4F45-9708-019B960494DF}">
+                <a14:hiddenLine xmlns:a14="http://schemas.microsoft.com/office/drawing/2010/main" w="9525">
                   <a:solidFill>
                     <a:srgbClr val="000000"/>
                   </a:solidFill>
@@ -828,8 +825,8 @@
               <a:noFill/>
             </a:ln>
             <a:extLst>
-              <a:ext uri="{91240B29-F687-4f45-9708-019B960494DF}">
-                <a14:hiddenLine xmlns:a14="http://schemas.microsoft.com/office/drawing/2010/main" xmlns="" w="9525">
+              <a:ext uri="{91240B29-F687-4F45-9708-019B960494DF}">
+                <a14:hiddenLine xmlns:a14="http://schemas.microsoft.com/office/drawing/2010/main" w="9525">
                   <a:solidFill>
                     <a:srgbClr val="000000"/>
                   </a:solidFill>
@@ -890,8 +887,8 @@
               <a:noFill/>
             </a:ln>
             <a:extLst>
-              <a:ext uri="{91240B29-F687-4f45-9708-019B960494DF}">
-                <a14:hiddenLine xmlns:a14="http://schemas.microsoft.com/office/drawing/2010/main" xmlns="" w="9525">
+              <a:ext uri="{91240B29-F687-4F45-9708-019B960494DF}">
+                <a14:hiddenLine xmlns:a14="http://schemas.microsoft.com/office/drawing/2010/main" w="9525">
                   <a:solidFill>
                     <a:srgbClr val="000000"/>
                   </a:solidFill>
@@ -980,8 +977,8 @@
               <a:noFill/>
             </a:ln>
             <a:extLst>
-              <a:ext uri="{91240B29-F687-4f45-9708-019B960494DF}">
-                <a14:hiddenLine xmlns:a14="http://schemas.microsoft.com/office/drawing/2010/main" xmlns="" w="9525">
+              <a:ext uri="{91240B29-F687-4F45-9708-019B960494DF}">
+                <a14:hiddenLine xmlns:a14="http://schemas.microsoft.com/office/drawing/2010/main" w="9525">
                   <a:solidFill>
                     <a:srgbClr val="000000"/>
                   </a:solidFill>
@@ -1070,8 +1067,8 @@
               <a:noFill/>
             </a:ln>
             <a:extLst>
-              <a:ext uri="{91240B29-F687-4f45-9708-019B960494DF}">
-                <a14:hiddenLine xmlns:a14="http://schemas.microsoft.com/office/drawing/2010/main" xmlns="" w="9525">
+              <a:ext uri="{91240B29-F687-4F45-9708-019B960494DF}">
+                <a14:hiddenLine xmlns:a14="http://schemas.microsoft.com/office/drawing/2010/main" w="9525">
                   <a:solidFill>
                     <a:srgbClr val="000000"/>
                   </a:solidFill>
@@ -1132,8 +1129,8 @@
               <a:noFill/>
             </a:ln>
             <a:extLst>
-              <a:ext uri="{91240B29-F687-4f45-9708-019B960494DF}">
-                <a14:hiddenLine xmlns:a14="http://schemas.microsoft.com/office/drawing/2010/main" xmlns="" w="9525">
+              <a:ext uri="{91240B29-F687-4F45-9708-019B960494DF}">
+                <a14:hiddenLine xmlns:a14="http://schemas.microsoft.com/office/drawing/2010/main" w="9525">
                   <a:solidFill>
                     <a:srgbClr val="000000"/>
                   </a:solidFill>
@@ -1242,8 +1239,8 @@
               <a:noFill/>
             </a:ln>
             <a:extLst>
-              <a:ext uri="{91240B29-F687-4f45-9708-019B960494DF}">
-                <a14:hiddenLine xmlns:a14="http://schemas.microsoft.com/office/drawing/2010/main" xmlns="" w="9525">
+              <a:ext uri="{91240B29-F687-4F45-9708-019B960494DF}">
+                <a14:hiddenLine xmlns:a14="http://schemas.microsoft.com/office/drawing/2010/main" w="9525">
                   <a:solidFill>
                     <a:srgbClr val="000000"/>
                   </a:solidFill>
@@ -1304,8 +1301,8 @@
               <a:noFill/>
             </a:ln>
             <a:extLst>
-              <a:ext uri="{91240B29-F687-4f45-9708-019B960494DF}">
-                <a14:hiddenLine xmlns:a14="http://schemas.microsoft.com/office/drawing/2010/main" xmlns="" w="9525">
+              <a:ext uri="{91240B29-F687-4F45-9708-019B960494DF}">
+                <a14:hiddenLine xmlns:a14="http://schemas.microsoft.com/office/drawing/2010/main" w="9525">
                   <a:solidFill>
                     <a:srgbClr val="000000"/>
                   </a:solidFill>
@@ -1394,8 +1391,8 @@
               <a:noFill/>
             </a:ln>
             <a:extLst>
-              <a:ext uri="{91240B29-F687-4f45-9708-019B960494DF}">
-                <a14:hiddenLine xmlns:a14="http://schemas.microsoft.com/office/drawing/2010/main" xmlns="" w="9525">
+              <a:ext uri="{91240B29-F687-4F45-9708-019B960494DF}">
+                <a14:hiddenLine xmlns:a14="http://schemas.microsoft.com/office/drawing/2010/main" w="9525">
                   <a:solidFill>
                     <a:srgbClr val="000000"/>
                   </a:solidFill>
@@ -1484,8 +1481,8 @@
               <a:noFill/>
             </a:ln>
             <a:extLst>
-              <a:ext uri="{91240B29-F687-4f45-9708-019B960494DF}">
-                <a14:hiddenLine xmlns:a14="http://schemas.microsoft.com/office/drawing/2010/main" xmlns="" w="9525">
+              <a:ext uri="{91240B29-F687-4F45-9708-019B960494DF}">
+                <a14:hiddenLine xmlns:a14="http://schemas.microsoft.com/office/drawing/2010/main" w="9525">
                   <a:solidFill>
                     <a:srgbClr val="000000"/>
                   </a:solidFill>
@@ -1546,8 +1543,8 @@
               <a:noFill/>
             </a:ln>
             <a:extLst>
-              <a:ext uri="{91240B29-F687-4f45-9708-019B960494DF}">
-                <a14:hiddenLine xmlns:a14="http://schemas.microsoft.com/office/drawing/2010/main" xmlns="" w="9525">
+              <a:ext uri="{91240B29-F687-4F45-9708-019B960494DF}">
+                <a14:hiddenLine xmlns:a14="http://schemas.microsoft.com/office/drawing/2010/main" w="9525">
                   <a:solidFill>
                     <a:srgbClr val="000000"/>
                   </a:solidFill>
@@ -1636,8 +1633,8 @@
               <a:noFill/>
             </a:ln>
             <a:extLst>
-              <a:ext uri="{91240B29-F687-4f45-9708-019B960494DF}">
-                <a14:hiddenLine xmlns:a14="http://schemas.microsoft.com/office/drawing/2010/main" xmlns="" w="9525">
+              <a:ext uri="{91240B29-F687-4F45-9708-019B960494DF}">
+                <a14:hiddenLine xmlns:a14="http://schemas.microsoft.com/office/drawing/2010/main" w="9525">
                   <a:solidFill>
                     <a:srgbClr val="000000"/>
                   </a:solidFill>
@@ -1726,8 +1723,8 @@
               <a:noFill/>
             </a:ln>
             <a:extLst>
-              <a:ext uri="{91240B29-F687-4f45-9708-019B960494DF}">
-                <a14:hiddenLine xmlns:a14="http://schemas.microsoft.com/office/drawing/2010/main" xmlns="" w="9525">
+              <a:ext uri="{91240B29-F687-4F45-9708-019B960494DF}">
+                <a14:hiddenLine xmlns:a14="http://schemas.microsoft.com/office/drawing/2010/main" w="9525">
                   <a:solidFill>
                     <a:srgbClr val="000000"/>
                   </a:solidFill>
@@ -1782,8 +1779,8 @@
               <a:noFill/>
             </a:ln>
             <a:extLst>
-              <a:ext uri="{91240B29-F687-4f45-9708-019B960494DF}">
-                <a14:hiddenLine xmlns:a14="http://schemas.microsoft.com/office/drawing/2010/main" xmlns="" w="9525">
+              <a:ext uri="{91240B29-F687-4F45-9708-019B960494DF}">
+                <a14:hiddenLine xmlns:a14="http://schemas.microsoft.com/office/drawing/2010/main" w="9525">
                   <a:solidFill>
                     <a:srgbClr val="000000"/>
                   </a:solidFill>
@@ -1872,8 +1869,8 @@
               <a:noFill/>
             </a:ln>
             <a:extLst>
-              <a:ext uri="{91240B29-F687-4f45-9708-019B960494DF}">
-                <a14:hiddenLine xmlns:a14="http://schemas.microsoft.com/office/drawing/2010/main" xmlns="" w="9525">
+              <a:ext uri="{91240B29-F687-4F45-9708-019B960494DF}">
+                <a14:hiddenLine xmlns:a14="http://schemas.microsoft.com/office/drawing/2010/main" w="9525">
                   <a:solidFill>
                     <a:srgbClr val="000000"/>
                   </a:solidFill>
@@ -1928,8 +1925,8 @@
               <a:noFill/>
             </a:ln>
             <a:extLst>
-              <a:ext uri="{91240B29-F687-4f45-9708-019B960494DF}">
-                <a14:hiddenLine xmlns:a14="http://schemas.microsoft.com/office/drawing/2010/main" xmlns="" w="9525">
+              <a:ext uri="{91240B29-F687-4F45-9708-019B960494DF}">
+                <a14:hiddenLine xmlns:a14="http://schemas.microsoft.com/office/drawing/2010/main" w="9525">
                   <a:solidFill>
                     <a:srgbClr val="000000"/>
                   </a:solidFill>
@@ -2018,8 +2015,8 @@
               <a:noFill/>
             </a:ln>
             <a:extLst>
-              <a:ext uri="{91240B29-F687-4f45-9708-019B960494DF}">
-                <a14:hiddenLine xmlns:a14="http://schemas.microsoft.com/office/drawing/2010/main" xmlns="" w="9525">
+              <a:ext uri="{91240B29-F687-4F45-9708-019B960494DF}">
+                <a14:hiddenLine xmlns:a14="http://schemas.microsoft.com/office/drawing/2010/main" w="9525">
                   <a:solidFill>
                     <a:srgbClr val="000000"/>
                   </a:solidFill>
@@ -2086,8 +2083,8 @@
               <a:noFill/>
             </a:ln>
             <a:extLst>
-              <a:ext uri="{91240B29-F687-4f45-9708-019B960494DF}">
-                <a14:hiddenLine xmlns:a14="http://schemas.microsoft.com/office/drawing/2010/main" xmlns="" w="9525">
+              <a:ext uri="{91240B29-F687-4F45-9708-019B960494DF}">
+                <a14:hiddenLine xmlns:a14="http://schemas.microsoft.com/office/drawing/2010/main" w="9525">
                   <a:solidFill>
                     <a:srgbClr val="000000"/>
                   </a:solidFill>
@@ -2176,8 +2173,8 @@
               <a:noFill/>
             </a:ln>
             <a:extLst>
-              <a:ext uri="{91240B29-F687-4f45-9708-019B960494DF}">
-                <a14:hiddenLine xmlns:a14="http://schemas.microsoft.com/office/drawing/2010/main" xmlns="" w="9525">
+              <a:ext uri="{91240B29-F687-4F45-9708-019B960494DF}">
+                <a14:hiddenLine xmlns:a14="http://schemas.microsoft.com/office/drawing/2010/main" w="9525">
                   <a:solidFill>
                     <a:srgbClr val="000000"/>
                   </a:solidFill>
@@ -2244,8 +2241,8 @@
               <a:noFill/>
             </a:ln>
             <a:extLst>
-              <a:ext uri="{91240B29-F687-4f45-9708-019B960494DF}">
-                <a14:hiddenLine xmlns:a14="http://schemas.microsoft.com/office/drawing/2010/main" xmlns="" w="9525">
+              <a:ext uri="{91240B29-F687-4F45-9708-019B960494DF}">
+                <a14:hiddenLine xmlns:a14="http://schemas.microsoft.com/office/drawing/2010/main" w="9525">
                   <a:solidFill>
                     <a:srgbClr val="000000"/>
                   </a:solidFill>
@@ -2334,8 +2331,8 @@
               <a:noFill/>
             </a:ln>
             <a:extLst>
-              <a:ext uri="{91240B29-F687-4f45-9708-019B960494DF}">
-                <a14:hiddenLine xmlns:a14="http://schemas.microsoft.com/office/drawing/2010/main" xmlns="" w="9525">
+              <a:ext uri="{91240B29-F687-4F45-9708-019B960494DF}">
+                <a14:hiddenLine xmlns:a14="http://schemas.microsoft.com/office/drawing/2010/main" w="9525">
                   <a:solidFill>
                     <a:srgbClr val="000000"/>
                   </a:solidFill>
@@ -2368,8 +2365,8 @@
               <a:noFill/>
             </a:ln>
             <a:extLst>
-              <a:ext uri="{91240B29-F687-4f45-9708-019B960494DF}">
-                <a14:hiddenLine xmlns:a14="http://schemas.microsoft.com/office/drawing/2010/main" xmlns="" w="9525">
+              <a:ext uri="{91240B29-F687-4F45-9708-019B960494DF}">
+                <a14:hiddenLine xmlns:a14="http://schemas.microsoft.com/office/drawing/2010/main" w="9525">
                   <a:solidFill>
                     <a:srgbClr val="000000"/>
                   </a:solidFill>
@@ -2458,8 +2455,8 @@
               <a:noFill/>
             </a:ln>
             <a:extLst>
-              <a:ext uri="{91240B29-F687-4f45-9708-019B960494DF}">
-                <a14:hiddenLine xmlns:a14="http://schemas.microsoft.com/office/drawing/2010/main" xmlns="" w="9525">
+              <a:ext uri="{91240B29-F687-4F45-9708-019B960494DF}">
+                <a14:hiddenLine xmlns:a14="http://schemas.microsoft.com/office/drawing/2010/main" w="9525">
                   <a:solidFill>
                     <a:srgbClr val="000000"/>
                   </a:solidFill>
@@ -2520,8 +2517,8 @@
               <a:noFill/>
             </a:ln>
             <a:extLst>
-              <a:ext uri="{91240B29-F687-4f45-9708-019B960494DF}">
-                <a14:hiddenLine xmlns:a14="http://schemas.microsoft.com/office/drawing/2010/main" xmlns="" w="9525">
+              <a:ext uri="{91240B29-F687-4F45-9708-019B960494DF}">
+                <a14:hiddenLine xmlns:a14="http://schemas.microsoft.com/office/drawing/2010/main" w="9525">
                   <a:solidFill>
                     <a:srgbClr val="000000"/>
                   </a:solidFill>
@@ -2582,8 +2579,8 @@
               <a:noFill/>
             </a:ln>
             <a:extLst>
-              <a:ext uri="{91240B29-F687-4f45-9708-019B960494DF}">
-                <a14:hiddenLine xmlns:a14="http://schemas.microsoft.com/office/drawing/2010/main" xmlns="" w="9525">
+              <a:ext uri="{91240B29-F687-4F45-9708-019B960494DF}">
+                <a14:hiddenLine xmlns:a14="http://schemas.microsoft.com/office/drawing/2010/main" w="9525">
                   <a:solidFill>
                     <a:srgbClr val="000000"/>
                   </a:solidFill>
@@ -2672,8 +2669,8 @@
               <a:noFill/>
             </a:ln>
             <a:extLst>
-              <a:ext uri="{91240B29-F687-4f45-9708-019B960494DF}">
-                <a14:hiddenLine xmlns:a14="http://schemas.microsoft.com/office/drawing/2010/main" xmlns="" w="9525">
+              <a:ext uri="{91240B29-F687-4F45-9708-019B960494DF}">
+                <a14:hiddenLine xmlns:a14="http://schemas.microsoft.com/office/drawing/2010/main" w="9525">
                   <a:solidFill>
                     <a:srgbClr val="000000"/>
                   </a:solidFill>
@@ -2740,8 +2737,8 @@
               <a:noFill/>
             </a:ln>
             <a:extLst>
-              <a:ext uri="{91240B29-F687-4f45-9708-019B960494DF}">
-                <a14:hiddenLine xmlns:a14="http://schemas.microsoft.com/office/drawing/2010/main" xmlns="" w="9525">
+              <a:ext uri="{91240B29-F687-4F45-9708-019B960494DF}">
+                <a14:hiddenLine xmlns:a14="http://schemas.microsoft.com/office/drawing/2010/main" w="9525">
                   <a:solidFill>
                     <a:srgbClr val="000000"/>
                   </a:solidFill>
@@ -2802,8 +2799,8 @@
               <a:noFill/>
             </a:ln>
             <a:extLst>
-              <a:ext uri="{91240B29-F687-4f45-9708-019B960494DF}">
-                <a14:hiddenLine xmlns:a14="http://schemas.microsoft.com/office/drawing/2010/main" xmlns="" w="9525">
+              <a:ext uri="{91240B29-F687-4F45-9708-019B960494DF}">
+                <a14:hiddenLine xmlns:a14="http://schemas.microsoft.com/office/drawing/2010/main" w="9525">
                   <a:solidFill>
                     <a:srgbClr val="000000"/>
                   </a:solidFill>
@@ -2892,8 +2889,8 @@
               <a:noFill/>
             </a:ln>
             <a:extLst>
-              <a:ext uri="{91240B29-F687-4f45-9708-019B960494DF}">
-                <a14:hiddenLine xmlns:a14="http://schemas.microsoft.com/office/drawing/2010/main" xmlns="" w="9525">
+              <a:ext uri="{91240B29-F687-4F45-9708-019B960494DF}">
+                <a14:hiddenLine xmlns:a14="http://schemas.microsoft.com/office/drawing/2010/main" w="9525">
                   <a:solidFill>
                     <a:srgbClr val="000000"/>
                   </a:solidFill>
@@ -2954,8 +2951,8 @@
               <a:noFill/>
             </a:ln>
             <a:extLst>
-              <a:ext uri="{91240B29-F687-4f45-9708-019B960494DF}">
-                <a14:hiddenLine xmlns:a14="http://schemas.microsoft.com/office/drawing/2010/main" xmlns="" w="9525">
+              <a:ext uri="{91240B29-F687-4F45-9708-019B960494DF}">
+                <a14:hiddenLine xmlns:a14="http://schemas.microsoft.com/office/drawing/2010/main" w="9525">
                   <a:solidFill>
                     <a:srgbClr val="000000"/>
                   </a:solidFill>
@@ -3044,8 +3041,8 @@
               <a:noFill/>
             </a:ln>
             <a:extLst>
-              <a:ext uri="{91240B29-F687-4f45-9708-019B960494DF}">
-                <a14:hiddenLine xmlns:a14="http://schemas.microsoft.com/office/drawing/2010/main" xmlns="" w="9525">
+              <a:ext uri="{91240B29-F687-4F45-9708-019B960494DF}">
+                <a14:hiddenLine xmlns:a14="http://schemas.microsoft.com/office/drawing/2010/main" w="9525">
                   <a:solidFill>
                     <a:srgbClr val="000000"/>
                   </a:solidFill>
@@ -3106,8 +3103,8 @@
               <a:noFill/>
             </a:ln>
             <a:extLst>
-              <a:ext uri="{91240B29-F687-4f45-9708-019B960494DF}">
-                <a14:hiddenLine xmlns:a14="http://schemas.microsoft.com/office/drawing/2010/main" xmlns="" w="9525">
+              <a:ext uri="{91240B29-F687-4F45-9708-019B960494DF}">
+                <a14:hiddenLine xmlns:a14="http://schemas.microsoft.com/office/drawing/2010/main" w="9525">
                   <a:solidFill>
                     <a:srgbClr val="000000"/>
                   </a:solidFill>
@@ -3196,8 +3193,8 @@
               <a:noFill/>
             </a:ln>
             <a:extLst>
-              <a:ext uri="{91240B29-F687-4f45-9708-019B960494DF}">
-                <a14:hiddenLine xmlns:a14="http://schemas.microsoft.com/office/drawing/2010/main" xmlns="" w="9525">
+              <a:ext uri="{91240B29-F687-4F45-9708-019B960494DF}">
+                <a14:hiddenLine xmlns:a14="http://schemas.microsoft.com/office/drawing/2010/main" w="9525">
                   <a:solidFill>
                     <a:srgbClr val="000000"/>
                   </a:solidFill>
@@ -3230,8 +3227,8 @@
               <a:noFill/>
             </a:ln>
             <a:extLst>
-              <a:ext uri="{91240B29-F687-4f45-9708-019B960494DF}">
-                <a14:hiddenLine xmlns:a14="http://schemas.microsoft.com/office/drawing/2010/main" xmlns="" w="9525">
+              <a:ext uri="{91240B29-F687-4F45-9708-019B960494DF}">
+                <a14:hiddenLine xmlns:a14="http://schemas.microsoft.com/office/drawing/2010/main" w="9525">
                   <a:solidFill>
                     <a:srgbClr val="000000"/>
                   </a:solidFill>
@@ -3295,8 +3292,8 @@
               <a:noFill/>
             </a:ln>
             <a:extLst>
-              <a:ext uri="{91240B29-F687-4f45-9708-019B960494DF}">
-                <a14:hiddenLine xmlns:a14="http://schemas.microsoft.com/office/drawing/2010/main" xmlns="" w="9525">
+              <a:ext uri="{91240B29-F687-4F45-9708-019B960494DF}">
+                <a14:hiddenLine xmlns:a14="http://schemas.microsoft.com/office/drawing/2010/main" w="9525">
                   <a:solidFill>
                     <a:srgbClr val="000000"/>
                   </a:solidFill>
@@ -3385,8 +3382,8 @@
               <a:noFill/>
             </a:ln>
             <a:extLst>
-              <a:ext uri="{91240B29-F687-4f45-9708-019B960494DF}">
-                <a14:hiddenLine xmlns:a14="http://schemas.microsoft.com/office/drawing/2010/main" xmlns="" w="9525">
+              <a:ext uri="{91240B29-F687-4F45-9708-019B960494DF}">
+                <a14:hiddenLine xmlns:a14="http://schemas.microsoft.com/office/drawing/2010/main" w="9525">
                   <a:solidFill>
                     <a:srgbClr val="000000"/>
                   </a:solidFill>
@@ -3447,8 +3444,8 @@
               <a:noFill/>
             </a:ln>
             <a:extLst>
-              <a:ext uri="{91240B29-F687-4f45-9708-019B960494DF}">
-                <a14:hiddenLine xmlns:a14="http://schemas.microsoft.com/office/drawing/2010/main" xmlns="" w="9525">
+              <a:ext uri="{91240B29-F687-4F45-9708-019B960494DF}">
+                <a14:hiddenLine xmlns:a14="http://schemas.microsoft.com/office/drawing/2010/main" w="9525">
                   <a:solidFill>
                     <a:srgbClr val="000000"/>
                   </a:solidFill>
@@ -3537,8 +3534,8 @@
               <a:noFill/>
             </a:ln>
             <a:extLst>
-              <a:ext uri="{91240B29-F687-4f45-9708-019B960494DF}">
-                <a14:hiddenLine xmlns:a14="http://schemas.microsoft.com/office/drawing/2010/main" xmlns="" w="9525">
+              <a:ext uri="{91240B29-F687-4F45-9708-019B960494DF}">
+                <a14:hiddenLine xmlns:a14="http://schemas.microsoft.com/office/drawing/2010/main" w="9525">
                   <a:solidFill>
                     <a:srgbClr val="000000"/>
                   </a:solidFill>
@@ -3627,8 +3624,8 @@
               <a:noFill/>
             </a:ln>
             <a:extLst>
-              <a:ext uri="{91240B29-F687-4f45-9708-019B960494DF}">
-                <a14:hiddenLine xmlns:a14="http://schemas.microsoft.com/office/drawing/2010/main" xmlns="" w="9525">
+              <a:ext uri="{91240B29-F687-4F45-9708-019B960494DF}">
+                <a14:hiddenLine xmlns:a14="http://schemas.microsoft.com/office/drawing/2010/main" w="9525">
                   <a:solidFill>
                     <a:srgbClr val="000000"/>
                   </a:solidFill>
@@ -3692,8 +3689,8 @@
               <a:noFill/>
             </a:ln>
             <a:extLst>
-              <a:ext uri="{91240B29-F687-4f45-9708-019B960494DF}">
-                <a14:hiddenLine xmlns:a14="http://schemas.microsoft.com/office/drawing/2010/main" xmlns="" w="9525">
+              <a:ext uri="{91240B29-F687-4F45-9708-019B960494DF}">
+                <a14:hiddenLine xmlns:a14="http://schemas.microsoft.com/office/drawing/2010/main" w="9525">
                   <a:solidFill>
                     <a:srgbClr val="000000"/>
                   </a:solidFill>
@@ -3754,8 +3751,8 @@
               <a:noFill/>
             </a:ln>
             <a:extLst>
-              <a:ext uri="{91240B29-F687-4f45-9708-019B960494DF}">
-                <a14:hiddenLine xmlns:a14="http://schemas.microsoft.com/office/drawing/2010/main" xmlns="" w="9525">
+              <a:ext uri="{91240B29-F687-4F45-9708-019B960494DF}">
+                <a14:hiddenLine xmlns:a14="http://schemas.microsoft.com/office/drawing/2010/main" w="9525">
                   <a:solidFill>
                     <a:srgbClr val="000000"/>
                   </a:solidFill>
@@ -3844,8 +3841,8 @@
               <a:noFill/>
             </a:ln>
             <a:extLst>
-              <a:ext uri="{91240B29-F687-4f45-9708-019B960494DF}">
-                <a14:hiddenLine xmlns:a14="http://schemas.microsoft.com/office/drawing/2010/main" xmlns="" w="9525">
+              <a:ext uri="{91240B29-F687-4F45-9708-019B960494DF}">
+                <a14:hiddenLine xmlns:a14="http://schemas.microsoft.com/office/drawing/2010/main" w="9525">
                   <a:solidFill>
                     <a:srgbClr val="000000"/>
                   </a:solidFill>
@@ -3934,8 +3931,8 @@
               <a:noFill/>
             </a:ln>
             <a:extLst>
-              <a:ext uri="{91240B29-F687-4f45-9708-019B960494DF}">
-                <a14:hiddenLine xmlns:a14="http://schemas.microsoft.com/office/drawing/2010/main" xmlns="" w="9525">
+              <a:ext uri="{91240B29-F687-4F45-9708-019B960494DF}">
+                <a14:hiddenLine xmlns:a14="http://schemas.microsoft.com/office/drawing/2010/main" w="9525">
                   <a:solidFill>
                     <a:srgbClr val="000000"/>
                   </a:solidFill>
@@ -3996,8 +3993,8 @@
               <a:noFill/>
             </a:ln>
             <a:extLst>
-              <a:ext uri="{91240B29-F687-4f45-9708-019B960494DF}">
-                <a14:hiddenLine xmlns:a14="http://schemas.microsoft.com/office/drawing/2010/main" xmlns="" w="9525">
+              <a:ext uri="{91240B29-F687-4F45-9708-019B960494DF}">
+                <a14:hiddenLine xmlns:a14="http://schemas.microsoft.com/office/drawing/2010/main" w="9525">
                   <a:solidFill>
                     <a:srgbClr val="000000"/>
                   </a:solidFill>
@@ -4116,8 +4113,8 @@
               <a:noFill/>
             </a:ln>
             <a:extLst>
-              <a:ext uri="{91240B29-F687-4f45-9708-019B960494DF}">
-                <a14:hiddenLine xmlns:a14="http://schemas.microsoft.com/office/drawing/2010/main" xmlns="" w="9525">
+              <a:ext uri="{91240B29-F687-4F45-9708-019B960494DF}">
+                <a14:hiddenLine xmlns:a14="http://schemas.microsoft.com/office/drawing/2010/main" w="9525">
                   <a:solidFill>
                     <a:srgbClr val="000000"/>
                   </a:solidFill>
@@ -4184,8 +4181,8 @@
               <a:noFill/>
             </a:ln>
             <a:extLst>
-              <a:ext uri="{91240B29-F687-4f45-9708-019B960494DF}">
-                <a14:hiddenLine xmlns:a14="http://schemas.microsoft.com/office/drawing/2010/main" xmlns="" w="9525">
+              <a:ext uri="{91240B29-F687-4F45-9708-019B960494DF}">
+                <a14:hiddenLine xmlns:a14="http://schemas.microsoft.com/office/drawing/2010/main" w="9525">
                   <a:solidFill>
                     <a:srgbClr val="000000"/>
                   </a:solidFill>
@@ -4274,8 +4271,8 @@
               <a:noFill/>
             </a:ln>
             <a:extLst>
-              <a:ext uri="{91240B29-F687-4f45-9708-019B960494DF}">
-                <a14:hiddenLine xmlns:a14="http://schemas.microsoft.com/office/drawing/2010/main" xmlns="" w="9525">
+              <a:ext uri="{91240B29-F687-4F45-9708-019B960494DF}">
+                <a14:hiddenLine xmlns:a14="http://schemas.microsoft.com/office/drawing/2010/main" w="9525">
                   <a:solidFill>
                     <a:srgbClr val="000000"/>
                   </a:solidFill>
@@ -4415,7 +4412,7 @@
           <a:p>
             <a:fld id="{48A87A34-81AB-432B-8DAE-1953F412C126}" type="datetimeFigureOut">
               <a:rPr lang="en-US" dirty="0"/>
-              <a:t>8/29/2018</a:t>
+              <a:t>8/31/2018</a:t>
             </a:fld>
             <a:endParaRPr lang="en-US" dirty="0"/>
           </a:p>
@@ -4677,7 +4674,7 @@
           <a:p>
             <a:fld id="{48A87A34-81AB-432B-8DAE-1953F412C126}" type="datetimeFigureOut">
               <a:rPr lang="en-US" dirty="0"/>
-              <a:t>8/29/2018</a:t>
+              <a:t>8/31/2018</a:t>
             </a:fld>
             <a:endParaRPr lang="en-US" dirty="0"/>
           </a:p>
@@ -4868,7 +4865,7 @@
           <a:p>
             <a:fld id="{48A87A34-81AB-432B-8DAE-1953F412C126}" type="datetimeFigureOut">
               <a:rPr lang="en-US" dirty="0"/>
-              <a:t>8/29/2018</a:t>
+              <a:t>8/31/2018</a:t>
             </a:fld>
             <a:endParaRPr lang="en-US" dirty="0"/>
           </a:p>
@@ -5126,7 +5123,7 @@
           <a:p>
             <a:fld id="{48A87A34-81AB-432B-8DAE-1953F412C126}" type="datetimeFigureOut">
               <a:rPr lang="en-US" dirty="0"/>
-              <a:t>8/29/2018</a:t>
+              <a:t>8/31/2018</a:t>
             </a:fld>
             <a:endParaRPr lang="en-US" dirty="0"/>
           </a:p>
@@ -5555,7 +5552,7 @@
           <a:p>
             <a:fld id="{48A87A34-81AB-432B-8DAE-1953F412C126}" type="datetimeFigureOut">
               <a:rPr lang="en-US" dirty="0"/>
-              <a:t>8/29/2018</a:t>
+              <a:t>8/31/2018</a:t>
             </a:fld>
             <a:endParaRPr lang="en-US" dirty="0"/>
           </a:p>
@@ -6096,7 +6093,7 @@
           <a:p>
             <a:fld id="{48A87A34-81AB-432B-8DAE-1953F412C126}" type="datetimeFigureOut">
               <a:rPr lang="en-US" dirty="0"/>
-              <a:t>8/29/2018</a:t>
+              <a:t>8/31/2018</a:t>
             </a:fld>
             <a:endParaRPr lang="en-US" dirty="0"/>
           </a:p>
@@ -6811,7 +6808,7 @@
           <a:p>
             <a:fld id="{48A87A34-81AB-432B-8DAE-1953F412C126}" type="datetimeFigureOut">
               <a:rPr lang="en-US" dirty="0"/>
-              <a:t>8/29/2018</a:t>
+              <a:t>8/31/2018</a:t>
             </a:fld>
             <a:endParaRPr lang="en-US" dirty="0"/>
           </a:p>
@@ -6976,7 +6973,7 @@
           <a:p>
             <a:fld id="{48A87A34-81AB-432B-8DAE-1953F412C126}" type="datetimeFigureOut">
               <a:rPr lang="en-US" dirty="0"/>
-              <a:t>8/29/2018</a:t>
+              <a:t>8/31/2018</a:t>
             </a:fld>
             <a:endParaRPr lang="en-US" dirty="0"/>
           </a:p>
@@ -7151,7 +7148,7 @@
           <a:p>
             <a:fld id="{48A87A34-81AB-432B-8DAE-1953F412C126}" type="datetimeFigureOut">
               <a:rPr lang="en-US" dirty="0"/>
-              <a:t>8/29/2018</a:t>
+              <a:t>8/31/2018</a:t>
             </a:fld>
             <a:endParaRPr lang="en-US" dirty="0"/>
           </a:p>
@@ -7316,7 +7313,7 @@
           <a:p>
             <a:fld id="{48A87A34-81AB-432B-8DAE-1953F412C126}" type="datetimeFigureOut">
               <a:rPr lang="en-US" dirty="0"/>
-              <a:t>8/29/2018</a:t>
+              <a:t>8/31/2018</a:t>
             </a:fld>
             <a:endParaRPr lang="en-US" dirty="0"/>
           </a:p>
@@ -7561,7 +7558,7 @@
           <a:p>
             <a:fld id="{48A87A34-81AB-432B-8DAE-1953F412C126}" type="datetimeFigureOut">
               <a:rPr lang="en-US" dirty="0"/>
-              <a:t>8/29/2018</a:t>
+              <a:t>8/31/2018</a:t>
             </a:fld>
             <a:endParaRPr lang="en-US" dirty="0"/>
           </a:p>
@@ -7788,7 +7785,7 @@
           <a:p>
             <a:fld id="{48A87A34-81AB-432B-8DAE-1953F412C126}" type="datetimeFigureOut">
               <a:rPr lang="en-US" dirty="0"/>
-              <a:t>8/29/2018</a:t>
+              <a:t>8/31/2018</a:t>
             </a:fld>
             <a:endParaRPr lang="en-US" dirty="0"/>
           </a:p>
@@ -8164,7 +8161,7 @@
           <a:p>
             <a:fld id="{48A87A34-81AB-432B-8DAE-1953F412C126}" type="datetimeFigureOut">
               <a:rPr lang="en-US" dirty="0"/>
-              <a:t>8/29/2018</a:t>
+              <a:t>8/31/2018</a:t>
             </a:fld>
             <a:endParaRPr lang="en-US" dirty="0"/>
           </a:p>
@@ -8277,7 +8274,7 @@
           <a:p>
             <a:fld id="{48A87A34-81AB-432B-8DAE-1953F412C126}" type="datetimeFigureOut">
               <a:rPr lang="en-US" dirty="0"/>
-              <a:t>8/29/2018</a:t>
+              <a:t>8/31/2018</a:t>
             </a:fld>
             <a:endParaRPr lang="en-US" dirty="0"/>
           </a:p>
@@ -8367,7 +8364,7 @@
           <a:p>
             <a:fld id="{48A87A34-81AB-432B-8DAE-1953F412C126}" type="datetimeFigureOut">
               <a:rPr lang="en-US" dirty="0"/>
-              <a:t>8/29/2018</a:t>
+              <a:t>8/31/2018</a:t>
             </a:fld>
             <a:endParaRPr lang="en-US" dirty="0"/>
           </a:p>
@@ -8611,7 +8608,7 @@
           <a:p>
             <a:fld id="{48A87A34-81AB-432B-8DAE-1953F412C126}" type="datetimeFigureOut">
               <a:rPr lang="en-US" dirty="0"/>
-              <a:t>8/29/2018</a:t>
+              <a:t>8/31/2018</a:t>
             </a:fld>
             <a:endParaRPr lang="en-US" dirty="0"/>
           </a:p>
@@ -8886,7 +8883,7 @@
           <a:p>
             <a:fld id="{48A87A34-81AB-432B-8DAE-1953F412C126}" type="datetimeFigureOut">
               <a:rPr lang="en-US" dirty="0"/>
-              <a:t>8/29/2018</a:t>
+              <a:t>8/31/2018</a:t>
             </a:fld>
             <a:endParaRPr lang="en-US" dirty="0"/>
           </a:p>
@@ -8996,8 +8993,8 @@
           </a:prstGeom>
           <a:noFill/>
           <a:extLst>
-            <a:ext uri="{909E8E84-426E-40dd-AFC4-6F175D3DCCD1}">
-              <a14:hiddenFill xmlns:a14="http://schemas.microsoft.com/office/drawing/2010/main" xmlns="">
+            <a:ext uri="{909E8E84-426E-40DD-AFC4-6F175D3DCCD1}">
+              <a14:hiddenFill xmlns:a14="http://schemas.microsoft.com/office/drawing/2010/main">
                 <a:solidFill>
                   <a:srgbClr val="FFFFFF"/>
                 </a:solidFill>
@@ -9070,8 +9067,8 @@
                 <a:noFill/>
               </a:ln>
               <a:extLst>
-                <a:ext uri="{91240B29-F687-4f45-9708-019B960494DF}">
-                  <a14:hiddenLine xmlns:a14="http://schemas.microsoft.com/office/drawing/2010/main" xmlns="" w="9525">
+                <a:ext uri="{91240B29-F687-4F45-9708-019B960494DF}">
+                  <a14:hiddenLine xmlns:a14="http://schemas.microsoft.com/office/drawing/2010/main" w="9525">
                     <a:solidFill>
                       <a:srgbClr val="000000"/>
                     </a:solidFill>
@@ -9160,8 +9157,8 @@
                 <a:noFill/>
               </a:ln>
               <a:extLst>
-                <a:ext uri="{91240B29-F687-4f45-9708-019B960494DF}">
-                  <a14:hiddenLine xmlns:a14="http://schemas.microsoft.com/office/drawing/2010/main" xmlns="" w="9525">
+                <a:ext uri="{91240B29-F687-4F45-9708-019B960494DF}">
+                  <a14:hiddenLine xmlns:a14="http://schemas.microsoft.com/office/drawing/2010/main" w="9525">
                     <a:solidFill>
                       <a:srgbClr val="000000"/>
                     </a:solidFill>
@@ -9250,8 +9247,8 @@
                 <a:noFill/>
               </a:ln>
               <a:extLst>
-                <a:ext uri="{91240B29-F687-4f45-9708-019B960494DF}">
-                  <a14:hiddenLine xmlns:a14="http://schemas.microsoft.com/office/drawing/2010/main" xmlns="" w="9525">
+                <a:ext uri="{91240B29-F687-4F45-9708-019B960494DF}">
+                  <a14:hiddenLine xmlns:a14="http://schemas.microsoft.com/office/drawing/2010/main" w="9525">
                     <a:solidFill>
                       <a:srgbClr val="000000"/>
                     </a:solidFill>
@@ -9312,8 +9309,8 @@
                 <a:noFill/>
               </a:ln>
               <a:extLst>
-                <a:ext uri="{91240B29-F687-4f45-9708-019B960494DF}">
-                  <a14:hiddenLine xmlns:a14="http://schemas.microsoft.com/office/drawing/2010/main" xmlns="" w="9525">
+                <a:ext uri="{91240B29-F687-4F45-9708-019B960494DF}">
+                  <a14:hiddenLine xmlns:a14="http://schemas.microsoft.com/office/drawing/2010/main" w="9525">
                     <a:solidFill>
                       <a:srgbClr val="000000"/>
                     </a:solidFill>
@@ -9402,8 +9399,8 @@
                 <a:noFill/>
               </a:ln>
               <a:extLst>
-                <a:ext uri="{91240B29-F687-4f45-9708-019B960494DF}">
-                  <a14:hiddenLine xmlns:a14="http://schemas.microsoft.com/office/drawing/2010/main" xmlns="" w="9525">
+                <a:ext uri="{91240B29-F687-4F45-9708-019B960494DF}">
+                  <a14:hiddenLine xmlns:a14="http://schemas.microsoft.com/office/drawing/2010/main" w="9525">
                     <a:solidFill>
                       <a:srgbClr val="000000"/>
                     </a:solidFill>
@@ -9464,8 +9461,8 @@
                 <a:noFill/>
               </a:ln>
               <a:extLst>
-                <a:ext uri="{91240B29-F687-4f45-9708-019B960494DF}">
-                  <a14:hiddenLine xmlns:a14="http://schemas.microsoft.com/office/drawing/2010/main" xmlns="" w="9525">
+                <a:ext uri="{91240B29-F687-4F45-9708-019B960494DF}">
+                  <a14:hiddenLine xmlns:a14="http://schemas.microsoft.com/office/drawing/2010/main" w="9525">
                     <a:solidFill>
                       <a:srgbClr val="000000"/>
                     </a:solidFill>
@@ -9526,8 +9523,8 @@
                 <a:noFill/>
               </a:ln>
               <a:extLst>
-                <a:ext uri="{91240B29-F687-4f45-9708-019B960494DF}">
-                  <a14:hiddenLine xmlns:a14="http://schemas.microsoft.com/office/drawing/2010/main" xmlns="" w="9525">
+                <a:ext uri="{91240B29-F687-4F45-9708-019B960494DF}">
+                  <a14:hiddenLine xmlns:a14="http://schemas.microsoft.com/office/drawing/2010/main" w="9525">
                     <a:solidFill>
                       <a:srgbClr val="000000"/>
                     </a:solidFill>
@@ -9616,8 +9613,8 @@
                 <a:noFill/>
               </a:ln>
               <a:extLst>
-                <a:ext uri="{91240B29-F687-4f45-9708-019B960494DF}">
-                  <a14:hiddenLine xmlns:a14="http://schemas.microsoft.com/office/drawing/2010/main" xmlns="" w="9525">
+                <a:ext uri="{91240B29-F687-4F45-9708-019B960494DF}">
+                  <a14:hiddenLine xmlns:a14="http://schemas.microsoft.com/office/drawing/2010/main" w="9525">
                     <a:solidFill>
                       <a:srgbClr val="000000"/>
                     </a:solidFill>
@@ -9706,8 +9703,8 @@
                 <a:noFill/>
               </a:ln>
               <a:extLst>
-                <a:ext uri="{91240B29-F687-4f45-9708-019B960494DF}">
-                  <a14:hiddenLine xmlns:a14="http://schemas.microsoft.com/office/drawing/2010/main" xmlns="" w="9525">
+                <a:ext uri="{91240B29-F687-4F45-9708-019B960494DF}">
+                  <a14:hiddenLine xmlns:a14="http://schemas.microsoft.com/office/drawing/2010/main" w="9525">
                     <a:solidFill>
                       <a:srgbClr val="000000"/>
                     </a:solidFill>
@@ -9768,8 +9765,8 @@
                 <a:noFill/>
               </a:ln>
               <a:extLst>
-                <a:ext uri="{91240B29-F687-4f45-9708-019B960494DF}">
-                  <a14:hiddenLine xmlns:a14="http://schemas.microsoft.com/office/drawing/2010/main" xmlns="" w="9525">
+                <a:ext uri="{91240B29-F687-4F45-9708-019B960494DF}">
+                  <a14:hiddenLine xmlns:a14="http://schemas.microsoft.com/office/drawing/2010/main" w="9525">
                     <a:solidFill>
                       <a:srgbClr val="000000"/>
                     </a:solidFill>
@@ -9878,8 +9875,8 @@
                 <a:noFill/>
               </a:ln>
               <a:extLst>
-                <a:ext uri="{91240B29-F687-4f45-9708-019B960494DF}">
-                  <a14:hiddenLine xmlns:a14="http://schemas.microsoft.com/office/drawing/2010/main" xmlns="" w="9525">
+                <a:ext uri="{91240B29-F687-4F45-9708-019B960494DF}">
+                  <a14:hiddenLine xmlns:a14="http://schemas.microsoft.com/office/drawing/2010/main" w="9525">
                     <a:solidFill>
                       <a:srgbClr val="000000"/>
                     </a:solidFill>
@@ -9962,8 +9959,8 @@
                 <a:noFill/>
               </a:ln>
               <a:extLst>
-                <a:ext uri="{91240B29-F687-4f45-9708-019B960494DF}">
-                  <a14:hiddenLine xmlns:a14="http://schemas.microsoft.com/office/drawing/2010/main" xmlns="" w="9525">
+                <a:ext uri="{91240B29-F687-4F45-9708-019B960494DF}">
+                  <a14:hiddenLine xmlns:a14="http://schemas.microsoft.com/office/drawing/2010/main" w="9525">
                     <a:solidFill>
                       <a:srgbClr val="000000"/>
                     </a:solidFill>
@@ -10024,8 +10021,8 @@
                 <a:noFill/>
               </a:ln>
               <a:extLst>
-                <a:ext uri="{91240B29-F687-4f45-9708-019B960494DF}">
-                  <a14:hiddenLine xmlns:a14="http://schemas.microsoft.com/office/drawing/2010/main" xmlns="" w="9525">
+                <a:ext uri="{91240B29-F687-4F45-9708-019B960494DF}">
+                  <a14:hiddenLine xmlns:a14="http://schemas.microsoft.com/office/drawing/2010/main" w="9525">
                     <a:solidFill>
                       <a:srgbClr val="000000"/>
                     </a:solidFill>
@@ -10086,8 +10083,8 @@
                 <a:noFill/>
               </a:ln>
               <a:extLst>
-                <a:ext uri="{91240B29-F687-4f45-9708-019B960494DF}">
-                  <a14:hiddenLine xmlns:a14="http://schemas.microsoft.com/office/drawing/2010/main" xmlns="" w="9525">
+                <a:ext uri="{91240B29-F687-4F45-9708-019B960494DF}">
+                  <a14:hiddenLine xmlns:a14="http://schemas.microsoft.com/office/drawing/2010/main" w="9525">
                     <a:solidFill>
                       <a:srgbClr val="000000"/>
                     </a:solidFill>
@@ -10176,8 +10173,8 @@
                 <a:noFill/>
               </a:ln>
               <a:extLst>
-                <a:ext uri="{91240B29-F687-4f45-9708-019B960494DF}">
-                  <a14:hiddenLine xmlns:a14="http://schemas.microsoft.com/office/drawing/2010/main" xmlns="" w="9525">
+                <a:ext uri="{91240B29-F687-4F45-9708-019B960494DF}">
+                  <a14:hiddenLine xmlns:a14="http://schemas.microsoft.com/office/drawing/2010/main" w="9525">
                     <a:solidFill>
                       <a:srgbClr val="000000"/>
                     </a:solidFill>
@@ -10210,8 +10207,8 @@
                 <a:noFill/>
               </a:ln>
               <a:extLst>
-                <a:ext uri="{91240B29-F687-4f45-9708-019B960494DF}">
-                  <a14:hiddenLine xmlns:a14="http://schemas.microsoft.com/office/drawing/2010/main" xmlns="" w="9525">
+                <a:ext uri="{91240B29-F687-4F45-9708-019B960494DF}">
+                  <a14:hiddenLine xmlns:a14="http://schemas.microsoft.com/office/drawing/2010/main" w="9525">
                     <a:solidFill>
                       <a:srgbClr val="000000"/>
                     </a:solidFill>
@@ -10275,8 +10272,8 @@
                 <a:noFill/>
               </a:ln>
               <a:extLst>
-                <a:ext uri="{91240B29-F687-4f45-9708-019B960494DF}">
-                  <a14:hiddenLine xmlns:a14="http://schemas.microsoft.com/office/drawing/2010/main" xmlns="" w="9525">
+                <a:ext uri="{91240B29-F687-4F45-9708-019B960494DF}">
+                  <a14:hiddenLine xmlns:a14="http://schemas.microsoft.com/office/drawing/2010/main" w="9525">
                     <a:solidFill>
                       <a:srgbClr val="000000"/>
                     </a:solidFill>
@@ -10365,8 +10362,8 @@
                 <a:noFill/>
               </a:ln>
               <a:extLst>
-                <a:ext uri="{91240B29-F687-4f45-9708-019B960494DF}">
-                  <a14:hiddenLine xmlns:a14="http://schemas.microsoft.com/office/drawing/2010/main" xmlns="" w="9525">
+                <a:ext uri="{91240B29-F687-4F45-9708-019B960494DF}">
+                  <a14:hiddenLine xmlns:a14="http://schemas.microsoft.com/office/drawing/2010/main" w="9525">
                     <a:solidFill>
                       <a:srgbClr val="000000"/>
                     </a:solidFill>
@@ -10427,8 +10424,8 @@
                 <a:noFill/>
               </a:ln>
               <a:extLst>
-                <a:ext uri="{91240B29-F687-4f45-9708-019B960494DF}">
-                  <a14:hiddenLine xmlns:a14="http://schemas.microsoft.com/office/drawing/2010/main" xmlns="" w="9525">
+                <a:ext uri="{91240B29-F687-4F45-9708-019B960494DF}">
+                  <a14:hiddenLine xmlns:a14="http://schemas.microsoft.com/office/drawing/2010/main" w="9525">
                     <a:solidFill>
                       <a:srgbClr val="000000"/>
                     </a:solidFill>
@@ -10517,8 +10514,8 @@
                 <a:noFill/>
               </a:ln>
               <a:extLst>
-                <a:ext uri="{91240B29-F687-4f45-9708-019B960494DF}">
-                  <a14:hiddenLine xmlns:a14="http://schemas.microsoft.com/office/drawing/2010/main" xmlns="" w="9525">
+                <a:ext uri="{91240B29-F687-4F45-9708-019B960494DF}">
+                  <a14:hiddenLine xmlns:a14="http://schemas.microsoft.com/office/drawing/2010/main" w="9525">
                     <a:solidFill>
                       <a:srgbClr val="000000"/>
                     </a:solidFill>
@@ -10582,8 +10579,8 @@
                 <a:noFill/>
               </a:ln>
               <a:extLst>
-                <a:ext uri="{91240B29-F687-4f45-9708-019B960494DF}">
-                  <a14:hiddenLine xmlns:a14="http://schemas.microsoft.com/office/drawing/2010/main" xmlns="" w="9525">
+                <a:ext uri="{91240B29-F687-4F45-9708-019B960494DF}">
+                  <a14:hiddenLine xmlns:a14="http://schemas.microsoft.com/office/drawing/2010/main" w="9525">
                     <a:solidFill>
                       <a:srgbClr val="000000"/>
                     </a:solidFill>
@@ -10644,8 +10641,8 @@
                 <a:noFill/>
               </a:ln>
               <a:extLst>
-                <a:ext uri="{91240B29-F687-4f45-9708-019B960494DF}">
-                  <a14:hiddenLine xmlns:a14="http://schemas.microsoft.com/office/drawing/2010/main" xmlns="" w="9525">
+                <a:ext uri="{91240B29-F687-4F45-9708-019B960494DF}">
+                  <a14:hiddenLine xmlns:a14="http://schemas.microsoft.com/office/drawing/2010/main" w="9525">
                     <a:solidFill>
                       <a:srgbClr val="000000"/>
                     </a:solidFill>
@@ -10734,8 +10731,8 @@
                 <a:noFill/>
               </a:ln>
               <a:extLst>
-                <a:ext uri="{91240B29-F687-4f45-9708-019B960494DF}">
-                  <a14:hiddenLine xmlns:a14="http://schemas.microsoft.com/office/drawing/2010/main" xmlns="" w="9525">
+                <a:ext uri="{91240B29-F687-4F45-9708-019B960494DF}">
+                  <a14:hiddenLine xmlns:a14="http://schemas.microsoft.com/office/drawing/2010/main" w="9525">
                     <a:solidFill>
                       <a:srgbClr val="000000"/>
                     </a:solidFill>
@@ -10824,8 +10821,8 @@
                 <a:noFill/>
               </a:ln>
               <a:extLst>
-                <a:ext uri="{91240B29-F687-4f45-9708-019B960494DF}">
-                  <a14:hiddenLine xmlns:a14="http://schemas.microsoft.com/office/drawing/2010/main" xmlns="" w="9525">
+                <a:ext uri="{91240B29-F687-4F45-9708-019B960494DF}">
+                  <a14:hiddenLine xmlns:a14="http://schemas.microsoft.com/office/drawing/2010/main" w="9525">
                     <a:solidFill>
                       <a:srgbClr val="000000"/>
                     </a:solidFill>
@@ -10889,8 +10886,8 @@
                 <a:noFill/>
               </a:ln>
               <a:extLst>
-                <a:ext uri="{91240B29-F687-4f45-9708-019B960494DF}">
-                  <a14:hiddenLine xmlns:a14="http://schemas.microsoft.com/office/drawing/2010/main" xmlns="" w="9525">
+                <a:ext uri="{91240B29-F687-4F45-9708-019B960494DF}">
+                  <a14:hiddenLine xmlns:a14="http://schemas.microsoft.com/office/drawing/2010/main" w="9525">
                     <a:solidFill>
                       <a:srgbClr val="000000"/>
                     </a:solidFill>
@@ -11009,8 +11006,8 @@
                 <a:noFill/>
               </a:ln>
               <a:extLst>
-                <a:ext uri="{91240B29-F687-4f45-9708-019B960494DF}">
-                  <a14:hiddenLine xmlns:a14="http://schemas.microsoft.com/office/drawing/2010/main" xmlns="" w="9525">
+                <a:ext uri="{91240B29-F687-4F45-9708-019B960494DF}">
+                  <a14:hiddenLine xmlns:a14="http://schemas.microsoft.com/office/drawing/2010/main" w="9525">
                     <a:solidFill>
                       <a:srgbClr val="000000"/>
                     </a:solidFill>
@@ -11107,8 +11104,8 @@
                 <a:noFill/>
               </a:ln>
               <a:extLst>
-                <a:ext uri="{91240B29-F687-4f45-9708-019B960494DF}">
-                  <a14:hiddenLine xmlns:a14="http://schemas.microsoft.com/office/drawing/2010/main" xmlns="" w="9525">
+                <a:ext uri="{91240B29-F687-4F45-9708-019B960494DF}">
+                  <a14:hiddenLine xmlns:a14="http://schemas.microsoft.com/office/drawing/2010/main" w="9525">
                     <a:solidFill>
                       <a:srgbClr val="000000"/>
                     </a:solidFill>
@@ -11222,8 +11219,8 @@
                 <a:noFill/>
               </a:ln>
               <a:extLst>
-                <a:ext uri="{91240B29-F687-4f45-9708-019B960494DF}">
-                  <a14:hiddenLine xmlns:a14="http://schemas.microsoft.com/office/drawing/2010/main" xmlns="" w="9525">
+                <a:ext uri="{91240B29-F687-4F45-9708-019B960494DF}">
+                  <a14:hiddenLine xmlns:a14="http://schemas.microsoft.com/office/drawing/2010/main" w="9525">
                     <a:solidFill>
                       <a:srgbClr val="000000"/>
                     </a:solidFill>
@@ -11312,8 +11309,8 @@
                 <a:noFill/>
               </a:ln>
               <a:extLst>
-                <a:ext uri="{91240B29-F687-4f45-9708-019B960494DF}">
-                  <a14:hiddenLine xmlns:a14="http://schemas.microsoft.com/office/drawing/2010/main" xmlns="" w="9525">
+                <a:ext uri="{91240B29-F687-4F45-9708-019B960494DF}">
+                  <a14:hiddenLine xmlns:a14="http://schemas.microsoft.com/office/drawing/2010/main" w="9525">
                     <a:solidFill>
                       <a:srgbClr val="000000"/>
                     </a:solidFill>
@@ -11377,8 +11374,8 @@
                 <a:noFill/>
               </a:ln>
               <a:extLst>
-                <a:ext uri="{91240B29-F687-4f45-9708-019B960494DF}">
-                  <a14:hiddenLine xmlns:a14="http://schemas.microsoft.com/office/drawing/2010/main" xmlns="" w="9525">
+                <a:ext uri="{91240B29-F687-4F45-9708-019B960494DF}">
+                  <a14:hiddenLine xmlns:a14="http://schemas.microsoft.com/office/drawing/2010/main" w="9525">
                     <a:solidFill>
                       <a:srgbClr val="000000"/>
                     </a:solidFill>
@@ -11467,8 +11464,8 @@
                 <a:noFill/>
               </a:ln>
               <a:extLst>
-                <a:ext uri="{91240B29-F687-4f45-9708-019B960494DF}">
-                  <a14:hiddenLine xmlns:a14="http://schemas.microsoft.com/office/drawing/2010/main" xmlns="" w="9525">
+                <a:ext uri="{91240B29-F687-4F45-9708-019B960494DF}">
+                  <a14:hiddenLine xmlns:a14="http://schemas.microsoft.com/office/drawing/2010/main" w="9525">
                     <a:solidFill>
                       <a:srgbClr val="000000"/>
                     </a:solidFill>
@@ -11535,8 +11532,8 @@
                 <a:noFill/>
               </a:ln>
               <a:extLst>
-                <a:ext uri="{91240B29-F687-4f45-9708-019B960494DF}">
-                  <a14:hiddenLine xmlns:a14="http://schemas.microsoft.com/office/drawing/2010/main" xmlns="" w="9525">
+                <a:ext uri="{91240B29-F687-4F45-9708-019B960494DF}">
+                  <a14:hiddenLine xmlns:a14="http://schemas.microsoft.com/office/drawing/2010/main" w="9525">
                     <a:solidFill>
                       <a:srgbClr val="000000"/>
                     </a:solidFill>
@@ -11625,8 +11622,8 @@
                 <a:noFill/>
               </a:ln>
               <a:extLst>
-                <a:ext uri="{91240B29-F687-4f45-9708-019B960494DF}">
-                  <a14:hiddenLine xmlns:a14="http://schemas.microsoft.com/office/drawing/2010/main" xmlns="" w="9525">
+                <a:ext uri="{91240B29-F687-4F45-9708-019B960494DF}">
+                  <a14:hiddenLine xmlns:a14="http://schemas.microsoft.com/office/drawing/2010/main" w="9525">
                     <a:solidFill>
                       <a:srgbClr val="000000"/>
                     </a:solidFill>
@@ -11693,8 +11690,8 @@
                 <a:noFill/>
               </a:ln>
               <a:extLst>
-                <a:ext uri="{91240B29-F687-4f45-9708-019B960494DF}">
-                  <a14:hiddenLine xmlns:a14="http://schemas.microsoft.com/office/drawing/2010/main" xmlns="" w="9525">
+                <a:ext uri="{91240B29-F687-4F45-9708-019B960494DF}">
+                  <a14:hiddenLine xmlns:a14="http://schemas.microsoft.com/office/drawing/2010/main" w="9525">
                     <a:solidFill>
                       <a:srgbClr val="000000"/>
                     </a:solidFill>
@@ -11783,8 +11780,8 @@
                 <a:noFill/>
               </a:ln>
               <a:extLst>
-                <a:ext uri="{91240B29-F687-4f45-9708-019B960494DF}">
-                  <a14:hiddenLine xmlns:a14="http://schemas.microsoft.com/office/drawing/2010/main" xmlns="" w="9525">
+                <a:ext uri="{91240B29-F687-4F45-9708-019B960494DF}">
+                  <a14:hiddenLine xmlns:a14="http://schemas.microsoft.com/office/drawing/2010/main" w="9525">
                     <a:solidFill>
                       <a:srgbClr val="000000"/>
                     </a:solidFill>
@@ -11817,8 +11814,8 @@
                 <a:noFill/>
               </a:ln>
               <a:extLst>
-                <a:ext uri="{91240B29-F687-4f45-9708-019B960494DF}">
-                  <a14:hiddenLine xmlns:a14="http://schemas.microsoft.com/office/drawing/2010/main" xmlns="" w="9525">
+                <a:ext uri="{91240B29-F687-4F45-9708-019B960494DF}">
+                  <a14:hiddenLine xmlns:a14="http://schemas.microsoft.com/office/drawing/2010/main" w="9525">
                     <a:solidFill>
                       <a:srgbClr val="000000"/>
                     </a:solidFill>
@@ -11959,7 +11956,7 @@
             <a:fld id="{48A87A34-81AB-432B-8DAE-1953F412C126}" type="datetimeFigureOut">
               <a:rPr lang="en-US" dirty="0"/>
               <a:pPr/>
-              <a:t>8/29/2018</a:t>
+              <a:t>8/31/2018</a:t>
             </a:fld>
             <a:endParaRPr lang="en-US" dirty="0"/>
           </a:p>
@@ -12380,7 +12377,7 @@
           <p:cNvPr id="2" name="Title 1">
             <a:extLst>
               <a:ext uri="{FF2B5EF4-FFF2-40B4-BE49-F238E27FC236}">
-                <a16:creationId xmlns:a16="http://schemas.microsoft.com/office/drawing/2014/main" id="{78629773-1F2F-4DEA-A804-323B3E4F7636}"/>
+                <a16:creationId xmlns:a16="http://schemas.microsoft.com/office/drawing/2014/main" xmlns="" id="{78629773-1F2F-4DEA-A804-323B3E4F7636}"/>
               </a:ext>
             </a:extLst>
           </p:cNvPr>
@@ -12408,7 +12405,7 @@
           <p:cNvPr id="3" name="Subtitle 2">
             <a:extLst>
               <a:ext uri="{FF2B5EF4-FFF2-40B4-BE49-F238E27FC236}">
-                <a16:creationId xmlns:a16="http://schemas.microsoft.com/office/drawing/2014/main" id="{236AD9E0-AFB8-49D5-852F-5BFFF4F9DA95}"/>
+                <a16:creationId xmlns:a16="http://schemas.microsoft.com/office/drawing/2014/main" xmlns="" id="{236AD9E0-AFB8-49D5-852F-5BFFF4F9DA95}"/>
               </a:ext>
             </a:extLst>
           </p:cNvPr>
@@ -12490,7 +12487,7 @@
           <p:cNvPr id="2" name="Title 1">
             <a:extLst>
               <a:ext uri="{FF2B5EF4-FFF2-40B4-BE49-F238E27FC236}">
-                <a16:creationId xmlns:a16="http://schemas.microsoft.com/office/drawing/2014/main" id="{5F163758-F730-4FFD-9F9E-F0FC8CDDB240}"/>
+                <a16:creationId xmlns:a16="http://schemas.microsoft.com/office/drawing/2014/main" xmlns="" id="{5F163758-F730-4FFD-9F9E-F0FC8CDDB240}"/>
               </a:ext>
             </a:extLst>
           </p:cNvPr>
@@ -12518,7 +12515,7 @@
           <p:cNvPr id="3" name="Content Placeholder 2">
             <a:extLst>
               <a:ext uri="{FF2B5EF4-FFF2-40B4-BE49-F238E27FC236}">
-                <a16:creationId xmlns:a16="http://schemas.microsoft.com/office/drawing/2014/main" id="{C5EBD364-4FCA-4AC5-A62F-1E06EC8240DE}"/>
+                <a16:creationId xmlns:a16="http://schemas.microsoft.com/office/drawing/2014/main" xmlns="" id="{C5EBD364-4FCA-4AC5-A62F-1E06EC8240DE}"/>
               </a:ext>
             </a:extLst>
           </p:cNvPr>
@@ -12548,6 +12545,10 @@
               <a:rPr lang="en-US" u="sng" dirty="0" err="1"/>
               <a:t>Sapana</a:t>
             </a:r>
+            <a:r>
+              <a:rPr lang="en-US" dirty="0"/>
+              <a:t/>
+            </a:r>
             <a:br>
               <a:rPr lang="en-US" dirty="0"/>
             </a:br>
@@ -12578,6 +12579,10 @@
               <a:rPr lang="en-US" u="sng" dirty="0"/>
               <a:t>Roseberry, Keith</a:t>
             </a:r>
+            <a:r>
+              <a:rPr lang="en-US" dirty="0"/>
+              <a:t/>
+            </a:r>
             <a:br>
               <a:rPr lang="en-US" dirty="0"/>
             </a:br>
@@ -12598,6 +12603,10 @@
             <a:r>
               <a:rPr lang="en-US" u="sng" dirty="0" err="1"/>
               <a:t>Rakshith</a:t>
+            </a:r>
+            <a:r>
+              <a:rPr lang="en-US" dirty="0"/>
+              <a:t/>
             </a:r>
             <a:br>
               <a:rPr lang="en-US" dirty="0"/>
@@ -12644,7 +12653,7 @@
           <p:cNvPr id="2" name="Title 1">
             <a:extLst>
               <a:ext uri="{FF2B5EF4-FFF2-40B4-BE49-F238E27FC236}">
-                <a16:creationId xmlns:a16="http://schemas.microsoft.com/office/drawing/2014/main" id="{948A0E38-AB97-4175-B372-9627013E206C}"/>
+                <a16:creationId xmlns:a16="http://schemas.microsoft.com/office/drawing/2014/main" xmlns="" id="{948A0E38-AB97-4175-B372-9627013E206C}"/>
               </a:ext>
             </a:extLst>
           </p:cNvPr>
@@ -12672,7 +12681,7 @@
           <p:cNvPr id="3" name="Content Placeholder 2">
             <a:extLst>
               <a:ext uri="{FF2B5EF4-FFF2-40B4-BE49-F238E27FC236}">
-                <a16:creationId xmlns:a16="http://schemas.microsoft.com/office/drawing/2014/main" id="{1CAB4BB1-33CD-4BB7-BA3A-A13ECB37D4A2}"/>
+                <a16:creationId xmlns:a16="http://schemas.microsoft.com/office/drawing/2014/main" xmlns="" id="{1CAB4BB1-33CD-4BB7-BA3A-A13ECB37D4A2}"/>
               </a:ext>
             </a:extLst>
           </p:cNvPr>
@@ -12763,7 +12772,7 @@
           <p:cNvPr id="2" name="Title 1">
             <a:extLst>
               <a:ext uri="{FF2B5EF4-FFF2-40B4-BE49-F238E27FC236}">
-                <a16:creationId xmlns:a16="http://schemas.microsoft.com/office/drawing/2014/main" id="{B0E04909-FB5A-4AD9-BC1D-52CB8571C410}"/>
+                <a16:creationId xmlns:a16="http://schemas.microsoft.com/office/drawing/2014/main" xmlns="" id="{B0E04909-FB5A-4AD9-BC1D-52CB8571C410}"/>
               </a:ext>
             </a:extLst>
           </p:cNvPr>
@@ -12791,7 +12800,7 @@
           <p:cNvPr id="3" name="Content Placeholder 2">
             <a:extLst>
               <a:ext uri="{FF2B5EF4-FFF2-40B4-BE49-F238E27FC236}">
-                <a16:creationId xmlns:a16="http://schemas.microsoft.com/office/drawing/2014/main" id="{F022C534-5EBE-4C81-B23F-D7B5EA62880D}"/>
+                <a16:creationId xmlns:a16="http://schemas.microsoft.com/office/drawing/2014/main" xmlns="" id="{F022C534-5EBE-4C81-B23F-D7B5EA62880D}"/>
               </a:ext>
             </a:extLst>
           </p:cNvPr>
@@ -12849,7 +12858,7 @@
           <p:cNvPr id="2" name="Title 1">
             <a:extLst>
               <a:ext uri="{FF2B5EF4-FFF2-40B4-BE49-F238E27FC236}">
-                <a16:creationId xmlns:a16="http://schemas.microsoft.com/office/drawing/2014/main" id="{30E1123C-963D-45A1-979B-3FACC9F01257}"/>
+                <a16:creationId xmlns:a16="http://schemas.microsoft.com/office/drawing/2014/main" xmlns="" id="{30E1123C-963D-45A1-979B-3FACC9F01257}"/>
               </a:ext>
             </a:extLst>
           </p:cNvPr>
@@ -12884,7 +12893,7 @@
           <p:cNvPr id="3" name="Content Placeholder 2">
             <a:extLst>
               <a:ext uri="{FF2B5EF4-FFF2-40B4-BE49-F238E27FC236}">
-                <a16:creationId xmlns:a16="http://schemas.microsoft.com/office/drawing/2014/main" id="{B9A684A9-BC2F-4302-BF2F-FFE0E47DB328}"/>
+                <a16:creationId xmlns:a16="http://schemas.microsoft.com/office/drawing/2014/main" xmlns="" id="{B9A684A9-BC2F-4302-BF2F-FFE0E47DB328}"/>
               </a:ext>
             </a:extLst>
           </p:cNvPr>
@@ -12988,7 +12997,7 @@
           <p:cNvPr id="2" name="Title 1">
             <a:extLst>
               <a:ext uri="{FF2B5EF4-FFF2-40B4-BE49-F238E27FC236}">
-                <a16:creationId xmlns:a16="http://schemas.microsoft.com/office/drawing/2014/main" id="{9A49EC41-9B0B-40CB-9E1E-85D4384B9E7A}"/>
+                <a16:creationId xmlns:a16="http://schemas.microsoft.com/office/drawing/2014/main" xmlns="" id="{9A49EC41-9B0B-40CB-9E1E-85D4384B9E7A}"/>
               </a:ext>
             </a:extLst>
           </p:cNvPr>
@@ -13016,7 +13025,7 @@
           <p:cNvPr id="3" name="Content Placeholder 2">
             <a:extLst>
               <a:ext uri="{FF2B5EF4-FFF2-40B4-BE49-F238E27FC236}">
-                <a16:creationId xmlns:a16="http://schemas.microsoft.com/office/drawing/2014/main" id="{A022F38E-8C72-47DE-836C-4A96E047F639}"/>
+                <a16:creationId xmlns:a16="http://schemas.microsoft.com/office/drawing/2014/main" xmlns="" id="{A022F38E-8C72-47DE-836C-4A96E047F639}"/>
               </a:ext>
             </a:extLst>
           </p:cNvPr>
@@ -13106,7 +13115,7 @@
           <p:cNvPr id="2" name="Title 1">
             <a:extLst>
               <a:ext uri="{FF2B5EF4-FFF2-40B4-BE49-F238E27FC236}">
-                <a16:creationId xmlns:a16="http://schemas.microsoft.com/office/drawing/2014/main" id="{F1B978BA-83B7-49DD-AA89-E0B2140251EF}"/>
+                <a16:creationId xmlns:a16="http://schemas.microsoft.com/office/drawing/2014/main" xmlns="" id="{F1B978BA-83B7-49DD-AA89-E0B2140251EF}"/>
               </a:ext>
             </a:extLst>
           </p:cNvPr>
@@ -13134,7 +13143,7 @@
           <p:cNvPr id="3" name="Content Placeholder 2">
             <a:extLst>
               <a:ext uri="{FF2B5EF4-FFF2-40B4-BE49-F238E27FC236}">
-                <a16:creationId xmlns:a16="http://schemas.microsoft.com/office/drawing/2014/main" id="{1F59F962-AF4D-410A-B933-7A6CEB775654}"/>
+                <a16:creationId xmlns:a16="http://schemas.microsoft.com/office/drawing/2014/main" xmlns="" id="{1F59F962-AF4D-410A-B933-7A6CEB775654}"/>
               </a:ext>
             </a:extLst>
           </p:cNvPr>
@@ -13185,6 +13194,183 @@
     <p:extLst>
       <p:ext uri="{BB962C8B-B14F-4D97-AF65-F5344CB8AC3E}">
         <p14:creationId xmlns:p14="http://schemas.microsoft.com/office/powerpoint/2010/main" val="2158126652"/>
+      </p:ext>
+    </p:extLst>
+  </p:cSld>
+  <p:clrMapOvr>
+    <a:masterClrMapping/>
+  </p:clrMapOvr>
+</p:sld>
+</file>
+
+<file path=ppt/slides/slide8.xml><?xml version="1.0" encoding="utf-8"?>
+<p:sld xmlns:a="http://schemas.openxmlformats.org/drawingml/2006/main" xmlns:r="http://schemas.openxmlformats.org/officeDocument/2006/relationships" xmlns:p="http://schemas.openxmlformats.org/presentationml/2006/main">
+  <p:cSld>
+    <p:spTree>
+      <p:nvGrpSpPr>
+        <p:cNvPr id="1" name=""/>
+        <p:cNvGrpSpPr/>
+        <p:nvPr/>
+      </p:nvGrpSpPr>
+      <p:grpSpPr>
+        <a:xfrm>
+          <a:off x="0" y="0"/>
+          <a:ext cx="0" cy="0"/>
+          <a:chOff x="0" y="0"/>
+          <a:chExt cx="0" cy="0"/>
+        </a:xfrm>
+      </p:grpSpPr>
+      <p:sp>
+        <p:nvSpPr>
+          <p:cNvPr id="2" name="Title 1">
+            <a:extLst>
+              <a:ext uri="{FF2B5EF4-FFF2-40B4-BE49-F238E27FC236}">
+                <a16:creationId xmlns:a16="http://schemas.microsoft.com/office/drawing/2014/main" xmlns="" id="{F1B978BA-83B7-49DD-AA89-E0B2140251EF}"/>
+              </a:ext>
+            </a:extLst>
+          </p:cNvPr>
+          <p:cNvSpPr>
+            <a:spLocks noGrp="1"/>
+          </p:cNvSpPr>
+          <p:nvPr>
+            <p:ph type="title"/>
+          </p:nvPr>
+        </p:nvSpPr>
+        <p:spPr/>
+        <p:txBody>
+          <a:bodyPr/>
+          <a:lstStyle/>
+          <a:p>
+            <a:r>
+              <a:rPr lang="en-US" dirty="0" smtClean="0"/>
+              <a:t>Team Interactions</a:t>
+            </a:r>
+            <a:endParaRPr lang="en-US" dirty="0"/>
+          </a:p>
+        </p:txBody>
+      </p:sp>
+      <p:sp>
+        <p:nvSpPr>
+          <p:cNvPr id="3" name="Content Placeholder 2">
+            <a:extLst>
+              <a:ext uri="{FF2B5EF4-FFF2-40B4-BE49-F238E27FC236}">
+                <a16:creationId xmlns:a16="http://schemas.microsoft.com/office/drawing/2014/main" xmlns="" id="{1F59F962-AF4D-410A-B933-7A6CEB775654}"/>
+              </a:ext>
+            </a:extLst>
+          </p:cNvPr>
+          <p:cNvSpPr>
+            <a:spLocks noGrp="1"/>
+          </p:cNvSpPr>
+          <p:nvPr>
+            <p:ph idx="1"/>
+          </p:nvPr>
+        </p:nvSpPr>
+        <p:spPr/>
+        <p:txBody>
+          <a:bodyPr>
+            <a:normAutofit/>
+          </a:bodyPr>
+          <a:lstStyle/>
+          <a:p>
+            <a:r>
+              <a:rPr lang="en-US" b="1" u="sng" dirty="0" smtClean="0"/>
+              <a:t>Team Meetings:</a:t>
+            </a:r>
+          </a:p>
+          <a:p>
+            <a:pPr lvl="1"/>
+            <a:r>
+              <a:rPr lang="en-US" dirty="0" smtClean="0"/>
+              <a:t>Regular </a:t>
+            </a:r>
+            <a:r>
+              <a:rPr lang="en-US" dirty="0"/>
+              <a:t>team meetings on Thursdays 7:00 - 9:00 PM </a:t>
+            </a:r>
+            <a:r>
+              <a:rPr lang="en-US" dirty="0" smtClean="0"/>
+              <a:t>Eastern</a:t>
+            </a:r>
+          </a:p>
+          <a:p>
+            <a:pPr lvl="1"/>
+            <a:r>
+              <a:rPr lang="en-US" dirty="0"/>
+              <a:t>Shorter "stand-up" meetings on Sundays 7:00 - 7:30 PM Eastern</a:t>
+            </a:r>
+            <a:endParaRPr lang="en-US" dirty="0" smtClean="0"/>
+          </a:p>
+          <a:p>
+            <a:r>
+              <a:rPr lang="en-US" b="1" u="sng" dirty="0" smtClean="0"/>
+              <a:t>Meeting room:</a:t>
+            </a:r>
+            <a:r>
+              <a:rPr lang="en-US" dirty="0"/>
+              <a:t> SSW690 Google Meet room provided by Prof. </a:t>
+            </a:r>
+            <a:r>
+              <a:rPr lang="en-US" dirty="0" smtClean="0"/>
+              <a:t>Rowland</a:t>
+            </a:r>
+          </a:p>
+          <a:p>
+            <a:pPr lvl="1"/>
+            <a:r>
+              <a:rPr lang="en-US" dirty="0" err="1"/>
+              <a:t>Whatsapp</a:t>
+            </a:r>
+            <a:r>
+              <a:rPr lang="en-US" dirty="0"/>
+              <a:t> for messaging in between </a:t>
+            </a:r>
+            <a:r>
+              <a:rPr lang="en-US" dirty="0" smtClean="0"/>
+              <a:t>meetings</a:t>
+            </a:r>
+          </a:p>
+          <a:p>
+            <a:pPr lvl="1"/>
+            <a:r>
+              <a:rPr lang="en-US" dirty="0" smtClean="0"/>
+              <a:t>Email for longer messages</a:t>
+            </a:r>
+          </a:p>
+          <a:p>
+            <a:r>
+              <a:rPr lang="en-US" b="1" u="sng" dirty="0" smtClean="0"/>
+              <a:t>GitHub repository:</a:t>
+            </a:r>
+            <a:r>
+              <a:rPr lang="en-US" dirty="0"/>
+              <a:t> </a:t>
+            </a:r>
+            <a:r>
+              <a:rPr lang="en-US" dirty="0">
+                <a:hlinkClick r:id="rId2"/>
+              </a:rPr>
+              <a:t>https</a:t>
+            </a:r>
+            <a:r>
+              <a:rPr lang="en-US">
+                <a:hlinkClick r:id="rId2"/>
+              </a:rPr>
+              <a:t>://</a:t>
+            </a:r>
+            <a:r>
+              <a:rPr lang="en-US" smtClean="0">
+                <a:hlinkClick r:id="rId2"/>
+              </a:rPr>
+              <a:t>github.com/Scarabyte/SSW690-Project</a:t>
+            </a:r>
+            <a:endParaRPr lang="en-US" dirty="0"/>
+          </a:p>
+        </p:txBody>
+      </p:sp>
+    </p:spTree>
+    <p:extLst>
+      <p:ext uri="{BB962C8B-B14F-4D97-AF65-F5344CB8AC3E}">
+        <p14:creationId xmlns:p14="http://schemas.microsoft.com/office/powerpoint/2010/main" val="1643930476"/>
       </p:ext>
     </p:extLst>
   </p:cSld>
@@ -13439,7 +13625,7 @@
   <a:extraClrSchemeLst/>
   <a:extLst>
     <a:ext uri="{05A4C25C-085E-4340-85A3-A5531E510DB2}">
-      <thm15:themeFamily xmlns:thm15="http://schemas.microsoft.com/office/thememl/2012/main" name="Circuit" id="{0AC2F7E7-15F5-431C-B2A2-456FE929F56C}" vid="{0911B802-464C-4241-8DD9-B60FF88E379F}"/>
+      <thm15:themeFamily xmlns:thm15="http://schemas.microsoft.com/office/thememl/2012/main" xmlns="" name="Circuit" id="{0AC2F7E7-15F5-431C-B2A2-456FE929F56C}" vid="{0911B802-464C-4241-8DD9-B60FF88E379F}"/>
     </a:ext>
   </a:extLst>
 </a:theme>

</xml_diff>

<commit_message>
Start working in Issue #4
</commit_message>
<xml_diff>
--- a/docs/Presentations/Computer Vision Driving Aids Project Overview.pptx
+++ b/docs/Presentations/Computer Vision Driving Aids Project Overview.pptx
@@ -10,9 +10,10 @@
     <p:sldId id="258" r:id="rId4"/>
     <p:sldId id="261" r:id="rId5"/>
     <p:sldId id="259" r:id="rId6"/>
-    <p:sldId id="260" r:id="rId7"/>
-    <p:sldId id="262" r:id="rId8"/>
-    <p:sldId id="263" r:id="rId9"/>
+    <p:sldId id="264" r:id="rId7"/>
+    <p:sldId id="260" r:id="rId8"/>
+    <p:sldId id="262" r:id="rId9"/>
+    <p:sldId id="263" r:id="rId10"/>
   </p:sldIdLst>
   <p:sldSz cx="12192000" cy="6858000"/>
   <p:notesSz cx="6858000" cy="9144000"/>
@@ -116,7 +117,7 @@
 
 <file path=ppt/commentAuthors.xml><?xml version="1.0" encoding="utf-8"?>
 <p:cmAuthorLst xmlns:a="http://schemas.openxmlformats.org/drawingml/2006/main" xmlns:r="http://schemas.openxmlformats.org/officeDocument/2006/relationships" xmlns:p="http://schemas.openxmlformats.org/presentationml/2006/main">
-  <p:cmAuthor id="1" name="Keith Roseberry" initials="KR" lastIdx="1" clrIdx="0">
+  <p:cmAuthor id="1" name="Keith Roseberry" initials="KR" lastIdx="2" clrIdx="0">
     <p:extLst/>
   </p:cmAuthor>
 </p:cmAuthorLst>
@@ -12377,7 +12378,7 @@
           <p:cNvPr id="2" name="Title 1">
             <a:extLst>
               <a:ext uri="{FF2B5EF4-FFF2-40B4-BE49-F238E27FC236}">
-                <a16:creationId xmlns:a16="http://schemas.microsoft.com/office/drawing/2014/main" xmlns="" id="{78629773-1F2F-4DEA-A804-323B3E4F7636}"/>
+                <a16:creationId xmlns="" xmlns:a16="http://schemas.microsoft.com/office/drawing/2014/main" id="{78629773-1F2F-4DEA-A804-323B3E4F7636}"/>
               </a:ext>
             </a:extLst>
           </p:cNvPr>
@@ -12405,7 +12406,7 @@
           <p:cNvPr id="3" name="Subtitle 2">
             <a:extLst>
               <a:ext uri="{FF2B5EF4-FFF2-40B4-BE49-F238E27FC236}">
-                <a16:creationId xmlns:a16="http://schemas.microsoft.com/office/drawing/2014/main" xmlns="" id="{236AD9E0-AFB8-49D5-852F-5BFFF4F9DA95}"/>
+                <a16:creationId xmlns="" xmlns:a16="http://schemas.microsoft.com/office/drawing/2014/main" id="{236AD9E0-AFB8-49D5-852F-5BFFF4F9DA95}"/>
               </a:ext>
             </a:extLst>
           </p:cNvPr>
@@ -12487,7 +12488,7 @@
           <p:cNvPr id="2" name="Title 1">
             <a:extLst>
               <a:ext uri="{FF2B5EF4-FFF2-40B4-BE49-F238E27FC236}">
-                <a16:creationId xmlns:a16="http://schemas.microsoft.com/office/drawing/2014/main" xmlns="" id="{5F163758-F730-4FFD-9F9E-F0FC8CDDB240}"/>
+                <a16:creationId xmlns="" xmlns:a16="http://schemas.microsoft.com/office/drawing/2014/main" id="{5F163758-F730-4FFD-9F9E-F0FC8CDDB240}"/>
               </a:ext>
             </a:extLst>
           </p:cNvPr>
@@ -12515,7 +12516,7 @@
           <p:cNvPr id="3" name="Content Placeholder 2">
             <a:extLst>
               <a:ext uri="{FF2B5EF4-FFF2-40B4-BE49-F238E27FC236}">
-                <a16:creationId xmlns:a16="http://schemas.microsoft.com/office/drawing/2014/main" xmlns="" id="{C5EBD364-4FCA-4AC5-A62F-1E06EC8240DE}"/>
+                <a16:creationId xmlns="" xmlns:a16="http://schemas.microsoft.com/office/drawing/2014/main" id="{C5EBD364-4FCA-4AC5-A62F-1E06EC8240DE}"/>
               </a:ext>
             </a:extLst>
           </p:cNvPr>
@@ -12653,7 +12654,7 @@
           <p:cNvPr id="2" name="Title 1">
             <a:extLst>
               <a:ext uri="{FF2B5EF4-FFF2-40B4-BE49-F238E27FC236}">
-                <a16:creationId xmlns:a16="http://schemas.microsoft.com/office/drawing/2014/main" xmlns="" id="{948A0E38-AB97-4175-B372-9627013E206C}"/>
+                <a16:creationId xmlns="" xmlns:a16="http://schemas.microsoft.com/office/drawing/2014/main" id="{948A0E38-AB97-4175-B372-9627013E206C}"/>
               </a:ext>
             </a:extLst>
           </p:cNvPr>
@@ -12681,7 +12682,7 @@
           <p:cNvPr id="3" name="Content Placeholder 2">
             <a:extLst>
               <a:ext uri="{FF2B5EF4-FFF2-40B4-BE49-F238E27FC236}">
-                <a16:creationId xmlns:a16="http://schemas.microsoft.com/office/drawing/2014/main" xmlns="" id="{1CAB4BB1-33CD-4BB7-BA3A-A13ECB37D4A2}"/>
+                <a16:creationId xmlns="" xmlns:a16="http://schemas.microsoft.com/office/drawing/2014/main" id="{1CAB4BB1-33CD-4BB7-BA3A-A13ECB37D4A2}"/>
               </a:ext>
             </a:extLst>
           </p:cNvPr>
@@ -12772,7 +12773,7 @@
           <p:cNvPr id="2" name="Title 1">
             <a:extLst>
               <a:ext uri="{FF2B5EF4-FFF2-40B4-BE49-F238E27FC236}">
-                <a16:creationId xmlns:a16="http://schemas.microsoft.com/office/drawing/2014/main" xmlns="" id="{B0E04909-FB5A-4AD9-BC1D-52CB8571C410}"/>
+                <a16:creationId xmlns="" xmlns:a16="http://schemas.microsoft.com/office/drawing/2014/main" id="{B0E04909-FB5A-4AD9-BC1D-52CB8571C410}"/>
               </a:ext>
             </a:extLst>
           </p:cNvPr>
@@ -12800,7 +12801,7 @@
           <p:cNvPr id="3" name="Content Placeholder 2">
             <a:extLst>
               <a:ext uri="{FF2B5EF4-FFF2-40B4-BE49-F238E27FC236}">
-                <a16:creationId xmlns:a16="http://schemas.microsoft.com/office/drawing/2014/main" xmlns="" id="{F022C534-5EBE-4C81-B23F-D7B5EA62880D}"/>
+                <a16:creationId xmlns="" xmlns:a16="http://schemas.microsoft.com/office/drawing/2014/main" id="{F022C534-5EBE-4C81-B23F-D7B5EA62880D}"/>
               </a:ext>
             </a:extLst>
           </p:cNvPr>
@@ -12858,7 +12859,7 @@
           <p:cNvPr id="2" name="Title 1">
             <a:extLst>
               <a:ext uri="{FF2B5EF4-FFF2-40B4-BE49-F238E27FC236}">
-                <a16:creationId xmlns:a16="http://schemas.microsoft.com/office/drawing/2014/main" xmlns="" id="{30E1123C-963D-45A1-979B-3FACC9F01257}"/>
+                <a16:creationId xmlns="" xmlns:a16="http://schemas.microsoft.com/office/drawing/2014/main" id="{30E1123C-963D-45A1-979B-3FACC9F01257}"/>
               </a:ext>
             </a:extLst>
           </p:cNvPr>
@@ -12893,7 +12894,7 @@
           <p:cNvPr id="3" name="Content Placeholder 2">
             <a:extLst>
               <a:ext uri="{FF2B5EF4-FFF2-40B4-BE49-F238E27FC236}">
-                <a16:creationId xmlns:a16="http://schemas.microsoft.com/office/drawing/2014/main" xmlns="" id="{B9A684A9-BC2F-4302-BF2F-FFE0E47DB328}"/>
+                <a16:creationId xmlns="" xmlns:a16="http://schemas.microsoft.com/office/drawing/2014/main" id="{B9A684A9-BC2F-4302-BF2F-FFE0E47DB328}"/>
               </a:ext>
             </a:extLst>
           </p:cNvPr>
@@ -12997,7 +12998,7 @@
           <p:cNvPr id="2" name="Title 1">
             <a:extLst>
               <a:ext uri="{FF2B5EF4-FFF2-40B4-BE49-F238E27FC236}">
-                <a16:creationId xmlns:a16="http://schemas.microsoft.com/office/drawing/2014/main" xmlns="" id="{9A49EC41-9B0B-40CB-9E1E-85D4384B9E7A}"/>
+                <a16:creationId xmlns="" xmlns:a16="http://schemas.microsoft.com/office/drawing/2014/main" id="{30E1123C-963D-45A1-979B-3FACC9F01257}"/>
               </a:ext>
             </a:extLst>
           </p:cNvPr>
@@ -13014,9 +13015,10 @@
           <a:lstStyle/>
           <a:p>
             <a:r>
-              <a:rPr lang="en-US" dirty="0"/>
-              <a:t>Stakeholders, customers and impact</a:t>
-            </a:r>
+              <a:rPr lang="en-US" dirty="0" smtClean="0"/>
+              <a:t>Modularity</a:t>
+            </a:r>
+            <a:endParaRPr lang="en-US" dirty="0"/>
           </a:p>
         </p:txBody>
       </p:sp>
@@ -13025,7 +13027,7 @@
           <p:cNvPr id="3" name="Content Placeholder 2">
             <a:extLst>
               <a:ext uri="{FF2B5EF4-FFF2-40B4-BE49-F238E27FC236}">
-                <a16:creationId xmlns:a16="http://schemas.microsoft.com/office/drawing/2014/main" xmlns="" id="{A022F38E-8C72-47DE-836C-4A96E047F639}"/>
+                <a16:creationId xmlns="" xmlns:a16="http://schemas.microsoft.com/office/drawing/2014/main" id="{B9A684A9-BC2F-4302-BF2F-FFE0E47DB328}"/>
               </a:ext>
             </a:extLst>
           </p:cNvPr>
@@ -13038,52 +13040,69 @@
         </p:nvSpPr>
         <p:spPr/>
         <p:txBody>
-          <a:bodyPr/>
+          <a:bodyPr>
+            <a:normAutofit/>
+          </a:bodyPr>
           <a:lstStyle/>
           <a:p>
             <a:r>
+              <a:rPr lang="en-US" b="1" u="sng" dirty="0" smtClean="0"/>
+              <a:t>Modularity</a:t>
+            </a:r>
+            <a:r>
               <a:rPr lang="en-US" b="1" u="sng" dirty="0"/>
-              <a:t>Customers:</a:t>
+              <a:t>:</a:t>
             </a:r>
             <a:r>
               <a:rPr lang="en-US" dirty="0"/>
-              <a:t> TBD – identify and describe the customers who will benefit from the system, and what benefits they may achieve.</a:t>
-            </a:r>
-          </a:p>
-          <a:p>
-            <a:r>
-              <a:rPr lang="en-US" b="1" u="sng" dirty="0"/>
-              <a:t>Stakeholders:</a:t>
-            </a:r>
-            <a:r>
-              <a:rPr lang="en-US" dirty="0"/>
-              <a:t> TBD – who else benefits from the system and in what way (auto manufacturers, insurance companies, family members, </a:t>
-            </a:r>
-            <a:r>
-              <a:rPr lang="en-US" dirty="0" err="1"/>
-              <a:t>etc</a:t>
-            </a:r>
-            <a:r>
-              <a:rPr lang="en-US" dirty="0"/>
-              <a:t>).</a:t>
-            </a:r>
-          </a:p>
-          <a:p>
-            <a:r>
-              <a:rPr lang="en-US" b="1" u="sng" dirty="0"/>
-              <a:t>Impact:</a:t>
-            </a:r>
-            <a:r>
-              <a:rPr lang="en-US" dirty="0"/>
-              <a:t> TBD – estimate an impact based on a baseline estimate of the number of collisions due to speeding, lane departure and obstacle interactions.</a:t>
-            </a:r>
+              <a:t> TBD – describe how the software should be internally partitioned to allow for multiple, simultaneous development and verification activities</a:t>
+            </a:r>
+          </a:p>
+          <a:p>
+            <a:r>
+              <a:rPr lang="en-US" b="1" u="sng" dirty="0" smtClean="0"/>
+              <a:t>Functions the system performs:</a:t>
+            </a:r>
+            <a:endParaRPr lang="en-US" dirty="0" smtClean="0"/>
+          </a:p>
+          <a:p>
+            <a:pPr lvl="1"/>
+            <a:r>
+              <a:rPr lang="en-US" dirty="0" smtClean="0"/>
+              <a:t>Object identification: The system identifies objects of interest in the picture frame</a:t>
+            </a:r>
+          </a:p>
+          <a:p>
+            <a:pPr lvl="1"/>
+            <a:r>
+              <a:rPr lang="en-US" dirty="0" smtClean="0"/>
+              <a:t>Object recognition: Once an object is identified, the system classifies it</a:t>
+            </a:r>
+          </a:p>
+          <a:p>
+            <a:pPr lvl="1"/>
+            <a:r>
+              <a:rPr lang="en-US" dirty="0" smtClean="0"/>
+              <a:t>Notification: When a significant object (or event) is confirmed, notify the driver</a:t>
+            </a:r>
+          </a:p>
+          <a:p>
+            <a:r>
+              <a:rPr lang="en-US" b="1" u="sng" dirty="0" smtClean="0"/>
+              <a:t>TBD Details on each independent function:</a:t>
+            </a:r>
+            <a:r>
+              <a:rPr lang="en-US" dirty="0" smtClean="0"/>
+              <a:t> TBD</a:t>
+            </a:r>
+            <a:endParaRPr lang="en-US" dirty="0"/>
           </a:p>
         </p:txBody>
       </p:sp>
     </p:spTree>
     <p:extLst>
       <p:ext uri="{BB962C8B-B14F-4D97-AF65-F5344CB8AC3E}">
-        <p14:creationId xmlns:p14="http://schemas.microsoft.com/office/powerpoint/2010/main" val="3021528429"/>
+        <p14:creationId xmlns:p14="http://schemas.microsoft.com/office/powerpoint/2010/main" val="768445796"/>
       </p:ext>
     </p:extLst>
   </p:cSld>
@@ -13115,7 +13134,7 @@
           <p:cNvPr id="2" name="Title 1">
             <a:extLst>
               <a:ext uri="{FF2B5EF4-FFF2-40B4-BE49-F238E27FC236}">
-                <a16:creationId xmlns:a16="http://schemas.microsoft.com/office/drawing/2014/main" xmlns="" id="{F1B978BA-83B7-49DD-AA89-E0B2140251EF}"/>
+                <a16:creationId xmlns="" xmlns:a16="http://schemas.microsoft.com/office/drawing/2014/main" id="{9A49EC41-9B0B-40CB-9E1E-85D4384B9E7A}"/>
               </a:ext>
             </a:extLst>
           </p:cNvPr>
@@ -13133,7 +13152,7 @@
           <a:p>
             <a:r>
               <a:rPr lang="en-US" dirty="0"/>
-              <a:t>Risks and challenges</a:t>
+              <a:t>Stakeholders, customers and impact</a:t>
             </a:r>
           </a:p>
         </p:txBody>
@@ -13143,7 +13162,7 @@
           <p:cNvPr id="3" name="Content Placeholder 2">
             <a:extLst>
               <a:ext uri="{FF2B5EF4-FFF2-40B4-BE49-F238E27FC236}">
-                <a16:creationId xmlns:a16="http://schemas.microsoft.com/office/drawing/2014/main" xmlns="" id="{1F59F962-AF4D-410A-B933-7A6CEB775654}"/>
+                <a16:creationId xmlns="" xmlns:a16="http://schemas.microsoft.com/office/drawing/2014/main" id="{A022F38E-8C72-47DE-836C-4A96E047F639}"/>
               </a:ext>
             </a:extLst>
           </p:cNvPr>
@@ -13161,31 +13180,39 @@
           <a:p>
             <a:r>
               <a:rPr lang="en-US" b="1" u="sng" dirty="0"/>
-              <a:t>New platform: </a:t>
+              <a:t>Customers:</a:t>
             </a:r>
             <a:r>
               <a:rPr lang="en-US" dirty="0"/>
-              <a:t>team needs to learn and use the Raspberry Pi, Python and computer vision algorithms</a:t>
+              <a:t> TBD – identify and describe the customers who will benefit from the system, and what benefits they may achieve.</a:t>
             </a:r>
           </a:p>
           <a:p>
             <a:r>
               <a:rPr lang="en-US" b="1" u="sng" dirty="0"/>
-              <a:t>Performance:</a:t>
+              <a:t>Stakeholders:</a:t>
             </a:r>
             <a:r>
               <a:rPr lang="en-US" dirty="0"/>
-              <a:t> does the Raspberry Pi provide enough performance to support this application?</a:t>
+              <a:t> TBD – who else benefits from the system and in what way (auto manufacturers, insurance companies, family members, </a:t>
+            </a:r>
+            <a:r>
+              <a:rPr lang="en-US" dirty="0" err="1"/>
+              <a:t>etc</a:t>
+            </a:r>
+            <a:r>
+              <a:rPr lang="en-US" dirty="0"/>
+              <a:t>).</a:t>
             </a:r>
           </a:p>
           <a:p>
             <a:r>
               <a:rPr lang="en-US" b="1" u="sng" dirty="0"/>
-              <a:t>Time:</a:t>
+              <a:t>Impact:</a:t>
             </a:r>
             <a:r>
               <a:rPr lang="en-US" dirty="0"/>
-              <a:t> is there enough time in the 13 week semester to complete a significant portion of the project?</a:t>
+              <a:t> TBD – estimate an impact based on a baseline estimate of the number of collisions due to speeding, lane departure and obstacle interactions.</a:t>
             </a:r>
           </a:p>
         </p:txBody>
@@ -13193,7 +13220,7 @@
     </p:spTree>
     <p:extLst>
       <p:ext uri="{BB962C8B-B14F-4D97-AF65-F5344CB8AC3E}">
-        <p14:creationId xmlns:p14="http://schemas.microsoft.com/office/powerpoint/2010/main" val="2158126652"/>
+        <p14:creationId xmlns:p14="http://schemas.microsoft.com/office/powerpoint/2010/main" val="3021528429"/>
       </p:ext>
     </p:extLst>
   </p:cSld>
@@ -13225,7 +13252,7 @@
           <p:cNvPr id="2" name="Title 1">
             <a:extLst>
               <a:ext uri="{FF2B5EF4-FFF2-40B4-BE49-F238E27FC236}">
-                <a16:creationId xmlns:a16="http://schemas.microsoft.com/office/drawing/2014/main" xmlns="" id="{F1B978BA-83B7-49DD-AA89-E0B2140251EF}"/>
+                <a16:creationId xmlns="" xmlns:a16="http://schemas.microsoft.com/office/drawing/2014/main" id="{F1B978BA-83B7-49DD-AA89-E0B2140251EF}"/>
               </a:ext>
             </a:extLst>
           </p:cNvPr>
@@ -13242,10 +13269,9 @@
           <a:lstStyle/>
           <a:p>
             <a:r>
-              <a:rPr lang="en-US" dirty="0" smtClean="0"/>
-              <a:t>Team Interactions</a:t>
-            </a:r>
-            <a:endParaRPr lang="en-US" dirty="0"/>
+              <a:rPr lang="en-US" dirty="0"/>
+              <a:t>Risks and challenges</a:t>
+            </a:r>
           </a:p>
         </p:txBody>
       </p:sp>
@@ -13254,7 +13280,118 @@
           <p:cNvPr id="3" name="Content Placeholder 2">
             <a:extLst>
               <a:ext uri="{FF2B5EF4-FFF2-40B4-BE49-F238E27FC236}">
-                <a16:creationId xmlns:a16="http://schemas.microsoft.com/office/drawing/2014/main" xmlns="" id="{1F59F962-AF4D-410A-B933-7A6CEB775654}"/>
+                <a16:creationId xmlns="" xmlns:a16="http://schemas.microsoft.com/office/drawing/2014/main" id="{1F59F962-AF4D-410A-B933-7A6CEB775654}"/>
+              </a:ext>
+            </a:extLst>
+          </p:cNvPr>
+          <p:cNvSpPr>
+            <a:spLocks noGrp="1"/>
+          </p:cNvSpPr>
+          <p:nvPr>
+            <p:ph idx="1"/>
+          </p:nvPr>
+        </p:nvSpPr>
+        <p:spPr/>
+        <p:txBody>
+          <a:bodyPr/>
+          <a:lstStyle/>
+          <a:p>
+            <a:r>
+              <a:rPr lang="en-US" b="1" u="sng" dirty="0"/>
+              <a:t>New platform: </a:t>
+            </a:r>
+            <a:r>
+              <a:rPr lang="en-US" dirty="0"/>
+              <a:t>team needs to learn and use the Raspberry Pi, Python and computer vision algorithms</a:t>
+            </a:r>
+          </a:p>
+          <a:p>
+            <a:r>
+              <a:rPr lang="en-US" b="1" u="sng" dirty="0"/>
+              <a:t>Performance:</a:t>
+            </a:r>
+            <a:r>
+              <a:rPr lang="en-US" dirty="0"/>
+              <a:t> does the Raspberry Pi provide enough performance to support this application?</a:t>
+            </a:r>
+          </a:p>
+          <a:p>
+            <a:r>
+              <a:rPr lang="en-US" b="1" u="sng" dirty="0"/>
+              <a:t>Time:</a:t>
+            </a:r>
+            <a:r>
+              <a:rPr lang="en-US" dirty="0"/>
+              <a:t> is there enough time in the 13 week semester to complete a significant portion of the project?</a:t>
+            </a:r>
+          </a:p>
+        </p:txBody>
+      </p:sp>
+    </p:spTree>
+    <p:extLst>
+      <p:ext uri="{BB962C8B-B14F-4D97-AF65-F5344CB8AC3E}">
+        <p14:creationId xmlns:p14="http://schemas.microsoft.com/office/powerpoint/2010/main" val="2158126652"/>
+      </p:ext>
+    </p:extLst>
+  </p:cSld>
+  <p:clrMapOvr>
+    <a:masterClrMapping/>
+  </p:clrMapOvr>
+</p:sld>
+</file>
+
+<file path=ppt/slides/slide9.xml><?xml version="1.0" encoding="utf-8"?>
+<p:sld xmlns:a="http://schemas.openxmlformats.org/drawingml/2006/main" xmlns:r="http://schemas.openxmlformats.org/officeDocument/2006/relationships" xmlns:p="http://schemas.openxmlformats.org/presentationml/2006/main">
+  <p:cSld>
+    <p:spTree>
+      <p:nvGrpSpPr>
+        <p:cNvPr id="1" name=""/>
+        <p:cNvGrpSpPr/>
+        <p:nvPr/>
+      </p:nvGrpSpPr>
+      <p:grpSpPr>
+        <a:xfrm>
+          <a:off x="0" y="0"/>
+          <a:ext cx="0" cy="0"/>
+          <a:chOff x="0" y="0"/>
+          <a:chExt cx="0" cy="0"/>
+        </a:xfrm>
+      </p:grpSpPr>
+      <p:sp>
+        <p:nvSpPr>
+          <p:cNvPr id="2" name="Title 1">
+            <a:extLst>
+              <a:ext uri="{FF2B5EF4-FFF2-40B4-BE49-F238E27FC236}">
+                <a16:creationId xmlns="" xmlns:a16="http://schemas.microsoft.com/office/drawing/2014/main" id="{F1B978BA-83B7-49DD-AA89-E0B2140251EF}"/>
+              </a:ext>
+            </a:extLst>
+          </p:cNvPr>
+          <p:cNvSpPr>
+            <a:spLocks noGrp="1"/>
+          </p:cNvSpPr>
+          <p:nvPr>
+            <p:ph type="title"/>
+          </p:nvPr>
+        </p:nvSpPr>
+        <p:spPr/>
+        <p:txBody>
+          <a:bodyPr/>
+          <a:lstStyle/>
+          <a:p>
+            <a:r>
+              <a:rPr lang="en-US" dirty="0" smtClean="0"/>
+              <a:t>Team Interactions</a:t>
+            </a:r>
+            <a:endParaRPr lang="en-US" dirty="0"/>
+          </a:p>
+        </p:txBody>
+      </p:sp>
+      <p:sp>
+        <p:nvSpPr>
+          <p:cNvPr id="3" name="Content Placeholder 2">
+            <a:extLst>
+              <a:ext uri="{FF2B5EF4-FFF2-40B4-BE49-F238E27FC236}">
+                <a16:creationId xmlns="" xmlns:a16="http://schemas.microsoft.com/office/drawing/2014/main" id="{1F59F962-AF4D-410A-B933-7A6CEB775654}"/>
               </a:ext>
             </a:extLst>
           </p:cNvPr>
@@ -13625,7 +13762,7 @@
   <a:extraClrSchemeLst/>
   <a:extLst>
     <a:ext uri="{05A4C25C-085E-4340-85A3-A5531E510DB2}">
-      <thm15:themeFamily xmlns:thm15="http://schemas.microsoft.com/office/thememl/2012/main" xmlns="" name="Circuit" id="{0AC2F7E7-15F5-431C-B2A2-456FE929F56C}" vid="{0911B802-464C-4241-8DD9-B60FF88E379F}"/>
+      <thm15:themeFamily xmlns="" xmlns:thm15="http://schemas.microsoft.com/office/thememl/2012/main" name="Circuit" id="{0AC2F7E7-15F5-431C-B2A2-456FE929F56C}" vid="{0911B802-464C-4241-8DD9-B60FF88E379F}"/>
     </a:ext>
   </a:extLst>
 </a:theme>

</xml_diff>

<commit_message>
Start working in Issue #5
</commit_message>
<xml_diff>
--- a/docs/Presentations/Computer Vision Driving Aids Project Overview.pptx
+++ b/docs/Presentations/Computer Vision Driving Aids Project Overview.pptx
@@ -11,9 +11,10 @@
     <p:sldId id="261" r:id="rId5"/>
     <p:sldId id="259" r:id="rId6"/>
     <p:sldId id="264" r:id="rId7"/>
-    <p:sldId id="260" r:id="rId8"/>
-    <p:sldId id="262" r:id="rId9"/>
-    <p:sldId id="263" r:id="rId10"/>
+    <p:sldId id="265" r:id="rId8"/>
+    <p:sldId id="260" r:id="rId9"/>
+    <p:sldId id="262" r:id="rId10"/>
+    <p:sldId id="263" r:id="rId11"/>
   </p:sldIdLst>
   <p:sldSz cx="12192000" cy="6858000"/>
   <p:notesSz cx="6858000" cy="9144000"/>
@@ -12378,7 +12379,7 @@
           <p:cNvPr id="2" name="Title 1">
             <a:extLst>
               <a:ext uri="{FF2B5EF4-FFF2-40B4-BE49-F238E27FC236}">
-                <a16:creationId xmlns="" xmlns:a16="http://schemas.microsoft.com/office/drawing/2014/main" id="{78629773-1F2F-4DEA-A804-323B3E4F7636}"/>
+                <a16:creationId xmlns:a16="http://schemas.microsoft.com/office/drawing/2014/main" xmlns="" id="{78629773-1F2F-4DEA-A804-323B3E4F7636}"/>
               </a:ext>
             </a:extLst>
           </p:cNvPr>
@@ -12406,7 +12407,7 @@
           <p:cNvPr id="3" name="Subtitle 2">
             <a:extLst>
               <a:ext uri="{FF2B5EF4-FFF2-40B4-BE49-F238E27FC236}">
-                <a16:creationId xmlns="" xmlns:a16="http://schemas.microsoft.com/office/drawing/2014/main" id="{236AD9E0-AFB8-49D5-852F-5BFFF4F9DA95}"/>
+                <a16:creationId xmlns:a16="http://schemas.microsoft.com/office/drawing/2014/main" xmlns="" id="{236AD9E0-AFB8-49D5-852F-5BFFF4F9DA95}"/>
               </a:ext>
             </a:extLst>
           </p:cNvPr>
@@ -12457,6 +12458,190 @@
     <p:extLst>
       <p:ext uri="{BB962C8B-B14F-4D97-AF65-F5344CB8AC3E}">
         <p14:creationId xmlns:p14="http://schemas.microsoft.com/office/powerpoint/2010/main" val="3241863393"/>
+      </p:ext>
+    </p:extLst>
+  </p:cSld>
+  <p:clrMapOvr>
+    <a:masterClrMapping/>
+  </p:clrMapOvr>
+  <p:timing>
+    <p:tnLst>
+      <p:par>
+        <p:cTn id="1" dur="indefinite" restart="never" nodeType="tmRoot"/>
+      </p:par>
+    </p:tnLst>
+  </p:timing>
+</p:sld>
+</file>
+
+<file path=ppt/slides/slide10.xml><?xml version="1.0" encoding="utf-8"?>
+<p:sld xmlns:a="http://schemas.openxmlformats.org/drawingml/2006/main" xmlns:r="http://schemas.openxmlformats.org/officeDocument/2006/relationships" xmlns:p="http://schemas.openxmlformats.org/presentationml/2006/main">
+  <p:cSld>
+    <p:spTree>
+      <p:nvGrpSpPr>
+        <p:cNvPr id="1" name=""/>
+        <p:cNvGrpSpPr/>
+        <p:nvPr/>
+      </p:nvGrpSpPr>
+      <p:grpSpPr>
+        <a:xfrm>
+          <a:off x="0" y="0"/>
+          <a:ext cx="0" cy="0"/>
+          <a:chOff x="0" y="0"/>
+          <a:chExt cx="0" cy="0"/>
+        </a:xfrm>
+      </p:grpSpPr>
+      <p:sp>
+        <p:nvSpPr>
+          <p:cNvPr id="2" name="Title 1">
+            <a:extLst>
+              <a:ext uri="{FF2B5EF4-FFF2-40B4-BE49-F238E27FC236}">
+                <a16:creationId xmlns:a16="http://schemas.microsoft.com/office/drawing/2014/main" xmlns="" id="{F1B978BA-83B7-49DD-AA89-E0B2140251EF}"/>
+              </a:ext>
+            </a:extLst>
+          </p:cNvPr>
+          <p:cNvSpPr>
+            <a:spLocks noGrp="1"/>
+          </p:cNvSpPr>
+          <p:nvPr>
+            <p:ph type="title"/>
+          </p:nvPr>
+        </p:nvSpPr>
+        <p:spPr/>
+        <p:txBody>
+          <a:bodyPr/>
+          <a:lstStyle/>
+          <a:p>
+            <a:r>
+              <a:rPr lang="en-US" dirty="0" smtClean="0"/>
+              <a:t>Team Interactions</a:t>
+            </a:r>
+            <a:endParaRPr lang="en-US" dirty="0"/>
+          </a:p>
+        </p:txBody>
+      </p:sp>
+      <p:sp>
+        <p:nvSpPr>
+          <p:cNvPr id="3" name="Content Placeholder 2">
+            <a:extLst>
+              <a:ext uri="{FF2B5EF4-FFF2-40B4-BE49-F238E27FC236}">
+                <a16:creationId xmlns:a16="http://schemas.microsoft.com/office/drawing/2014/main" xmlns="" id="{1F59F962-AF4D-410A-B933-7A6CEB775654}"/>
+              </a:ext>
+            </a:extLst>
+          </p:cNvPr>
+          <p:cNvSpPr>
+            <a:spLocks noGrp="1"/>
+          </p:cNvSpPr>
+          <p:nvPr>
+            <p:ph idx="1"/>
+          </p:nvPr>
+        </p:nvSpPr>
+        <p:spPr/>
+        <p:txBody>
+          <a:bodyPr>
+            <a:normAutofit/>
+          </a:bodyPr>
+          <a:lstStyle/>
+          <a:p>
+            <a:r>
+              <a:rPr lang="en-US" b="1" u="sng" dirty="0" smtClean="0"/>
+              <a:t>Team Meetings:</a:t>
+            </a:r>
+          </a:p>
+          <a:p>
+            <a:pPr lvl="1"/>
+            <a:r>
+              <a:rPr lang="en-US" dirty="0" smtClean="0"/>
+              <a:t>Regular </a:t>
+            </a:r>
+            <a:r>
+              <a:rPr lang="en-US" dirty="0"/>
+              <a:t>team meetings on Thursdays 7:00 - 9:00 PM </a:t>
+            </a:r>
+            <a:r>
+              <a:rPr lang="en-US" dirty="0" smtClean="0"/>
+              <a:t>Eastern</a:t>
+            </a:r>
+          </a:p>
+          <a:p>
+            <a:pPr lvl="1"/>
+            <a:r>
+              <a:rPr lang="en-US" dirty="0"/>
+              <a:t>Shorter "stand-up" meetings on Sundays 7:00 - 7:30 PM Eastern</a:t>
+            </a:r>
+            <a:endParaRPr lang="en-US" dirty="0" smtClean="0"/>
+          </a:p>
+          <a:p>
+            <a:r>
+              <a:rPr lang="en-US" b="1" u="sng" dirty="0" smtClean="0"/>
+              <a:t>Meeting room:</a:t>
+            </a:r>
+            <a:r>
+              <a:rPr lang="en-US" dirty="0"/>
+              <a:t> SSW690 Google Meet room provided by Prof. </a:t>
+            </a:r>
+            <a:r>
+              <a:rPr lang="en-US" dirty="0" smtClean="0"/>
+              <a:t>Rowland</a:t>
+            </a:r>
+          </a:p>
+          <a:p>
+            <a:pPr lvl="1"/>
+            <a:r>
+              <a:rPr lang="en-US" dirty="0" err="1"/>
+              <a:t>Whatsapp</a:t>
+            </a:r>
+            <a:r>
+              <a:rPr lang="en-US" dirty="0"/>
+              <a:t> for messaging in between </a:t>
+            </a:r>
+            <a:r>
+              <a:rPr lang="en-US" dirty="0" smtClean="0"/>
+              <a:t>meetings</a:t>
+            </a:r>
+          </a:p>
+          <a:p>
+            <a:pPr lvl="1"/>
+            <a:r>
+              <a:rPr lang="en-US" dirty="0" smtClean="0"/>
+              <a:t>Email for longer messages</a:t>
+            </a:r>
+          </a:p>
+          <a:p>
+            <a:r>
+              <a:rPr lang="en-US" b="1" u="sng" dirty="0" smtClean="0"/>
+              <a:t>GitHub repository:</a:t>
+            </a:r>
+            <a:r>
+              <a:rPr lang="en-US" dirty="0"/>
+              <a:t> </a:t>
+            </a:r>
+            <a:r>
+              <a:rPr lang="en-US" dirty="0">
+                <a:hlinkClick r:id="rId2"/>
+              </a:rPr>
+              <a:t>https</a:t>
+            </a:r>
+            <a:r>
+              <a:rPr lang="en-US">
+                <a:hlinkClick r:id="rId2"/>
+              </a:rPr>
+              <a:t>://</a:t>
+            </a:r>
+            <a:r>
+              <a:rPr lang="en-US" smtClean="0">
+                <a:hlinkClick r:id="rId2"/>
+              </a:rPr>
+              <a:t>github.com/Scarabyte/SSW690-Project</a:t>
+            </a:r>
+            <a:endParaRPr lang="en-US" dirty="0"/>
+          </a:p>
+        </p:txBody>
+      </p:sp>
+    </p:spTree>
+    <p:extLst>
+      <p:ext uri="{BB962C8B-B14F-4D97-AF65-F5344CB8AC3E}">
+        <p14:creationId xmlns:p14="http://schemas.microsoft.com/office/powerpoint/2010/main" val="1643930476"/>
       </p:ext>
     </p:extLst>
   </p:cSld>
@@ -12488,7 +12673,7 @@
           <p:cNvPr id="2" name="Title 1">
             <a:extLst>
               <a:ext uri="{FF2B5EF4-FFF2-40B4-BE49-F238E27FC236}">
-                <a16:creationId xmlns="" xmlns:a16="http://schemas.microsoft.com/office/drawing/2014/main" id="{5F163758-F730-4FFD-9F9E-F0FC8CDDB240}"/>
+                <a16:creationId xmlns:a16="http://schemas.microsoft.com/office/drawing/2014/main" xmlns="" id="{5F163758-F730-4FFD-9F9E-F0FC8CDDB240}"/>
               </a:ext>
             </a:extLst>
           </p:cNvPr>
@@ -12516,7 +12701,7 @@
           <p:cNvPr id="3" name="Content Placeholder 2">
             <a:extLst>
               <a:ext uri="{FF2B5EF4-FFF2-40B4-BE49-F238E27FC236}">
-                <a16:creationId xmlns="" xmlns:a16="http://schemas.microsoft.com/office/drawing/2014/main" id="{C5EBD364-4FCA-4AC5-A62F-1E06EC8240DE}"/>
+                <a16:creationId xmlns:a16="http://schemas.microsoft.com/office/drawing/2014/main" xmlns="" id="{C5EBD364-4FCA-4AC5-A62F-1E06EC8240DE}"/>
               </a:ext>
             </a:extLst>
           </p:cNvPr>
@@ -12629,6 +12814,13 @@
   <p:clrMapOvr>
     <a:masterClrMapping/>
   </p:clrMapOvr>
+  <p:timing>
+    <p:tnLst>
+      <p:par>
+        <p:cTn id="1" dur="indefinite" restart="never" nodeType="tmRoot"/>
+      </p:par>
+    </p:tnLst>
+  </p:timing>
 </p:sld>
 </file>
 
@@ -12654,7 +12846,7 @@
           <p:cNvPr id="2" name="Title 1">
             <a:extLst>
               <a:ext uri="{FF2B5EF4-FFF2-40B4-BE49-F238E27FC236}">
-                <a16:creationId xmlns="" xmlns:a16="http://schemas.microsoft.com/office/drawing/2014/main" id="{948A0E38-AB97-4175-B372-9627013E206C}"/>
+                <a16:creationId xmlns:a16="http://schemas.microsoft.com/office/drawing/2014/main" xmlns="" id="{948A0E38-AB97-4175-B372-9627013E206C}"/>
               </a:ext>
             </a:extLst>
           </p:cNvPr>
@@ -12682,7 +12874,7 @@
           <p:cNvPr id="3" name="Content Placeholder 2">
             <a:extLst>
               <a:ext uri="{FF2B5EF4-FFF2-40B4-BE49-F238E27FC236}">
-                <a16:creationId xmlns="" xmlns:a16="http://schemas.microsoft.com/office/drawing/2014/main" id="{1CAB4BB1-33CD-4BB7-BA3A-A13ECB37D4A2}"/>
+                <a16:creationId xmlns:a16="http://schemas.microsoft.com/office/drawing/2014/main" xmlns="" id="{1CAB4BB1-33CD-4BB7-BA3A-A13ECB37D4A2}"/>
               </a:ext>
             </a:extLst>
           </p:cNvPr>
@@ -12748,6 +12940,13 @@
   <p:clrMapOvr>
     <a:masterClrMapping/>
   </p:clrMapOvr>
+  <p:timing>
+    <p:tnLst>
+      <p:par>
+        <p:cTn id="1" dur="indefinite" restart="never" nodeType="tmRoot"/>
+      </p:par>
+    </p:tnLst>
+  </p:timing>
 </p:sld>
 </file>
 
@@ -12773,7 +12972,7 @@
           <p:cNvPr id="2" name="Title 1">
             <a:extLst>
               <a:ext uri="{FF2B5EF4-FFF2-40B4-BE49-F238E27FC236}">
-                <a16:creationId xmlns="" xmlns:a16="http://schemas.microsoft.com/office/drawing/2014/main" id="{B0E04909-FB5A-4AD9-BC1D-52CB8571C410}"/>
+                <a16:creationId xmlns:a16="http://schemas.microsoft.com/office/drawing/2014/main" xmlns="" id="{B0E04909-FB5A-4AD9-BC1D-52CB8571C410}"/>
               </a:ext>
             </a:extLst>
           </p:cNvPr>
@@ -12801,7 +13000,7 @@
           <p:cNvPr id="3" name="Content Placeholder 2">
             <a:extLst>
               <a:ext uri="{FF2B5EF4-FFF2-40B4-BE49-F238E27FC236}">
-                <a16:creationId xmlns="" xmlns:a16="http://schemas.microsoft.com/office/drawing/2014/main" id="{F022C534-5EBE-4C81-B23F-D7B5EA62880D}"/>
+                <a16:creationId xmlns:a16="http://schemas.microsoft.com/office/drawing/2014/main" xmlns="" id="{F022C534-5EBE-4C81-B23F-D7B5EA62880D}"/>
               </a:ext>
             </a:extLst>
           </p:cNvPr>
@@ -12834,6 +13033,13 @@
   <p:clrMapOvr>
     <a:masterClrMapping/>
   </p:clrMapOvr>
+  <p:timing>
+    <p:tnLst>
+      <p:par>
+        <p:cTn id="1" dur="indefinite" restart="never" nodeType="tmRoot"/>
+      </p:par>
+    </p:tnLst>
+  </p:timing>
 </p:sld>
 </file>
 
@@ -12859,7 +13065,7 @@
           <p:cNvPr id="2" name="Title 1">
             <a:extLst>
               <a:ext uri="{FF2B5EF4-FFF2-40B4-BE49-F238E27FC236}">
-                <a16:creationId xmlns="" xmlns:a16="http://schemas.microsoft.com/office/drawing/2014/main" id="{30E1123C-963D-45A1-979B-3FACC9F01257}"/>
+                <a16:creationId xmlns:a16="http://schemas.microsoft.com/office/drawing/2014/main" xmlns="" id="{30E1123C-963D-45A1-979B-3FACC9F01257}"/>
               </a:ext>
             </a:extLst>
           </p:cNvPr>
@@ -12894,7 +13100,7 @@
           <p:cNvPr id="3" name="Content Placeholder 2">
             <a:extLst>
               <a:ext uri="{FF2B5EF4-FFF2-40B4-BE49-F238E27FC236}">
-                <a16:creationId xmlns="" xmlns:a16="http://schemas.microsoft.com/office/drawing/2014/main" id="{B9A684A9-BC2F-4302-BF2F-FFE0E47DB328}"/>
+                <a16:creationId xmlns:a16="http://schemas.microsoft.com/office/drawing/2014/main" xmlns="" id="{B9A684A9-BC2F-4302-BF2F-FFE0E47DB328}"/>
               </a:ext>
             </a:extLst>
           </p:cNvPr>
@@ -12973,6 +13179,13 @@
   <p:clrMapOvr>
     <a:masterClrMapping/>
   </p:clrMapOvr>
+  <p:timing>
+    <p:tnLst>
+      <p:par>
+        <p:cTn id="1" dur="indefinite" restart="never" nodeType="tmRoot"/>
+      </p:par>
+    </p:tnLst>
+  </p:timing>
 </p:sld>
 </file>
 
@@ -12998,7 +13211,7 @@
           <p:cNvPr id="2" name="Title 1">
             <a:extLst>
               <a:ext uri="{FF2B5EF4-FFF2-40B4-BE49-F238E27FC236}">
-                <a16:creationId xmlns="" xmlns:a16="http://schemas.microsoft.com/office/drawing/2014/main" id="{30E1123C-963D-45A1-979B-3FACC9F01257}"/>
+                <a16:creationId xmlns:a16="http://schemas.microsoft.com/office/drawing/2014/main" xmlns="" id="{30E1123C-963D-45A1-979B-3FACC9F01257}"/>
               </a:ext>
             </a:extLst>
           </p:cNvPr>
@@ -13027,7 +13240,7 @@
           <p:cNvPr id="3" name="Content Placeholder 2">
             <a:extLst>
               <a:ext uri="{FF2B5EF4-FFF2-40B4-BE49-F238E27FC236}">
-                <a16:creationId xmlns="" xmlns:a16="http://schemas.microsoft.com/office/drawing/2014/main" id="{B9A684A9-BC2F-4302-BF2F-FFE0E47DB328}"/>
+                <a16:creationId xmlns:a16="http://schemas.microsoft.com/office/drawing/2014/main" xmlns="" id="{B9A684A9-BC2F-4302-BF2F-FFE0E47DB328}"/>
               </a:ext>
             </a:extLst>
           </p:cNvPr>
@@ -13089,7 +13302,15 @@
           <a:p>
             <a:r>
               <a:rPr lang="en-US" b="1" u="sng" dirty="0" smtClean="0"/>
-              <a:t>TBD Details on each independent function:</a:t>
+              <a:t>TBD Details </a:t>
+            </a:r>
+            <a:r>
+              <a:rPr lang="en-US" b="1" u="sng" dirty="0" smtClean="0"/>
+              <a:t>of </a:t>
+            </a:r>
+            <a:r>
+              <a:rPr lang="en-US" b="1" u="sng" dirty="0" smtClean="0"/>
+              <a:t>each independent function:</a:t>
             </a:r>
             <a:r>
               <a:rPr lang="en-US" dirty="0" smtClean="0"/>
@@ -13109,6 +13330,13 @@
   <p:clrMapOvr>
     <a:masterClrMapping/>
   </p:clrMapOvr>
+  <p:timing>
+    <p:tnLst>
+      <p:par>
+        <p:cTn id="1" dur="indefinite" restart="never" nodeType="tmRoot"/>
+      </p:par>
+    </p:tnLst>
+  </p:timing>
 </p:sld>
 </file>
 
@@ -13134,7 +13362,7 @@
           <p:cNvPr id="2" name="Title 1">
             <a:extLst>
               <a:ext uri="{FF2B5EF4-FFF2-40B4-BE49-F238E27FC236}">
-                <a16:creationId xmlns="" xmlns:a16="http://schemas.microsoft.com/office/drawing/2014/main" id="{9A49EC41-9B0B-40CB-9E1E-85D4384B9E7A}"/>
+                <a16:creationId xmlns:a16="http://schemas.microsoft.com/office/drawing/2014/main" xmlns="" id="{30E1123C-963D-45A1-979B-3FACC9F01257}"/>
               </a:ext>
             </a:extLst>
           </p:cNvPr>
@@ -13151,9 +13379,10 @@
           <a:lstStyle/>
           <a:p>
             <a:r>
-              <a:rPr lang="en-US" dirty="0"/>
-              <a:t>Stakeholders, customers and impact</a:t>
-            </a:r>
+              <a:rPr lang="en-US" dirty="0" smtClean="0"/>
+              <a:t>Performance</a:t>
+            </a:r>
+            <a:endParaRPr lang="en-US" dirty="0"/>
           </a:p>
         </p:txBody>
       </p:sp>
@@ -13162,7 +13391,7 @@
           <p:cNvPr id="3" name="Content Placeholder 2">
             <a:extLst>
               <a:ext uri="{FF2B5EF4-FFF2-40B4-BE49-F238E27FC236}">
-                <a16:creationId xmlns="" xmlns:a16="http://schemas.microsoft.com/office/drawing/2014/main" id="{A022F38E-8C72-47DE-836C-4A96E047F639}"/>
+                <a16:creationId xmlns:a16="http://schemas.microsoft.com/office/drawing/2014/main" xmlns="" id="{B9A684A9-BC2F-4302-BF2F-FFE0E47DB328}"/>
               </a:ext>
             </a:extLst>
           </p:cNvPr>
@@ -13173,60 +13402,189 @@
             <p:ph idx="1"/>
           </p:nvPr>
         </p:nvSpPr>
-        <p:spPr/>
+        <p:spPr>
+          <a:xfrm>
+            <a:off x="1141412" y="1941534"/>
+            <a:ext cx="9905999" cy="4308953"/>
+          </a:xfrm>
+        </p:spPr>
         <p:txBody>
-          <a:bodyPr/>
+          <a:bodyPr>
+            <a:normAutofit lnSpcReduction="10000"/>
+          </a:bodyPr>
           <a:lstStyle/>
           <a:p>
             <a:r>
               <a:rPr lang="en-US" b="1" u="sng" dirty="0"/>
-              <a:t>Customers:</a:t>
+              <a:t>Performance:</a:t>
             </a:r>
             <a:r>
               <a:rPr lang="en-US" dirty="0"/>
-              <a:t> TBD – identify and describe the customers who will benefit from the system, and what benefits they may achieve.</a:t>
-            </a:r>
-          </a:p>
-          <a:p>
-            <a:r>
-              <a:rPr lang="en-US" b="1" u="sng" dirty="0"/>
-              <a:t>Stakeholders:</a:t>
+              <a:t> TBD – describe </a:t>
+            </a:r>
+            <a:r>
+              <a:rPr lang="en-US" dirty="0" smtClean="0"/>
+              <a:t>performance </a:t>
             </a:r>
             <a:r>
               <a:rPr lang="en-US" dirty="0"/>
-              <a:t> TBD – who else benefits from the system and in what way (auto manufacturers, insurance companies, family members, </a:t>
-            </a:r>
-            <a:r>
-              <a:rPr lang="en-US" dirty="0" err="1"/>
-              <a:t>etc</a:t>
+              <a:t>characteristics that must be </a:t>
+            </a:r>
+            <a:r>
+              <a:rPr lang="en-US" dirty="0" smtClean="0"/>
+              <a:t>achieved</a:t>
+            </a:r>
+            <a:endParaRPr lang="en-US" dirty="0"/>
+          </a:p>
+          <a:p>
+            <a:r>
+              <a:rPr lang="en-US" b="1" u="sng" dirty="0" smtClean="0"/>
+              <a:t>Needs to yield results fast enough to improve driver safety:</a:t>
+            </a:r>
+            <a:endParaRPr lang="en-US" dirty="0" smtClean="0"/>
+          </a:p>
+          <a:p>
+            <a:pPr lvl="1"/>
+            <a:r>
+              <a:rPr lang="en-US" dirty="0" smtClean="0"/>
+              <a:t>Average driver reaction brake time is </a:t>
+            </a:r>
+            <a:r>
+              <a:rPr lang="en-US" b="1" dirty="0" smtClean="0"/>
+              <a:t>2.3 seconds</a:t>
+            </a:r>
+            <a:r>
+              <a:rPr lang="en-US" dirty="0" smtClean="0"/>
+              <a:t> </a:t>
+            </a:r>
+          </a:p>
+          <a:p>
+            <a:pPr lvl="2"/>
+            <a:r>
+              <a:rPr lang="en-US" dirty="0">
+                <a:hlinkClick r:id="rId2"/>
+              </a:rPr>
+              <a:t>https://</a:t>
+            </a:r>
+            <a:r>
+              <a:rPr lang="en-US" dirty="0" smtClean="0">
+                <a:hlinkClick r:id="rId2"/>
+              </a:rPr>
+              <a:t>copradar.com/redlight/factors/index.html</a:t>
+            </a:r>
+            <a:r>
+              <a:rPr lang="en-US" dirty="0" smtClean="0"/>
+              <a:t> </a:t>
+            </a:r>
+            <a:endParaRPr lang="en-US" dirty="0" smtClean="0"/>
+          </a:p>
+          <a:p>
+            <a:pPr lvl="1"/>
+            <a:r>
+              <a:rPr lang="en-US" dirty="0" smtClean="0"/>
+              <a:t>Average </a:t>
             </a:r>
             <a:r>
               <a:rPr lang="en-US" dirty="0"/>
-              <a:t>).</a:t>
-            </a:r>
-          </a:p>
-          <a:p>
-            <a:r>
-              <a:rPr lang="en-US" b="1" u="sng" dirty="0"/>
-              <a:t>Impact:</a:t>
+              <a:t>reaction time </a:t>
+            </a:r>
+            <a:r>
+              <a:rPr lang="en-US" dirty="0" smtClean="0"/>
+              <a:t>in general:</a:t>
+            </a:r>
+          </a:p>
+          <a:p>
+            <a:pPr lvl="2"/>
+            <a:r>
+              <a:rPr lang="en-US" dirty="0" smtClean="0"/>
+              <a:t>0.25 </a:t>
             </a:r>
             <a:r>
               <a:rPr lang="en-US" dirty="0"/>
-              <a:t> TBD – estimate an impact based on a baseline estimate of the number of collisions due to speeding, lane departure and obstacle interactions.</a:t>
-            </a:r>
+              <a:t>seconds </a:t>
+            </a:r>
+            <a:r>
+              <a:rPr lang="en-US" dirty="0" smtClean="0"/>
+              <a:t>for </a:t>
+            </a:r>
+            <a:r>
+              <a:rPr lang="en-US" dirty="0"/>
+              <a:t>visual </a:t>
+            </a:r>
+            <a:r>
+              <a:rPr lang="en-US" dirty="0" smtClean="0"/>
+              <a:t>stimulus</a:t>
+            </a:r>
+          </a:p>
+          <a:p>
+            <a:pPr lvl="2"/>
+            <a:r>
+              <a:rPr lang="en-US" dirty="0" smtClean="0"/>
+              <a:t>0.17 </a:t>
+            </a:r>
+            <a:r>
+              <a:rPr lang="en-US" dirty="0"/>
+              <a:t>for </a:t>
+            </a:r>
+            <a:r>
+              <a:rPr lang="en-US" dirty="0" smtClean="0"/>
+              <a:t>audio stimulus</a:t>
+            </a:r>
+          </a:p>
+          <a:p>
+            <a:pPr lvl="2"/>
+            <a:r>
+              <a:rPr lang="en-US" dirty="0" smtClean="0"/>
+              <a:t>0.15 </a:t>
+            </a:r>
+            <a:r>
+              <a:rPr lang="en-US" dirty="0"/>
+              <a:t>seconds for </a:t>
+            </a:r>
+            <a:r>
+              <a:rPr lang="en-US" dirty="0" smtClean="0"/>
+              <a:t>touch stimulus</a:t>
+            </a:r>
+          </a:p>
+          <a:p>
+            <a:pPr lvl="2"/>
+            <a:r>
+              <a:rPr lang="en-US" dirty="0">
+                <a:hlinkClick r:id="rId3"/>
+              </a:rPr>
+              <a:t>https://</a:t>
+            </a:r>
+            <a:r>
+              <a:rPr lang="en-US" dirty="0" smtClean="0">
+                <a:hlinkClick r:id="rId3"/>
+              </a:rPr>
+              <a:t>backyardbrains.com/experiments/reactiontime</a:t>
+            </a:r>
+            <a:r>
+              <a:rPr lang="en-US" dirty="0" smtClean="0"/>
+              <a:t> </a:t>
+            </a:r>
+            <a:endParaRPr lang="en-US" dirty="0" smtClean="0"/>
           </a:p>
         </p:txBody>
       </p:sp>
     </p:spTree>
     <p:extLst>
       <p:ext uri="{BB962C8B-B14F-4D97-AF65-F5344CB8AC3E}">
-        <p14:creationId xmlns:p14="http://schemas.microsoft.com/office/powerpoint/2010/main" val="3021528429"/>
+        <p14:creationId xmlns:p14="http://schemas.microsoft.com/office/powerpoint/2010/main" val="847626995"/>
       </p:ext>
     </p:extLst>
   </p:cSld>
   <p:clrMapOvr>
     <a:masterClrMapping/>
   </p:clrMapOvr>
+  <p:timing>
+    <p:tnLst>
+      <p:par>
+        <p:cTn id="1" dur="indefinite" restart="never" nodeType="tmRoot"/>
+      </p:par>
+    </p:tnLst>
+  </p:timing>
 </p:sld>
 </file>
 
@@ -13252,7 +13610,7 @@
           <p:cNvPr id="2" name="Title 1">
             <a:extLst>
               <a:ext uri="{FF2B5EF4-FFF2-40B4-BE49-F238E27FC236}">
-                <a16:creationId xmlns="" xmlns:a16="http://schemas.microsoft.com/office/drawing/2014/main" id="{F1B978BA-83B7-49DD-AA89-E0B2140251EF}"/>
+                <a16:creationId xmlns:a16="http://schemas.microsoft.com/office/drawing/2014/main" xmlns="" id="{9A49EC41-9B0B-40CB-9E1E-85D4384B9E7A}"/>
               </a:ext>
             </a:extLst>
           </p:cNvPr>
@@ -13270,7 +13628,7 @@
           <a:p>
             <a:r>
               <a:rPr lang="en-US" dirty="0"/>
-              <a:t>Risks and challenges</a:t>
+              <a:t>Stakeholders, customers and impact</a:t>
             </a:r>
           </a:p>
         </p:txBody>
@@ -13280,7 +13638,7 @@
           <p:cNvPr id="3" name="Content Placeholder 2">
             <a:extLst>
               <a:ext uri="{FF2B5EF4-FFF2-40B4-BE49-F238E27FC236}">
-                <a16:creationId xmlns="" xmlns:a16="http://schemas.microsoft.com/office/drawing/2014/main" id="{1F59F962-AF4D-410A-B933-7A6CEB775654}"/>
+                <a16:creationId xmlns:a16="http://schemas.microsoft.com/office/drawing/2014/main" xmlns="" id="{A022F38E-8C72-47DE-836C-4A96E047F639}"/>
               </a:ext>
             </a:extLst>
           </p:cNvPr>
@@ -13298,31 +13656,39 @@
           <a:p>
             <a:r>
               <a:rPr lang="en-US" b="1" u="sng" dirty="0"/>
-              <a:t>New platform: </a:t>
+              <a:t>Customers:</a:t>
             </a:r>
             <a:r>
               <a:rPr lang="en-US" dirty="0"/>
-              <a:t>team needs to learn and use the Raspberry Pi, Python and computer vision algorithms</a:t>
+              <a:t> TBD – identify and describe the customers who will benefit from the system, and what benefits they may achieve.</a:t>
             </a:r>
           </a:p>
           <a:p>
             <a:r>
               <a:rPr lang="en-US" b="1" u="sng" dirty="0"/>
-              <a:t>Performance:</a:t>
+              <a:t>Stakeholders:</a:t>
             </a:r>
             <a:r>
               <a:rPr lang="en-US" dirty="0"/>
-              <a:t> does the Raspberry Pi provide enough performance to support this application?</a:t>
+              <a:t> TBD – who else benefits from the system and in what way (auto manufacturers, insurance companies, family members, </a:t>
+            </a:r>
+            <a:r>
+              <a:rPr lang="en-US" dirty="0" err="1"/>
+              <a:t>etc</a:t>
+            </a:r>
+            <a:r>
+              <a:rPr lang="en-US" dirty="0"/>
+              <a:t>).</a:t>
             </a:r>
           </a:p>
           <a:p>
             <a:r>
               <a:rPr lang="en-US" b="1" u="sng" dirty="0"/>
-              <a:t>Time:</a:t>
+              <a:t>Impact:</a:t>
             </a:r>
             <a:r>
               <a:rPr lang="en-US" dirty="0"/>
-              <a:t> is there enough time in the 13 week semester to complete a significant portion of the project?</a:t>
+              <a:t> TBD – estimate an impact based on a baseline estimate of the number of collisions due to speeding, lane departure and obstacle interactions.</a:t>
             </a:r>
           </a:p>
         </p:txBody>
@@ -13330,7 +13696,7 @@
     </p:spTree>
     <p:extLst>
       <p:ext uri="{BB962C8B-B14F-4D97-AF65-F5344CB8AC3E}">
-        <p14:creationId xmlns:p14="http://schemas.microsoft.com/office/powerpoint/2010/main" val="2158126652"/>
+        <p14:creationId xmlns:p14="http://schemas.microsoft.com/office/powerpoint/2010/main" val="3021528429"/>
       </p:ext>
     </p:extLst>
   </p:cSld>
@@ -13362,7 +13728,7 @@
           <p:cNvPr id="2" name="Title 1">
             <a:extLst>
               <a:ext uri="{FF2B5EF4-FFF2-40B4-BE49-F238E27FC236}">
-                <a16:creationId xmlns="" xmlns:a16="http://schemas.microsoft.com/office/drawing/2014/main" id="{F1B978BA-83B7-49DD-AA89-E0B2140251EF}"/>
+                <a16:creationId xmlns:a16="http://schemas.microsoft.com/office/drawing/2014/main" xmlns="" id="{F1B978BA-83B7-49DD-AA89-E0B2140251EF}"/>
               </a:ext>
             </a:extLst>
           </p:cNvPr>
@@ -13379,10 +13745,9 @@
           <a:lstStyle/>
           <a:p>
             <a:r>
-              <a:rPr lang="en-US" dirty="0" smtClean="0"/>
-              <a:t>Team Interactions</a:t>
-            </a:r>
-            <a:endParaRPr lang="en-US" dirty="0"/>
+              <a:rPr lang="en-US" dirty="0"/>
+              <a:t>Risks and challenges</a:t>
+            </a:r>
           </a:p>
         </p:txBody>
       </p:sp>
@@ -13391,7 +13756,7 @@
           <p:cNvPr id="3" name="Content Placeholder 2">
             <a:extLst>
               <a:ext uri="{FF2B5EF4-FFF2-40B4-BE49-F238E27FC236}">
-                <a16:creationId xmlns="" xmlns:a16="http://schemas.microsoft.com/office/drawing/2014/main" id="{1F59F962-AF4D-410A-B933-7A6CEB775654}"/>
+                <a16:creationId xmlns:a16="http://schemas.microsoft.com/office/drawing/2014/main" xmlns="" id="{1F59F962-AF4D-410A-B933-7A6CEB775654}"/>
               </a:ext>
             </a:extLst>
           </p:cNvPr>
@@ -13404,110 +13769,44 @@
         </p:nvSpPr>
         <p:spPr/>
         <p:txBody>
-          <a:bodyPr>
-            <a:normAutofit/>
-          </a:bodyPr>
+          <a:bodyPr/>
           <a:lstStyle/>
           <a:p>
             <a:r>
-              <a:rPr lang="en-US" b="1" u="sng" dirty="0" smtClean="0"/>
-              <a:t>Team Meetings:</a:t>
-            </a:r>
-          </a:p>
-          <a:p>
-            <a:pPr lvl="1"/>
-            <a:r>
-              <a:rPr lang="en-US" dirty="0" smtClean="0"/>
-              <a:t>Regular </a:t>
+              <a:rPr lang="en-US" b="1" u="sng" dirty="0"/>
+              <a:t>New platform: </a:t>
             </a:r>
             <a:r>
               <a:rPr lang="en-US" dirty="0"/>
-              <a:t>team meetings on Thursdays 7:00 - 9:00 PM </a:t>
-            </a:r>
-            <a:r>
-              <a:rPr lang="en-US" dirty="0" smtClean="0"/>
-              <a:t>Eastern</a:t>
-            </a:r>
-          </a:p>
-          <a:p>
-            <a:pPr lvl="1"/>
+              <a:t>team needs to learn and use the Raspberry Pi, Python and computer vision algorithms</a:t>
+            </a:r>
+          </a:p>
+          <a:p>
+            <a:r>
+              <a:rPr lang="en-US" b="1" u="sng" dirty="0"/>
+              <a:t>Performance:</a:t>
+            </a:r>
             <a:r>
               <a:rPr lang="en-US" dirty="0"/>
-              <a:t>Shorter "stand-up" meetings on Sundays 7:00 - 7:30 PM Eastern</a:t>
-            </a:r>
-            <a:endParaRPr lang="en-US" dirty="0" smtClean="0"/>
-          </a:p>
-          <a:p>
-            <a:r>
-              <a:rPr lang="en-US" b="1" u="sng" dirty="0" smtClean="0"/>
-              <a:t>Meeting room:</a:t>
+              <a:t> does the Raspberry Pi provide enough performance to support this application?</a:t>
+            </a:r>
+          </a:p>
+          <a:p>
+            <a:r>
+              <a:rPr lang="en-US" b="1" u="sng" dirty="0"/>
+              <a:t>Time:</a:t>
             </a:r>
             <a:r>
               <a:rPr lang="en-US" dirty="0"/>
-              <a:t> SSW690 Google Meet room provided by Prof. </a:t>
-            </a:r>
-            <a:r>
-              <a:rPr lang="en-US" dirty="0" smtClean="0"/>
-              <a:t>Rowland</a:t>
-            </a:r>
-          </a:p>
-          <a:p>
-            <a:pPr lvl="1"/>
-            <a:r>
-              <a:rPr lang="en-US" dirty="0" err="1"/>
-              <a:t>Whatsapp</a:t>
-            </a:r>
-            <a:r>
-              <a:rPr lang="en-US" dirty="0"/>
-              <a:t> for messaging in between </a:t>
-            </a:r>
-            <a:r>
-              <a:rPr lang="en-US" dirty="0" smtClean="0"/>
-              <a:t>meetings</a:t>
-            </a:r>
-          </a:p>
-          <a:p>
-            <a:pPr lvl="1"/>
-            <a:r>
-              <a:rPr lang="en-US" dirty="0" smtClean="0"/>
-              <a:t>Email for longer messages</a:t>
-            </a:r>
-          </a:p>
-          <a:p>
-            <a:r>
-              <a:rPr lang="en-US" b="1" u="sng" dirty="0" smtClean="0"/>
-              <a:t>GitHub repository:</a:t>
-            </a:r>
-            <a:r>
-              <a:rPr lang="en-US" dirty="0"/>
-              <a:t> </a:t>
-            </a:r>
-            <a:r>
-              <a:rPr lang="en-US" dirty="0">
-                <a:hlinkClick r:id="rId2"/>
-              </a:rPr>
-              <a:t>https</a:t>
-            </a:r>
-            <a:r>
-              <a:rPr lang="en-US">
-                <a:hlinkClick r:id="rId2"/>
-              </a:rPr>
-              <a:t>://</a:t>
-            </a:r>
-            <a:r>
-              <a:rPr lang="en-US" smtClean="0">
-                <a:hlinkClick r:id="rId2"/>
-              </a:rPr>
-              <a:t>github.com/Scarabyte/SSW690-Project</a:t>
-            </a:r>
-            <a:endParaRPr lang="en-US" dirty="0"/>
+              <a:t> is there enough time in the 13 week semester to complete a significant portion of the project?</a:t>
+            </a:r>
           </a:p>
         </p:txBody>
       </p:sp>
     </p:spTree>
     <p:extLst>
       <p:ext uri="{BB962C8B-B14F-4D97-AF65-F5344CB8AC3E}">
-        <p14:creationId xmlns:p14="http://schemas.microsoft.com/office/powerpoint/2010/main" val="1643930476"/>
+        <p14:creationId xmlns:p14="http://schemas.microsoft.com/office/powerpoint/2010/main" val="2158126652"/>
       </p:ext>
     </p:extLst>
   </p:cSld>
@@ -13762,7 +14061,7 @@
   <a:extraClrSchemeLst/>
   <a:extLst>
     <a:ext uri="{05A4C25C-085E-4340-85A3-A5531E510DB2}">
-      <thm15:themeFamily xmlns="" xmlns:thm15="http://schemas.microsoft.com/office/thememl/2012/main" name="Circuit" id="{0AC2F7E7-15F5-431C-B2A2-456FE929F56C}" vid="{0911B802-464C-4241-8DD9-B60FF88E379F}"/>
+      <thm15:themeFamily xmlns:thm15="http://schemas.microsoft.com/office/thememl/2012/main" xmlns="" name="Circuit" id="{0AC2F7E7-15F5-431C-B2A2-456FE929F56C}" vid="{0911B802-464C-4241-8DD9-B60FF88E379F}"/>
     </a:ext>
   </a:extLst>
 </a:theme>

</xml_diff>

<commit_message>
Added slide on extensibility
</commit_message>
<xml_diff>
--- a/docs/Presentations/Computer Vision Driving Aids Project Overview.pptx
+++ b/docs/Presentations/Computer Vision Driving Aids Project Overview.pptx
@@ -10,11 +10,12 @@
     <p:sldId id="258" r:id="rId4"/>
     <p:sldId id="261" r:id="rId5"/>
     <p:sldId id="259" r:id="rId6"/>
-    <p:sldId id="264" r:id="rId7"/>
-    <p:sldId id="265" r:id="rId8"/>
-    <p:sldId id="260" r:id="rId9"/>
-    <p:sldId id="262" r:id="rId10"/>
-    <p:sldId id="263" r:id="rId11"/>
+    <p:sldId id="266" r:id="rId7"/>
+    <p:sldId id="264" r:id="rId8"/>
+    <p:sldId id="265" r:id="rId9"/>
+    <p:sldId id="260" r:id="rId10"/>
+    <p:sldId id="262" r:id="rId11"/>
+    <p:sldId id="263" r:id="rId12"/>
   </p:sldIdLst>
   <p:sldSz cx="12192000" cy="6858000"/>
   <p:notesSz cx="6858000" cy="9144000"/>
@@ -12523,6 +12524,129 @@
           <a:p>
             <a:r>
               <a:rPr lang="en-US" dirty="0"/>
+              <a:t>Risks and challenges</a:t>
+            </a:r>
+          </a:p>
+        </p:txBody>
+      </p:sp>
+      <p:sp>
+        <p:nvSpPr>
+          <p:cNvPr id="3" name="Content Placeholder 2">
+            <a:extLst>
+              <a:ext uri="{FF2B5EF4-FFF2-40B4-BE49-F238E27FC236}">
+                <a16:creationId xmlns:a16="http://schemas.microsoft.com/office/drawing/2014/main" id="{1F59F962-AF4D-410A-B933-7A6CEB775654}"/>
+              </a:ext>
+            </a:extLst>
+          </p:cNvPr>
+          <p:cNvSpPr>
+            <a:spLocks noGrp="1"/>
+          </p:cNvSpPr>
+          <p:nvPr>
+            <p:ph idx="1"/>
+          </p:nvPr>
+        </p:nvSpPr>
+        <p:spPr/>
+        <p:txBody>
+          <a:bodyPr>
+            <a:normAutofit fontScale="92500" lnSpcReduction="10000"/>
+          </a:bodyPr>
+          <a:lstStyle/>
+          <a:p>
+            <a:r>
+              <a:rPr lang="en-US" b="1" u="sng" dirty="0"/>
+              <a:t>New platform: </a:t>
+            </a:r>
+            <a:r>
+              <a:rPr lang="en-US" dirty="0"/>
+              <a:t>team needs to learn and use the Raspberry Pi, Python and computer vision algorithms</a:t>
+            </a:r>
+          </a:p>
+          <a:p>
+            <a:r>
+              <a:rPr lang="en-US" b="1" u="sng" dirty="0"/>
+              <a:t>Performance:</a:t>
+            </a:r>
+            <a:r>
+              <a:rPr lang="en-US" dirty="0"/>
+              <a:t> does the Raspberry Pi provide enough performance to support this application?</a:t>
+            </a:r>
+          </a:p>
+          <a:p>
+            <a:r>
+              <a:rPr lang="en-US" b="1" u="sng" dirty="0"/>
+              <a:t>Time:</a:t>
+            </a:r>
+            <a:r>
+              <a:rPr lang="en-US" dirty="0"/>
+              <a:t> is there enough time in the 13 week semester to complete a significant portion of the project?</a:t>
+            </a:r>
+          </a:p>
+          <a:p>
+            <a:r>
+              <a:rPr lang="en-US" u="sng" dirty="0"/>
+              <a:t>Distributed Team:</a:t>
+            </a:r>
+            <a:r>
+              <a:rPr lang="en-US" dirty="0"/>
+              <a:t> Team will have to overcome geographic distances during integration effort</a:t>
+            </a:r>
+            <a:endParaRPr lang="en-US" u="sng" dirty="0"/>
+          </a:p>
+        </p:txBody>
+      </p:sp>
+    </p:spTree>
+    <p:extLst>
+      <p:ext uri="{BB962C8B-B14F-4D97-AF65-F5344CB8AC3E}">
+        <p14:creationId xmlns:p14="http://schemas.microsoft.com/office/powerpoint/2010/main" val="2158126652"/>
+      </p:ext>
+    </p:extLst>
+  </p:cSld>
+  <p:clrMapOvr>
+    <a:masterClrMapping/>
+  </p:clrMapOvr>
+</p:sld>
+</file>
+
+<file path=ppt/slides/slide11.xml><?xml version="1.0" encoding="utf-8"?>
+<p:sld xmlns:a="http://schemas.openxmlformats.org/drawingml/2006/main" xmlns:r="http://schemas.openxmlformats.org/officeDocument/2006/relationships" xmlns:p="http://schemas.openxmlformats.org/presentationml/2006/main">
+  <p:cSld>
+    <p:spTree>
+      <p:nvGrpSpPr>
+        <p:cNvPr id="1" name=""/>
+        <p:cNvGrpSpPr/>
+        <p:nvPr/>
+      </p:nvGrpSpPr>
+      <p:grpSpPr>
+        <a:xfrm>
+          <a:off x="0" y="0"/>
+          <a:ext cx="0" cy="0"/>
+          <a:chOff x="0" y="0"/>
+          <a:chExt cx="0" cy="0"/>
+        </a:xfrm>
+      </p:grpSpPr>
+      <p:sp>
+        <p:nvSpPr>
+          <p:cNvPr id="2" name="Title 1">
+            <a:extLst>
+              <a:ext uri="{FF2B5EF4-FFF2-40B4-BE49-F238E27FC236}">
+                <a16:creationId xmlns:a16="http://schemas.microsoft.com/office/drawing/2014/main" id="{F1B978BA-83B7-49DD-AA89-E0B2140251EF}"/>
+              </a:ext>
+            </a:extLst>
+          </p:cNvPr>
+          <p:cNvSpPr>
+            <a:spLocks noGrp="1"/>
+          </p:cNvSpPr>
+          <p:nvPr>
+            <p:ph type="title"/>
+          </p:nvPr>
+        </p:nvSpPr>
+        <p:spPr/>
+        <p:txBody>
+          <a:bodyPr/>
+          <a:lstStyle/>
+          <a:p>
+            <a:r>
+              <a:rPr lang="en-US" dirty="0"/>
               <a:t>Team Interactions</a:t>
             </a:r>
           </a:p>
@@ -13156,7 +13280,7 @@
           <p:cNvPr id="2" name="Title 1">
             <a:extLst>
               <a:ext uri="{FF2B5EF4-FFF2-40B4-BE49-F238E27FC236}">
-                <a16:creationId xmlns:a16="http://schemas.microsoft.com/office/drawing/2014/main" id="{30E1123C-963D-45A1-979B-3FACC9F01257}"/>
+                <a16:creationId xmlns:a16="http://schemas.microsoft.com/office/drawing/2014/main" id="{2F9C508A-2D2E-40EA-AB1F-43041265C737}"/>
               </a:ext>
             </a:extLst>
           </p:cNvPr>
@@ -13174,7 +13298,7 @@
           <a:p>
             <a:r>
               <a:rPr lang="en-US" dirty="0"/>
-              <a:t>Modularity</a:t>
+              <a:t>Extensibility</a:t>
             </a:r>
           </a:p>
         </p:txBody>
@@ -13184,7 +13308,7 @@
           <p:cNvPr id="3" name="Content Placeholder 2">
             <a:extLst>
               <a:ext uri="{FF2B5EF4-FFF2-40B4-BE49-F238E27FC236}">
-                <a16:creationId xmlns:a16="http://schemas.microsoft.com/office/drawing/2014/main" id="{B9A684A9-BC2F-4302-BF2F-FFE0E47DB328}"/>
+                <a16:creationId xmlns:a16="http://schemas.microsoft.com/office/drawing/2014/main" id="{106A0B8A-4FAA-4568-A060-1D584F6F45C1}"/>
               </a:ext>
             </a:extLst>
           </p:cNvPr>
@@ -13198,63 +13322,46 @@
         <p:spPr/>
         <p:txBody>
           <a:bodyPr>
-            <a:normAutofit/>
+            <a:normAutofit fontScale="92500" lnSpcReduction="20000"/>
           </a:bodyPr>
           <a:lstStyle/>
           <a:p>
             <a:r>
-              <a:rPr lang="en-US" b="1" u="sng" dirty="0"/>
-              <a:t>Modularity:</a:t>
+              <a:rPr lang="en-US" u="sng" dirty="0"/>
+              <a:t>Object Oriented Programming:</a:t>
             </a:r>
             <a:r>
               <a:rPr lang="en-US" dirty="0"/>
-              <a:t> TBD – describe how the software should be internally partitioned to allow for multiple, simultaneous development and verification activities</a:t>
-            </a:r>
-          </a:p>
-          <a:p>
-            <a:r>
-              <a:rPr lang="en-US" b="1" u="sng" dirty="0"/>
-              <a:t>Functions the system performs:</a:t>
-            </a:r>
-            <a:endParaRPr lang="en-US" dirty="0"/>
-          </a:p>
-          <a:p>
-            <a:pPr lvl="1"/>
+              <a:t> An OO architecture will help to create an encapsulated, modular software system that can be built on. OO architecture will also help distribute the work across the team members.</a:t>
+            </a:r>
+          </a:p>
+          <a:p>
+            <a:r>
+              <a:rPr lang="en-US" u="sng" dirty="0"/>
+              <a:t>Event driven architecture:</a:t>
+            </a:r>
             <a:r>
               <a:rPr lang="en-US" dirty="0"/>
-              <a:t>Object identification: The system identifies objects of interest in the picture frame</a:t>
-            </a:r>
-          </a:p>
-          <a:p>
-            <a:pPr lvl="1"/>
+              <a:t> The software architecture will need to have modules that will monitor specific changes in the videos, and trigger functions to process those updates (for ex: speed limit sign comes into view)</a:t>
+            </a:r>
+          </a:p>
+          <a:p>
+            <a:r>
+              <a:rPr lang="en-US" u="sng" dirty="0"/>
+              <a:t>Processing Optimizations:</a:t>
+            </a:r>
             <a:r>
               <a:rPr lang="en-US" dirty="0"/>
-              <a:t>Object recognition: Once an object is identified, the system classifies it</a:t>
-            </a:r>
-          </a:p>
-          <a:p>
-            <a:pPr lvl="1"/>
-            <a:r>
-              <a:rPr lang="en-US" dirty="0"/>
-              <a:t>Notification: When a significant object (or event) is confirmed, notify the driver</a:t>
-            </a:r>
-          </a:p>
-          <a:p>
-            <a:r>
-              <a:rPr lang="en-US" b="1" u="sng" dirty="0"/>
-              <a:t>TBD Details of each independent function:</a:t>
-            </a:r>
-            <a:r>
-              <a:rPr lang="en-US" dirty="0"/>
-              <a:t> TBD</a:t>
-            </a:r>
+              <a:t> The target environment does not have very powerful processing power, making it very important to have optimized algorithms for video processing</a:t>
+            </a:r>
+            <a:endParaRPr lang="en-US" u="sng" dirty="0"/>
           </a:p>
         </p:txBody>
       </p:sp>
     </p:spTree>
     <p:extLst>
       <p:ext uri="{BB962C8B-B14F-4D97-AF65-F5344CB8AC3E}">
-        <p14:creationId xmlns:p14="http://schemas.microsoft.com/office/powerpoint/2010/main" val="768445796"/>
+        <p14:creationId xmlns:p14="http://schemas.microsoft.com/office/powerpoint/2010/main" val="2795358448"/>
       </p:ext>
     </p:extLst>
   </p:cSld>
@@ -13304,6 +13411,136 @@
           <a:p>
             <a:r>
               <a:rPr lang="en-US" dirty="0"/>
+              <a:t>Modularity</a:t>
+            </a:r>
+          </a:p>
+        </p:txBody>
+      </p:sp>
+      <p:sp>
+        <p:nvSpPr>
+          <p:cNvPr id="3" name="Content Placeholder 2">
+            <a:extLst>
+              <a:ext uri="{FF2B5EF4-FFF2-40B4-BE49-F238E27FC236}">
+                <a16:creationId xmlns:a16="http://schemas.microsoft.com/office/drawing/2014/main" id="{B9A684A9-BC2F-4302-BF2F-FFE0E47DB328}"/>
+              </a:ext>
+            </a:extLst>
+          </p:cNvPr>
+          <p:cNvSpPr>
+            <a:spLocks noGrp="1"/>
+          </p:cNvSpPr>
+          <p:nvPr>
+            <p:ph idx="1"/>
+          </p:nvPr>
+        </p:nvSpPr>
+        <p:spPr/>
+        <p:txBody>
+          <a:bodyPr>
+            <a:normAutofit/>
+          </a:bodyPr>
+          <a:lstStyle/>
+          <a:p>
+            <a:r>
+              <a:rPr lang="en-US" b="1" u="sng" dirty="0"/>
+              <a:t>Modularity:</a:t>
+            </a:r>
+            <a:r>
+              <a:rPr lang="en-US" dirty="0"/>
+              <a:t> TBD – describe how the software should be internally partitioned to allow for multiple, simultaneous development and verification activities</a:t>
+            </a:r>
+          </a:p>
+          <a:p>
+            <a:r>
+              <a:rPr lang="en-US" b="1" u="sng" dirty="0"/>
+              <a:t>Functions the system performs:</a:t>
+            </a:r>
+            <a:endParaRPr lang="en-US" dirty="0"/>
+          </a:p>
+          <a:p>
+            <a:pPr lvl="1"/>
+            <a:r>
+              <a:rPr lang="en-US" dirty="0"/>
+              <a:t>Object identification: The system identifies objects of interest in the picture frame</a:t>
+            </a:r>
+          </a:p>
+          <a:p>
+            <a:pPr lvl="1"/>
+            <a:r>
+              <a:rPr lang="en-US" dirty="0"/>
+              <a:t>Object recognition: Once an object is identified, the system classifies it</a:t>
+            </a:r>
+          </a:p>
+          <a:p>
+            <a:pPr lvl="1"/>
+            <a:r>
+              <a:rPr lang="en-US" dirty="0"/>
+              <a:t>Notification: When a significant object (or event) is confirmed, notify the driver</a:t>
+            </a:r>
+          </a:p>
+          <a:p>
+            <a:r>
+              <a:rPr lang="en-US" b="1" u="sng" dirty="0"/>
+              <a:t>TBD Details of each independent function:</a:t>
+            </a:r>
+            <a:r>
+              <a:rPr lang="en-US" dirty="0"/>
+              <a:t> TBD</a:t>
+            </a:r>
+          </a:p>
+        </p:txBody>
+      </p:sp>
+    </p:spTree>
+    <p:extLst>
+      <p:ext uri="{BB962C8B-B14F-4D97-AF65-F5344CB8AC3E}">
+        <p14:creationId xmlns:p14="http://schemas.microsoft.com/office/powerpoint/2010/main" val="768445796"/>
+      </p:ext>
+    </p:extLst>
+  </p:cSld>
+  <p:clrMapOvr>
+    <a:masterClrMapping/>
+  </p:clrMapOvr>
+</p:sld>
+</file>
+
+<file path=ppt/slides/slide8.xml><?xml version="1.0" encoding="utf-8"?>
+<p:sld xmlns:a="http://schemas.openxmlformats.org/drawingml/2006/main" xmlns:r="http://schemas.openxmlformats.org/officeDocument/2006/relationships" xmlns:p="http://schemas.openxmlformats.org/presentationml/2006/main">
+  <p:cSld>
+    <p:spTree>
+      <p:nvGrpSpPr>
+        <p:cNvPr id="1" name=""/>
+        <p:cNvGrpSpPr/>
+        <p:nvPr/>
+      </p:nvGrpSpPr>
+      <p:grpSpPr>
+        <a:xfrm>
+          <a:off x="0" y="0"/>
+          <a:ext cx="0" cy="0"/>
+          <a:chOff x="0" y="0"/>
+          <a:chExt cx="0" cy="0"/>
+        </a:xfrm>
+      </p:grpSpPr>
+      <p:sp>
+        <p:nvSpPr>
+          <p:cNvPr id="2" name="Title 1">
+            <a:extLst>
+              <a:ext uri="{FF2B5EF4-FFF2-40B4-BE49-F238E27FC236}">
+                <a16:creationId xmlns:a16="http://schemas.microsoft.com/office/drawing/2014/main" id="{30E1123C-963D-45A1-979B-3FACC9F01257}"/>
+              </a:ext>
+            </a:extLst>
+          </p:cNvPr>
+          <p:cNvSpPr>
+            <a:spLocks noGrp="1"/>
+          </p:cNvSpPr>
+          <p:nvPr>
+            <p:ph type="title"/>
+          </p:nvPr>
+        </p:nvSpPr>
+        <p:spPr/>
+        <p:txBody>
+          <a:bodyPr/>
+          <a:lstStyle/>
+          <a:p>
+            <a:r>
+              <a:rPr lang="en-US" dirty="0"/>
               <a:t>Performance</a:t>
             </a:r>
           </a:p>
@@ -13437,7 +13674,7 @@
 </p:sld>
 </file>
 
-<file path=ppt/slides/slide8.xml><?xml version="1.0" encoding="utf-8"?>
+<file path=ppt/slides/slide9.xml><?xml version="1.0" encoding="utf-8"?>
 <p:sld xmlns:a="http://schemas.openxmlformats.org/drawingml/2006/main" xmlns:r="http://schemas.openxmlformats.org/officeDocument/2006/relationships" xmlns:p="http://schemas.openxmlformats.org/presentationml/2006/main">
   <p:cSld>
     <p:spTree>
@@ -13546,129 +13783,6 @@
     <p:extLst>
       <p:ext uri="{BB962C8B-B14F-4D97-AF65-F5344CB8AC3E}">
         <p14:creationId xmlns:p14="http://schemas.microsoft.com/office/powerpoint/2010/main" val="3021528429"/>
-      </p:ext>
-    </p:extLst>
-  </p:cSld>
-  <p:clrMapOvr>
-    <a:masterClrMapping/>
-  </p:clrMapOvr>
-</p:sld>
-</file>
-
-<file path=ppt/slides/slide9.xml><?xml version="1.0" encoding="utf-8"?>
-<p:sld xmlns:a="http://schemas.openxmlformats.org/drawingml/2006/main" xmlns:r="http://schemas.openxmlformats.org/officeDocument/2006/relationships" xmlns:p="http://schemas.openxmlformats.org/presentationml/2006/main">
-  <p:cSld>
-    <p:spTree>
-      <p:nvGrpSpPr>
-        <p:cNvPr id="1" name=""/>
-        <p:cNvGrpSpPr/>
-        <p:nvPr/>
-      </p:nvGrpSpPr>
-      <p:grpSpPr>
-        <a:xfrm>
-          <a:off x="0" y="0"/>
-          <a:ext cx="0" cy="0"/>
-          <a:chOff x="0" y="0"/>
-          <a:chExt cx="0" cy="0"/>
-        </a:xfrm>
-      </p:grpSpPr>
-      <p:sp>
-        <p:nvSpPr>
-          <p:cNvPr id="2" name="Title 1">
-            <a:extLst>
-              <a:ext uri="{FF2B5EF4-FFF2-40B4-BE49-F238E27FC236}">
-                <a16:creationId xmlns:a16="http://schemas.microsoft.com/office/drawing/2014/main" id="{F1B978BA-83B7-49DD-AA89-E0B2140251EF}"/>
-              </a:ext>
-            </a:extLst>
-          </p:cNvPr>
-          <p:cNvSpPr>
-            <a:spLocks noGrp="1"/>
-          </p:cNvSpPr>
-          <p:nvPr>
-            <p:ph type="title"/>
-          </p:nvPr>
-        </p:nvSpPr>
-        <p:spPr/>
-        <p:txBody>
-          <a:bodyPr/>
-          <a:lstStyle/>
-          <a:p>
-            <a:r>
-              <a:rPr lang="en-US" dirty="0"/>
-              <a:t>Risks and challenges</a:t>
-            </a:r>
-          </a:p>
-        </p:txBody>
-      </p:sp>
-      <p:sp>
-        <p:nvSpPr>
-          <p:cNvPr id="3" name="Content Placeholder 2">
-            <a:extLst>
-              <a:ext uri="{FF2B5EF4-FFF2-40B4-BE49-F238E27FC236}">
-                <a16:creationId xmlns:a16="http://schemas.microsoft.com/office/drawing/2014/main" id="{1F59F962-AF4D-410A-B933-7A6CEB775654}"/>
-              </a:ext>
-            </a:extLst>
-          </p:cNvPr>
-          <p:cNvSpPr>
-            <a:spLocks noGrp="1"/>
-          </p:cNvSpPr>
-          <p:nvPr>
-            <p:ph idx="1"/>
-          </p:nvPr>
-        </p:nvSpPr>
-        <p:spPr/>
-        <p:txBody>
-          <a:bodyPr>
-            <a:normAutofit fontScale="92500" lnSpcReduction="10000"/>
-          </a:bodyPr>
-          <a:lstStyle/>
-          <a:p>
-            <a:r>
-              <a:rPr lang="en-US" b="1" u="sng" dirty="0"/>
-              <a:t>New platform: </a:t>
-            </a:r>
-            <a:r>
-              <a:rPr lang="en-US" dirty="0"/>
-              <a:t>team needs to learn and use the Raspberry Pi, Python and computer vision algorithms</a:t>
-            </a:r>
-          </a:p>
-          <a:p>
-            <a:r>
-              <a:rPr lang="en-US" b="1" u="sng" dirty="0"/>
-              <a:t>Performance:</a:t>
-            </a:r>
-            <a:r>
-              <a:rPr lang="en-US" dirty="0"/>
-              <a:t> does the Raspberry Pi provide enough performance to support this application?</a:t>
-            </a:r>
-          </a:p>
-          <a:p>
-            <a:r>
-              <a:rPr lang="en-US" b="1" u="sng" dirty="0"/>
-              <a:t>Time:</a:t>
-            </a:r>
-            <a:r>
-              <a:rPr lang="en-US" dirty="0"/>
-              <a:t> is there enough time in the 13 week semester to complete a significant portion of the project?</a:t>
-            </a:r>
-          </a:p>
-          <a:p>
-            <a:r>
-              <a:rPr lang="en-US" u="sng" dirty="0"/>
-              <a:t>Distributed Team:</a:t>
-            </a:r>
-            <a:r>
-              <a:rPr lang="en-US" dirty="0"/>
-              <a:t> Team will have to overcome geographic distances during integration effort</a:t>
-            </a:r>
-            <a:endParaRPr lang="en-US" u="sng" dirty="0"/>
-          </a:p>
-        </p:txBody>
-      </p:sp>
-    </p:spTree>
-    <p:extLst>
-      <p:ext uri="{BB962C8B-B14F-4D97-AF65-F5344CB8AC3E}">
-        <p14:creationId xmlns:p14="http://schemas.microsoft.com/office/powerpoint/2010/main" val="2158126652"/>
       </p:ext>
     </p:extLst>
   </p:cSld>

</xml_diff>

<commit_message>
Added system diagram, safety & reliability
Also made some minor changes - included Android as an alternate platform. Added our team name and (hopefully) funny graphic as a conclusion. Completed #2, #6 and #7 tasks.
</commit_message>
<xml_diff>
--- a/docs/Presentations/Computer Vision Driving Aids Project Overview.pptx
+++ b/docs/Presentations/Computer Vision Driving Aids Project Overview.pptx
@@ -9,13 +9,14 @@
     <p:sldId id="257" r:id="rId3"/>
     <p:sldId id="258" r:id="rId4"/>
     <p:sldId id="261" r:id="rId5"/>
-    <p:sldId id="259" r:id="rId6"/>
-    <p:sldId id="266" r:id="rId7"/>
-    <p:sldId id="264" r:id="rId8"/>
-    <p:sldId id="265" r:id="rId9"/>
+    <p:sldId id="266" r:id="rId6"/>
+    <p:sldId id="264" r:id="rId7"/>
+    <p:sldId id="265" r:id="rId8"/>
+    <p:sldId id="267" r:id="rId9"/>
     <p:sldId id="260" r:id="rId10"/>
     <p:sldId id="262" r:id="rId11"/>
     <p:sldId id="263" r:id="rId12"/>
+    <p:sldId id="268" r:id="rId13"/>
   </p:sldIdLst>
   <p:sldSz cx="12192000" cy="6858000"/>
   <p:notesSz cx="6858000" cy="9144000"/>
@@ -139,20 +140,6 @@
     <p:extLst/>
   </p:cmAuthor>
 </p:cmAuthorLst>
-</file>
-
-<file path=ppt/comments/comment1.xml><?xml version="1.0" encoding="utf-8"?>
-<p:cmLst xmlns:a="http://schemas.openxmlformats.org/drawingml/2006/main" xmlns:r="http://schemas.openxmlformats.org/officeDocument/2006/relationships" xmlns:p="http://schemas.openxmlformats.org/presentationml/2006/main">
-  <p:cm authorId="1" dt="2018-08-29T18:06:43.845" idx="1">
-    <p:pos x="4517" y="855"/>
-    <p:text>Each one of these bullet items could be on a separate slide if there's enough content to support it.</p:text>
-    <p:extLst>
-      <p:ext uri="{C676402C-5697-4E1C-873F-D02D1690AC5C}">
-        <p15:threadingInfo xmlns:p15="http://schemas.microsoft.com/office/powerpoint/2012/main" timeZoneBias="240"/>
-      </p:ext>
-    </p:extLst>
-  </p:cm>
-</p:cmLst>
 </file>
 
 <file path=ppt/slideLayouts/slideLayout1.xml><?xml version="1.0" encoding="utf-8"?>
@@ -12396,7 +12383,7 @@
           <p:cNvPr id="2" name="Title 1">
             <a:extLst>
               <a:ext uri="{FF2B5EF4-FFF2-40B4-BE49-F238E27FC236}">
-                <a16:creationId xmlns:a16="http://schemas.microsoft.com/office/drawing/2014/main" id="{78629773-1F2F-4DEA-A804-323B3E4F7636}"/>
+                <a16:creationId xmlns:a16="http://schemas.microsoft.com/office/drawing/2014/main" xmlns="" id="{78629773-1F2F-4DEA-A804-323B3E4F7636}"/>
               </a:ext>
             </a:extLst>
           </p:cNvPr>
@@ -12414,8 +12401,32 @@
           <a:p>
             <a:r>
               <a:rPr lang="en-US" dirty="0"/>
-              <a:t>Computer vision driving aids</a:t>
-            </a:r>
+              <a:t>Computer vision driving </a:t>
+            </a:r>
+            <a:r>
+              <a:rPr lang="en-US" dirty="0" smtClean="0"/>
+              <a:t>aids</a:t>
+            </a:r>
+            <a:r>
+              <a:rPr lang="en-US" dirty="0"/>
+              <a:t/>
+            </a:r>
+            <a:br>
+              <a:rPr lang="en-US" dirty="0"/>
+            </a:br>
+            <a:r>
+              <a:rPr lang="en-US" sz="2800" dirty="0" smtClean="0"/>
+              <a:t>an adaptation of </a:t>
+            </a:r>
+            <a:r>
+              <a:rPr lang="en-US" sz="2800" dirty="0" err="1" smtClean="0"/>
+              <a:t>adas</a:t>
+            </a:r>
+            <a:r>
+              <a:rPr lang="en-US" sz="2800" dirty="0" smtClean="0"/>
+              <a:t> to the android platform</a:t>
+            </a:r>
+            <a:endParaRPr lang="en-US" dirty="0"/>
           </a:p>
         </p:txBody>
       </p:sp>
@@ -12424,7 +12435,7 @@
           <p:cNvPr id="3" name="Subtitle 2">
             <a:extLst>
               <a:ext uri="{FF2B5EF4-FFF2-40B4-BE49-F238E27FC236}">
-                <a16:creationId xmlns:a16="http://schemas.microsoft.com/office/drawing/2014/main" id="{236AD9E0-AFB8-49D5-852F-5BFFF4F9DA95}"/>
+                <a16:creationId xmlns:a16="http://schemas.microsoft.com/office/drawing/2014/main" xmlns="" id="{236AD9E0-AFB8-49D5-852F-5BFFF4F9DA95}"/>
               </a:ext>
             </a:extLst>
           </p:cNvPr>
@@ -12506,7 +12517,7 @@
           <p:cNvPr id="2" name="Title 1">
             <a:extLst>
               <a:ext uri="{FF2B5EF4-FFF2-40B4-BE49-F238E27FC236}">
-                <a16:creationId xmlns:a16="http://schemas.microsoft.com/office/drawing/2014/main" id="{F1B978BA-83B7-49DD-AA89-E0B2140251EF}"/>
+                <a16:creationId xmlns:a16="http://schemas.microsoft.com/office/drawing/2014/main" xmlns="" id="{F1B978BA-83B7-49DD-AA89-E0B2140251EF}"/>
               </a:ext>
             </a:extLst>
           </p:cNvPr>
@@ -12534,7 +12545,7 @@
           <p:cNvPr id="3" name="Content Placeholder 2">
             <a:extLst>
               <a:ext uri="{FF2B5EF4-FFF2-40B4-BE49-F238E27FC236}">
-                <a16:creationId xmlns:a16="http://schemas.microsoft.com/office/drawing/2014/main" id="{1F59F962-AF4D-410A-B933-7A6CEB775654}"/>
+                <a16:creationId xmlns:a16="http://schemas.microsoft.com/office/drawing/2014/main" xmlns="" id="{1F59F962-AF4D-410A-B933-7A6CEB775654}"/>
               </a:ext>
             </a:extLst>
           </p:cNvPr>
@@ -12558,7 +12569,15 @@
             </a:r>
             <a:r>
               <a:rPr lang="en-US" dirty="0"/>
-              <a:t>team needs to learn and use the Raspberry Pi, Python and computer vision algorithms</a:t>
+              <a:t>team needs to learn and use the </a:t>
+            </a:r>
+            <a:r>
+              <a:rPr lang="en-US" dirty="0" smtClean="0"/>
+              <a:t>Android operating system and environment or the Raspberry Pi and Python; </a:t>
+            </a:r>
+            <a:r>
+              <a:rPr lang="en-US" dirty="0"/>
+              <a:t>and computer vision algorithms</a:t>
             </a:r>
           </a:p>
           <a:p>
@@ -12568,7 +12587,15 @@
             </a:r>
             <a:r>
               <a:rPr lang="en-US" dirty="0"/>
-              <a:t> does the Raspberry Pi provide enough performance to support this application?</a:t>
+              <a:t> does the </a:t>
+            </a:r>
+            <a:r>
+              <a:rPr lang="en-US" dirty="0" smtClean="0"/>
+              <a:t>mobile phone platform or the Raspberry </a:t>
+            </a:r>
+            <a:r>
+              <a:rPr lang="en-US" dirty="0"/>
+              <a:t>Pi provide enough performance to support this application?</a:t>
             </a:r>
           </a:p>
           <a:p>
@@ -12629,7 +12656,7 @@
           <p:cNvPr id="2" name="Title 1">
             <a:extLst>
               <a:ext uri="{FF2B5EF4-FFF2-40B4-BE49-F238E27FC236}">
-                <a16:creationId xmlns:a16="http://schemas.microsoft.com/office/drawing/2014/main" id="{F1B978BA-83B7-49DD-AA89-E0B2140251EF}"/>
+                <a16:creationId xmlns:a16="http://schemas.microsoft.com/office/drawing/2014/main" xmlns="" id="{F1B978BA-83B7-49DD-AA89-E0B2140251EF}"/>
               </a:ext>
             </a:extLst>
           </p:cNvPr>
@@ -12657,7 +12684,7 @@
           <p:cNvPr id="3" name="Content Placeholder 2">
             <a:extLst>
               <a:ext uri="{FF2B5EF4-FFF2-40B4-BE49-F238E27FC236}">
-                <a16:creationId xmlns:a16="http://schemas.microsoft.com/office/drawing/2014/main" id="{1F59F962-AF4D-410A-B933-7A6CEB775654}"/>
+                <a16:creationId xmlns:a16="http://schemas.microsoft.com/office/drawing/2014/main" xmlns="" id="{1F59F962-AF4D-410A-B933-7A6CEB775654}"/>
               </a:ext>
             </a:extLst>
           </p:cNvPr>
@@ -12751,6 +12778,154 @@
     <p:extLst>
       <p:ext uri="{BB962C8B-B14F-4D97-AF65-F5344CB8AC3E}">
         <p14:creationId xmlns:p14="http://schemas.microsoft.com/office/powerpoint/2010/main" val="1643930476"/>
+      </p:ext>
+    </p:extLst>
+  </p:cSld>
+  <p:clrMapOvr>
+    <a:masterClrMapping/>
+  </p:clrMapOvr>
+</p:sld>
+</file>
+
+<file path=ppt/slides/slide12.xml><?xml version="1.0" encoding="utf-8"?>
+<p:sld xmlns:a="http://schemas.openxmlformats.org/drawingml/2006/main" xmlns:r="http://schemas.openxmlformats.org/officeDocument/2006/relationships" xmlns:p="http://schemas.openxmlformats.org/presentationml/2006/main">
+  <p:cSld>
+    <p:spTree>
+      <p:nvGrpSpPr>
+        <p:cNvPr id="1" name=""/>
+        <p:cNvGrpSpPr/>
+        <p:nvPr/>
+      </p:nvGrpSpPr>
+      <p:grpSpPr>
+        <a:xfrm>
+          <a:off x="0" y="0"/>
+          <a:ext cx="0" cy="0"/>
+          <a:chOff x="0" y="0"/>
+          <a:chExt cx="0" cy="0"/>
+        </a:xfrm>
+      </p:grpSpPr>
+      <p:sp>
+        <p:nvSpPr>
+          <p:cNvPr id="2" name="Title 1"/>
+          <p:cNvSpPr>
+            <a:spLocks noGrp="1"/>
+          </p:cNvSpPr>
+          <p:nvPr>
+            <p:ph type="title"/>
+          </p:nvPr>
+        </p:nvSpPr>
+        <p:spPr/>
+        <p:txBody>
+          <a:bodyPr/>
+          <a:lstStyle/>
+          <a:p>
+            <a:pPr algn="ctr"/>
+            <a:r>
+              <a:rPr lang="en-US" dirty="0" smtClean="0"/>
+              <a:t>We are… the </a:t>
+            </a:r>
+            <a:r>
+              <a:rPr lang="en-US" b="1" u="sng" dirty="0" smtClean="0"/>
+              <a:t>Back seat drivers!</a:t>
+            </a:r>
+            <a:endParaRPr lang="en-US" b="1" u="sng" dirty="0"/>
+          </a:p>
+        </p:txBody>
+      </p:sp>
+      <p:sp>
+        <p:nvSpPr>
+          <p:cNvPr id="4" name="TextBox 3"/>
+          <p:cNvSpPr txBox="1"/>
+          <p:nvPr/>
+        </p:nvSpPr>
+        <p:spPr>
+          <a:xfrm>
+            <a:off x="1518082" y="5903650"/>
+            <a:ext cx="9614515" cy="307777"/>
+          </a:xfrm>
+          <a:prstGeom prst="rect">
+            <a:avLst/>
+          </a:prstGeom>
+          <a:noFill/>
+        </p:spPr>
+        <p:txBody>
+          <a:bodyPr wrap="square" rtlCol="0">
+            <a:spAutoFit/>
+          </a:bodyPr>
+          <a:lstStyle/>
+          <a:p>
+            <a:pPr algn="ctr"/>
+            <a:r>
+              <a:rPr lang="en-US" sz="1400" dirty="0"/>
+              <a:t>Source: </a:t>
+            </a:r>
+            <a:r>
+              <a:rPr lang="en-US" sz="1400" dirty="0">
+                <a:hlinkClick r:id="rId2"/>
+              </a:rPr>
+              <a:t>http://unearthedcomics.com/comics/distracted-driving</a:t>
+            </a:r>
+            <a:r>
+              <a:rPr lang="en-US" sz="1400" dirty="0" smtClean="0">
+                <a:hlinkClick r:id="rId2"/>
+              </a:rPr>
+              <a:t>/</a:t>
+            </a:r>
+            <a:r>
+              <a:rPr lang="en-US" sz="1400" dirty="0" smtClean="0"/>
+              <a:t> (Creative Commons License)</a:t>
+            </a:r>
+            <a:endParaRPr lang="en-US" sz="1400" dirty="0"/>
+          </a:p>
+        </p:txBody>
+      </p:sp>
+      <p:pic>
+        <p:nvPicPr>
+          <p:cNvPr id="1028" name="Picture 4" descr="Image result for back seat driver clip art"/>
+          <p:cNvPicPr>
+            <a:picLocks noGrp="1" noChangeAspect="1" noChangeArrowheads="1"/>
+          </p:cNvPicPr>
+          <p:nvPr>
+            <p:ph idx="1"/>
+          </p:nvPr>
+        </p:nvPicPr>
+        <p:blipFill>
+          <a:blip r:embed="rId3">
+            <a:extLst>
+              <a:ext uri="{28A0092B-C50C-407E-A947-70E740481C1C}">
+                <a14:useLocalDpi xmlns:a14="http://schemas.microsoft.com/office/drawing/2010/main" val="0"/>
+              </a:ext>
+            </a:extLst>
+          </a:blip>
+          <a:srcRect/>
+          <a:stretch>
+            <a:fillRect/>
+          </a:stretch>
+        </p:blipFill>
+        <p:spPr bwMode="auto">
+          <a:xfrm>
+            <a:off x="4107575" y="1823228"/>
+            <a:ext cx="3976850" cy="3976850"/>
+          </a:xfrm>
+          <a:prstGeom prst="rect">
+            <a:avLst/>
+          </a:prstGeom>
+          <a:noFill/>
+          <a:extLst>
+            <a:ext uri="{909E8E84-426E-40DD-AFC4-6F175D3DCCD1}">
+              <a14:hiddenFill xmlns:a14="http://schemas.microsoft.com/office/drawing/2010/main">
+                <a:solidFill>
+                  <a:srgbClr val="FFFFFF"/>
+                </a:solidFill>
+              </a14:hiddenFill>
+            </a:ext>
+          </a:extLst>
+        </p:spPr>
+      </p:pic>
+    </p:spTree>
+    <p:extLst>
+      <p:ext uri="{BB962C8B-B14F-4D97-AF65-F5344CB8AC3E}">
+        <p14:creationId xmlns:p14="http://schemas.microsoft.com/office/powerpoint/2010/main" val="3305122660"/>
       </p:ext>
     </p:extLst>
   </p:cSld>
@@ -12782,7 +12957,7 @@
           <p:cNvPr id="2" name="Title 1">
             <a:extLst>
               <a:ext uri="{FF2B5EF4-FFF2-40B4-BE49-F238E27FC236}">
-                <a16:creationId xmlns:a16="http://schemas.microsoft.com/office/drawing/2014/main" id="{5F163758-F730-4FFD-9F9E-F0FC8CDDB240}"/>
+                <a16:creationId xmlns:a16="http://schemas.microsoft.com/office/drawing/2014/main" xmlns="" id="{5F163758-F730-4FFD-9F9E-F0FC8CDDB240}"/>
               </a:ext>
             </a:extLst>
           </p:cNvPr>
@@ -12810,7 +12985,7 @@
           <p:cNvPr id="3" name="Content Placeholder 2">
             <a:extLst>
               <a:ext uri="{FF2B5EF4-FFF2-40B4-BE49-F238E27FC236}">
-                <a16:creationId xmlns:a16="http://schemas.microsoft.com/office/drawing/2014/main" id="{C5EBD364-4FCA-4AC5-A62F-1E06EC8240DE}"/>
+                <a16:creationId xmlns:a16="http://schemas.microsoft.com/office/drawing/2014/main" xmlns="" id="{C5EBD364-4FCA-4AC5-A62F-1E06EC8240DE}"/>
               </a:ext>
             </a:extLst>
           </p:cNvPr>
@@ -12840,6 +13015,10 @@
               <a:rPr lang="en-US" u="sng" dirty="0" err="1"/>
               <a:t>Sapana</a:t>
             </a:r>
+            <a:r>
+              <a:rPr lang="en-US" dirty="0"/>
+              <a:t/>
+            </a:r>
             <a:br>
               <a:rPr lang="en-US" dirty="0"/>
             </a:br>
@@ -12870,6 +13049,10 @@
               <a:rPr lang="en-US" u="sng" dirty="0"/>
               <a:t>Roseberry, Keith</a:t>
             </a:r>
+            <a:r>
+              <a:rPr lang="en-US" dirty="0"/>
+              <a:t/>
+            </a:r>
             <a:br>
               <a:rPr lang="en-US" dirty="0"/>
             </a:br>
@@ -12890,6 +13073,10 @@
             <a:r>
               <a:rPr lang="en-US" u="sng" dirty="0" err="1"/>
               <a:t>Rakshith</a:t>
+            </a:r>
+            <a:r>
+              <a:rPr lang="en-US" dirty="0"/>
+              <a:t/>
             </a:r>
             <a:br>
               <a:rPr lang="en-US" dirty="0"/>
@@ -12936,7 +13123,7 @@
           <p:cNvPr id="2" name="Title 1">
             <a:extLst>
               <a:ext uri="{FF2B5EF4-FFF2-40B4-BE49-F238E27FC236}">
-                <a16:creationId xmlns:a16="http://schemas.microsoft.com/office/drawing/2014/main" id="{948A0E38-AB97-4175-B372-9627013E206C}"/>
+                <a16:creationId xmlns:a16="http://schemas.microsoft.com/office/drawing/2014/main" xmlns="" id="{948A0E38-AB97-4175-B372-9627013E206C}"/>
               </a:ext>
             </a:extLst>
           </p:cNvPr>
@@ -12964,7 +13151,7 @@
           <p:cNvPr id="3" name="Content Placeholder 2">
             <a:extLst>
               <a:ext uri="{FF2B5EF4-FFF2-40B4-BE49-F238E27FC236}">
-                <a16:creationId xmlns:a16="http://schemas.microsoft.com/office/drawing/2014/main" id="{1CAB4BB1-33CD-4BB7-BA3A-A13ECB37D4A2}"/>
+                <a16:creationId xmlns:a16="http://schemas.microsoft.com/office/drawing/2014/main" xmlns="" id="{1CAB4BB1-33CD-4BB7-BA3A-A13ECB37D4A2}"/>
               </a:ext>
             </a:extLst>
           </p:cNvPr>
@@ -12982,7 +13169,15 @@
           <a:p>
             <a:r>
               <a:rPr lang="en-US" dirty="0"/>
-              <a:t>Using a Raspberry Pi 3 B+ and a camera module, develop computer vision processing to perform the following functions</a:t>
+              <a:t>Using </a:t>
+            </a:r>
+            <a:r>
+              <a:rPr lang="en-US" dirty="0" smtClean="0"/>
+              <a:t>an Android Mobile Phone or a </a:t>
+            </a:r>
+            <a:r>
+              <a:rPr lang="en-US" dirty="0"/>
+              <a:t>Raspberry Pi 3 B+ and a camera module, develop computer vision processing to perform the following functions</a:t>
             </a:r>
           </a:p>
           <a:p>
@@ -13055,7 +13250,7 @@
           <p:cNvPr id="2" name="Title 1">
             <a:extLst>
               <a:ext uri="{FF2B5EF4-FFF2-40B4-BE49-F238E27FC236}">
-                <a16:creationId xmlns:a16="http://schemas.microsoft.com/office/drawing/2014/main" id="{B0E04909-FB5A-4AD9-BC1D-52CB8571C410}"/>
+                <a16:creationId xmlns:a16="http://schemas.microsoft.com/office/drawing/2014/main" xmlns="" id="{B0E04909-FB5A-4AD9-BC1D-52CB8571C410}"/>
               </a:ext>
             </a:extLst>
           </p:cNvPr>
@@ -13078,34 +13273,35 @@
           </a:p>
         </p:txBody>
       </p:sp>
-      <p:sp>
-        <p:nvSpPr>
-          <p:cNvPr id="3" name="Content Placeholder 2">
-            <a:extLst>
-              <a:ext uri="{FF2B5EF4-FFF2-40B4-BE49-F238E27FC236}">
-                <a16:creationId xmlns:a16="http://schemas.microsoft.com/office/drawing/2014/main" id="{F022C534-5EBE-4C81-B23F-D7B5EA62880D}"/>
-              </a:ext>
-            </a:extLst>
-          </p:cNvPr>
-          <p:cNvSpPr>
-            <a:spLocks noGrp="1"/>
-          </p:cNvSpPr>
+      <p:pic>
+        <p:nvPicPr>
+          <p:cNvPr id="4" name="Content Placeholder 3"/>
+          <p:cNvPicPr>
+            <a:picLocks noGrp="1" noChangeAspect="1"/>
+          </p:cNvPicPr>
           <p:nvPr>
             <p:ph idx="1"/>
           </p:nvPr>
-        </p:nvSpPr>
-        <p:spPr/>
-        <p:txBody>
-          <a:bodyPr/>
-          <a:lstStyle/>
-          <a:p>
-            <a:r>
-              <a:rPr lang="en-US" dirty="0"/>
-              <a:t>TBD: develop a block diagram of the system and possibly the high level internal software processing blocks (we know we might use OpenCV – what else?)</a:t>
-            </a:r>
-          </a:p>
-        </p:txBody>
-      </p:sp>
+        </p:nvPicPr>
+        <p:blipFill>
+          <a:blip r:embed="rId2">
+            <a:extLst>
+              <a:ext uri="{28A0092B-C50C-407E-A947-70E740481C1C}">
+                <a14:useLocalDpi xmlns:a14="http://schemas.microsoft.com/office/drawing/2010/main" val="0"/>
+              </a:ext>
+            </a:extLst>
+          </a:blip>
+          <a:stretch>
+            <a:fillRect/>
+          </a:stretch>
+        </p:blipFill>
+        <p:spPr>
+          <a:xfrm>
+            <a:off x="1961857" y="2097088"/>
+            <a:ext cx="8265110" cy="4146661"/>
+          </a:xfrm>
+        </p:spPr>
+      </p:pic>
     </p:spTree>
     <p:extLst>
       <p:ext uri="{BB962C8B-B14F-4D97-AF65-F5344CB8AC3E}">
@@ -13141,7 +13337,7 @@
           <p:cNvPr id="2" name="Title 1">
             <a:extLst>
               <a:ext uri="{FF2B5EF4-FFF2-40B4-BE49-F238E27FC236}">
-                <a16:creationId xmlns:a16="http://schemas.microsoft.com/office/drawing/2014/main" id="{30E1123C-963D-45A1-979B-3FACC9F01257}"/>
+                <a16:creationId xmlns:a16="http://schemas.microsoft.com/office/drawing/2014/main" xmlns="" id="{2F9C508A-2D2E-40EA-AB1F-43041265C737}"/>
               </a:ext>
             </a:extLst>
           </p:cNvPr>
@@ -13159,14 +13355,7 @@
           <a:p>
             <a:r>
               <a:rPr lang="en-US" dirty="0"/>
-              <a:t>Architecture and design considerations</a:t>
-            </a:r>
-            <a:br>
-              <a:rPr lang="en-US" dirty="0"/>
-            </a:br>
-            <a:r>
-              <a:rPr lang="en-US" dirty="0"/>
-              <a:t>Emergent system properties</a:t>
+              <a:t>Extensibility</a:t>
             </a:r>
           </a:p>
         </p:txBody>
@@ -13176,7 +13365,7 @@
           <p:cNvPr id="3" name="Content Placeholder 2">
             <a:extLst>
               <a:ext uri="{FF2B5EF4-FFF2-40B4-BE49-F238E27FC236}">
-                <a16:creationId xmlns:a16="http://schemas.microsoft.com/office/drawing/2014/main" id="{B9A684A9-BC2F-4302-BF2F-FFE0E47DB328}"/>
+                <a16:creationId xmlns:a16="http://schemas.microsoft.com/office/drawing/2014/main" xmlns="" id="{106A0B8A-4FAA-4568-A060-1D584F6F45C1}"/>
               </a:ext>
             </a:extLst>
           </p:cNvPr>
@@ -13190,65 +13379,46 @@
         <p:spPr/>
         <p:txBody>
           <a:bodyPr>
-            <a:normAutofit fontScale="77500" lnSpcReduction="20000"/>
+            <a:normAutofit fontScale="92500" lnSpcReduction="20000"/>
           </a:bodyPr>
           <a:lstStyle/>
           <a:p>
             <a:r>
-              <a:rPr lang="en-US" b="1" u="sng" dirty="0"/>
-              <a:t>Extensibility:</a:t>
+              <a:rPr lang="en-US" u="sng" dirty="0"/>
+              <a:t>Object Oriented Programming:</a:t>
             </a:r>
             <a:r>
               <a:rPr lang="en-US" dirty="0"/>
-              <a:t> TBD – describe how the software should be constructed to allow additional functions to be added without significant rework</a:t>
-            </a:r>
-          </a:p>
-          <a:p>
-            <a:r>
-              <a:rPr lang="en-US" b="1" u="sng" dirty="0"/>
-              <a:t>Modularity:</a:t>
+              <a:t> An OO architecture will help to create an encapsulated, modular software system that can be built on. OO architecture will also help distribute the work across the team members.</a:t>
+            </a:r>
+          </a:p>
+          <a:p>
+            <a:r>
+              <a:rPr lang="en-US" u="sng" dirty="0"/>
+              <a:t>Event driven architecture:</a:t>
             </a:r>
             <a:r>
               <a:rPr lang="en-US" dirty="0"/>
-              <a:t> TBD – describe how the software should be internally partitioned to allow for multiple, simultaneous development and verification activities</a:t>
-            </a:r>
-          </a:p>
-          <a:p>
-            <a:r>
-              <a:rPr lang="en-US" b="1" u="sng" dirty="0"/>
-              <a:t>Performance:</a:t>
+              <a:t> The software architecture will need to have modules that will monitor specific changes in the videos, and trigger functions to process those updates (for ex: speed limit sign comes into view)</a:t>
+            </a:r>
+          </a:p>
+          <a:p>
+            <a:r>
+              <a:rPr lang="en-US" u="sng" dirty="0"/>
+              <a:t>Processing Optimizations:</a:t>
             </a:r>
             <a:r>
               <a:rPr lang="en-US" dirty="0"/>
-              <a:t> TBD – describe the performance characteristics that must be achieved by the software</a:t>
-            </a:r>
-          </a:p>
-          <a:p>
-            <a:r>
-              <a:rPr lang="en-US" b="1" u="sng" dirty="0"/>
-              <a:t>Reliability:</a:t>
-            </a:r>
-            <a:r>
-              <a:rPr lang="en-US" dirty="0"/>
-              <a:t> TBD – describe how the software must operate in normal and abnormal conditions (e.g., fail safe)</a:t>
-            </a:r>
-          </a:p>
-          <a:p>
-            <a:r>
-              <a:rPr lang="en-US" b="1" u="sng" dirty="0"/>
-              <a:t>Safety:</a:t>
-            </a:r>
-            <a:r>
-              <a:rPr lang="en-US" dirty="0"/>
-              <a:t> TBD – describe how the software must achieve safety characteristics (closely related to reliability)</a:t>
-            </a:r>
+              <a:t> The target environment does not have very powerful processing power, making it very important to have optimized algorithms for video processing</a:t>
+            </a:r>
+            <a:endParaRPr lang="en-US" u="sng" dirty="0"/>
           </a:p>
         </p:txBody>
       </p:sp>
     </p:spTree>
     <p:extLst>
       <p:ext uri="{BB962C8B-B14F-4D97-AF65-F5344CB8AC3E}">
-        <p14:creationId xmlns:p14="http://schemas.microsoft.com/office/powerpoint/2010/main" val="4239875351"/>
+        <p14:creationId xmlns:p14="http://schemas.microsoft.com/office/powerpoint/2010/main" val="2795358448"/>
       </p:ext>
     </p:extLst>
   </p:cSld>
@@ -13280,7 +13450,7 @@
           <p:cNvPr id="2" name="Title 1">
             <a:extLst>
               <a:ext uri="{FF2B5EF4-FFF2-40B4-BE49-F238E27FC236}">
-                <a16:creationId xmlns:a16="http://schemas.microsoft.com/office/drawing/2014/main" id="{2F9C508A-2D2E-40EA-AB1F-43041265C737}"/>
+                <a16:creationId xmlns:a16="http://schemas.microsoft.com/office/drawing/2014/main" xmlns="" id="{30E1123C-963D-45A1-979B-3FACC9F01257}"/>
               </a:ext>
             </a:extLst>
           </p:cNvPr>
@@ -13298,7 +13468,7 @@
           <a:p>
             <a:r>
               <a:rPr lang="en-US" dirty="0"/>
-              <a:t>Extensibility</a:t>
+              <a:t>Modularity</a:t>
             </a:r>
           </a:p>
         </p:txBody>
@@ -13308,7 +13478,7 @@
           <p:cNvPr id="3" name="Content Placeholder 2">
             <a:extLst>
               <a:ext uri="{FF2B5EF4-FFF2-40B4-BE49-F238E27FC236}">
-                <a16:creationId xmlns:a16="http://schemas.microsoft.com/office/drawing/2014/main" id="{106A0B8A-4FAA-4568-A060-1D584F6F45C1}"/>
+                <a16:creationId xmlns:a16="http://schemas.microsoft.com/office/drawing/2014/main" xmlns="" id="{B9A684A9-BC2F-4302-BF2F-FFE0E47DB328}"/>
               </a:ext>
             </a:extLst>
           </p:cNvPr>
@@ -13322,46 +13492,63 @@
         <p:spPr/>
         <p:txBody>
           <a:bodyPr>
-            <a:normAutofit fontScale="92500" lnSpcReduction="20000"/>
+            <a:normAutofit/>
           </a:bodyPr>
           <a:lstStyle/>
           <a:p>
             <a:r>
-              <a:rPr lang="en-US" u="sng" dirty="0"/>
-              <a:t>Object Oriented Programming:</a:t>
+              <a:rPr lang="en-US" b="1" u="sng" dirty="0"/>
+              <a:t>Modularity:</a:t>
             </a:r>
             <a:r>
               <a:rPr lang="en-US" dirty="0"/>
-              <a:t> An OO architecture will help to create an encapsulated, modular software system that can be built on. OO architecture will also help distribute the work across the team members.</a:t>
-            </a:r>
-          </a:p>
-          <a:p>
-            <a:r>
-              <a:rPr lang="en-US" u="sng" dirty="0"/>
-              <a:t>Event driven architecture:</a:t>
-            </a:r>
+              <a:t> TBD – describe how the software should be internally partitioned to allow for multiple, simultaneous development and verification activities</a:t>
+            </a:r>
+          </a:p>
+          <a:p>
+            <a:r>
+              <a:rPr lang="en-US" b="1" u="sng" dirty="0"/>
+              <a:t>Functions the system performs:</a:t>
+            </a:r>
+            <a:endParaRPr lang="en-US" dirty="0"/>
+          </a:p>
+          <a:p>
+            <a:pPr lvl="1"/>
             <a:r>
               <a:rPr lang="en-US" dirty="0"/>
-              <a:t> The software architecture will need to have modules that will monitor specific changes in the videos, and trigger functions to process those updates (for ex: speed limit sign comes into view)</a:t>
-            </a:r>
-          </a:p>
-          <a:p>
-            <a:r>
-              <a:rPr lang="en-US" u="sng" dirty="0"/>
-              <a:t>Processing Optimizations:</a:t>
-            </a:r>
+              <a:t>Object identification: The system identifies objects of interest in the picture frame</a:t>
+            </a:r>
+          </a:p>
+          <a:p>
+            <a:pPr lvl="1"/>
             <a:r>
               <a:rPr lang="en-US" dirty="0"/>
-              <a:t> The target environment does not have very powerful processing power, making it very important to have optimized algorithms for video processing</a:t>
-            </a:r>
-            <a:endParaRPr lang="en-US" u="sng" dirty="0"/>
+              <a:t>Object recognition: Once an object is identified, the system classifies it</a:t>
+            </a:r>
+          </a:p>
+          <a:p>
+            <a:pPr lvl="1"/>
+            <a:r>
+              <a:rPr lang="en-US" dirty="0"/>
+              <a:t>Notification: When a significant object (or event) is confirmed, notify the driver</a:t>
+            </a:r>
+          </a:p>
+          <a:p>
+            <a:r>
+              <a:rPr lang="en-US" b="1" u="sng" dirty="0"/>
+              <a:t>TBD Details of each independent function:</a:t>
+            </a:r>
+            <a:r>
+              <a:rPr lang="en-US" dirty="0"/>
+              <a:t> TBD</a:t>
+            </a:r>
           </a:p>
         </p:txBody>
       </p:sp>
     </p:spTree>
     <p:extLst>
       <p:ext uri="{BB962C8B-B14F-4D97-AF65-F5344CB8AC3E}">
-        <p14:creationId xmlns:p14="http://schemas.microsoft.com/office/powerpoint/2010/main" val="2795358448"/>
+        <p14:creationId xmlns:p14="http://schemas.microsoft.com/office/powerpoint/2010/main" val="768445796"/>
       </p:ext>
     </p:extLst>
   </p:cSld>
@@ -13393,7 +13580,7 @@
           <p:cNvPr id="2" name="Title 1">
             <a:extLst>
               <a:ext uri="{FF2B5EF4-FFF2-40B4-BE49-F238E27FC236}">
-                <a16:creationId xmlns:a16="http://schemas.microsoft.com/office/drawing/2014/main" id="{30E1123C-963D-45A1-979B-3FACC9F01257}"/>
+                <a16:creationId xmlns:a16="http://schemas.microsoft.com/office/drawing/2014/main" xmlns="" id="{30E1123C-963D-45A1-979B-3FACC9F01257}"/>
               </a:ext>
             </a:extLst>
           </p:cNvPr>
@@ -13411,7 +13598,7 @@
           <a:p>
             <a:r>
               <a:rPr lang="en-US" dirty="0"/>
-              <a:t>Modularity</a:t>
+              <a:t>Performance</a:t>
             </a:r>
           </a:p>
         </p:txBody>
@@ -13421,7 +13608,7 @@
           <p:cNvPr id="3" name="Content Placeholder 2">
             <a:extLst>
               <a:ext uri="{FF2B5EF4-FFF2-40B4-BE49-F238E27FC236}">
-                <a16:creationId xmlns:a16="http://schemas.microsoft.com/office/drawing/2014/main" id="{B9A684A9-BC2F-4302-BF2F-FFE0E47DB328}"/>
+                <a16:creationId xmlns:a16="http://schemas.microsoft.com/office/drawing/2014/main" xmlns="" id="{B9A684A9-BC2F-4302-BF2F-FFE0E47DB328}"/>
               </a:ext>
             </a:extLst>
           </p:cNvPr>
@@ -13432,26 +13619,31 @@
             <p:ph idx="1"/>
           </p:nvPr>
         </p:nvSpPr>
-        <p:spPr/>
+        <p:spPr>
+          <a:xfrm>
+            <a:off x="1141412" y="1941534"/>
+            <a:ext cx="9905999" cy="4308953"/>
+          </a:xfrm>
+        </p:spPr>
         <p:txBody>
           <a:bodyPr>
-            <a:normAutofit/>
+            <a:normAutofit lnSpcReduction="10000"/>
           </a:bodyPr>
           <a:lstStyle/>
           <a:p>
             <a:r>
               <a:rPr lang="en-US" b="1" u="sng" dirty="0"/>
-              <a:t>Modularity:</a:t>
+              <a:t>Performance:</a:t>
             </a:r>
             <a:r>
               <a:rPr lang="en-US" dirty="0"/>
-              <a:t> TBD – describe how the software should be internally partitioned to allow for multiple, simultaneous development and verification activities</a:t>
+              <a:t> TBD – describe performance characteristics that must be achieved</a:t>
             </a:r>
           </a:p>
           <a:p>
             <a:r>
               <a:rPr lang="en-US" b="1" u="sng" dirty="0"/>
-              <a:t>Functions the system performs:</a:t>
+              <a:t>Needs to yield results fast enough to improve driver safety:</a:t>
             </a:r>
             <a:endParaRPr lang="en-US" dirty="0"/>
           </a:p>
@@ -13459,31 +13651,69 @@
             <a:pPr lvl="1"/>
             <a:r>
               <a:rPr lang="en-US" dirty="0"/>
-              <a:t>Object identification: The system identifies objects of interest in the picture frame</a:t>
+              <a:t>Average driver reaction brake time is </a:t>
+            </a:r>
+            <a:r>
+              <a:rPr lang="en-US" b="1" dirty="0"/>
+              <a:t>2.3 seconds</a:t>
+            </a:r>
+            <a:r>
+              <a:rPr lang="en-US" dirty="0"/>
+              <a:t> </a:t>
+            </a:r>
+          </a:p>
+          <a:p>
+            <a:pPr lvl="2"/>
+            <a:r>
+              <a:rPr lang="en-US" dirty="0">
+                <a:hlinkClick r:id="rId2"/>
+              </a:rPr>
+              <a:t>https://copradar.com/redlight/factors/index.html</a:t>
+            </a:r>
+            <a:r>
+              <a:rPr lang="en-US" dirty="0"/>
+              <a:t> </a:t>
             </a:r>
           </a:p>
           <a:p>
             <a:pPr lvl="1"/>
             <a:r>
               <a:rPr lang="en-US" dirty="0"/>
-              <a:t>Object recognition: Once an object is identified, the system classifies it</a:t>
-            </a:r>
-          </a:p>
-          <a:p>
-            <a:pPr lvl="1"/>
+              <a:t>Average reaction time in general:</a:t>
+            </a:r>
+          </a:p>
+          <a:p>
+            <a:pPr lvl="2"/>
             <a:r>
               <a:rPr lang="en-US" dirty="0"/>
-              <a:t>Notification: When a significant object (or event) is confirmed, notify the driver</a:t>
-            </a:r>
-          </a:p>
-          <a:p>
-            <a:r>
-              <a:rPr lang="en-US" b="1" u="sng" dirty="0"/>
-              <a:t>TBD Details of each independent function:</a:t>
-            </a:r>
+              <a:t>0.25 seconds for visual stimulus</a:t>
+            </a:r>
+          </a:p>
+          <a:p>
+            <a:pPr lvl="2"/>
             <a:r>
               <a:rPr lang="en-US" dirty="0"/>
-              <a:t> TBD</a:t>
+              <a:t>0.17 for audio stimulus</a:t>
+            </a:r>
+          </a:p>
+          <a:p>
+            <a:pPr lvl="2"/>
+            <a:r>
+              <a:rPr lang="en-US" dirty="0"/>
+              <a:t>0.15 seconds for touch stimulus</a:t>
+            </a:r>
+          </a:p>
+          <a:p>
+            <a:pPr lvl="2"/>
+            <a:r>
+              <a:rPr lang="en-US" dirty="0">
+                <a:hlinkClick r:id="rId3"/>
+              </a:rPr>
+              <a:t>https://backyardbrains.com/experiments/reactiontime</a:t>
+            </a:r>
+            <a:r>
+              <a:rPr lang="en-US" dirty="0"/>
+              <a:t> </a:t>
             </a:r>
           </a:p>
         </p:txBody>
@@ -13491,7 +13721,7 @@
     </p:spTree>
     <p:extLst>
       <p:ext uri="{BB962C8B-B14F-4D97-AF65-F5344CB8AC3E}">
-        <p14:creationId xmlns:p14="http://schemas.microsoft.com/office/powerpoint/2010/main" val="768445796"/>
+        <p14:creationId xmlns:p14="http://schemas.microsoft.com/office/powerpoint/2010/main" val="847626995"/>
       </p:ext>
     </p:extLst>
   </p:cSld>
@@ -13523,7 +13753,7 @@
           <p:cNvPr id="2" name="Title 1">
             <a:extLst>
               <a:ext uri="{FF2B5EF4-FFF2-40B4-BE49-F238E27FC236}">
-                <a16:creationId xmlns:a16="http://schemas.microsoft.com/office/drawing/2014/main" id="{30E1123C-963D-45A1-979B-3FACC9F01257}"/>
+                <a16:creationId xmlns:a16="http://schemas.microsoft.com/office/drawing/2014/main" xmlns="" id="{30E1123C-963D-45A1-979B-3FACC9F01257}"/>
               </a:ext>
             </a:extLst>
           </p:cNvPr>
@@ -13540,9 +13770,10 @@
           <a:lstStyle/>
           <a:p>
             <a:r>
-              <a:rPr lang="en-US" dirty="0"/>
-              <a:t>Performance</a:t>
-            </a:r>
+              <a:rPr lang="en-US" dirty="0" smtClean="0"/>
+              <a:t>Safety &amp; reliability</a:t>
+            </a:r>
+            <a:endParaRPr lang="en-US" dirty="0"/>
           </a:p>
         </p:txBody>
       </p:sp>
@@ -13551,7 +13782,7 @@
           <p:cNvPr id="3" name="Content Placeholder 2">
             <a:extLst>
               <a:ext uri="{FF2B5EF4-FFF2-40B4-BE49-F238E27FC236}">
-                <a16:creationId xmlns:a16="http://schemas.microsoft.com/office/drawing/2014/main" id="{B9A684A9-BC2F-4302-BF2F-FFE0E47DB328}"/>
+                <a16:creationId xmlns:a16="http://schemas.microsoft.com/office/drawing/2014/main" xmlns="" id="{B9A684A9-BC2F-4302-BF2F-FFE0E47DB328}"/>
               </a:ext>
             </a:extLst>
           </p:cNvPr>
@@ -13570,101 +13801,98 @@
         </p:spPr>
         <p:txBody>
           <a:bodyPr>
-            <a:normAutofit lnSpcReduction="10000"/>
+            <a:normAutofit/>
           </a:bodyPr>
           <a:lstStyle/>
           <a:p>
             <a:r>
-              <a:rPr lang="en-US" b="1" u="sng" dirty="0"/>
-              <a:t>Performance:</a:t>
-            </a:r>
-            <a:r>
-              <a:rPr lang="en-US" dirty="0"/>
-              <a:t> TBD – describe performance characteristics that must be achieved</a:t>
-            </a:r>
-          </a:p>
-          <a:p>
-            <a:r>
-              <a:rPr lang="en-US" b="1" u="sng" dirty="0"/>
-              <a:t>Needs to yield results fast enough to improve driver safety:</a:t>
+              <a:rPr lang="en-US" b="1" u="sng" dirty="0" smtClean="0"/>
+              <a:t>Safety</a:t>
+            </a:r>
+            <a:r>
+              <a:rPr lang="en-US" dirty="0" smtClean="0"/>
+              <a:t>: ADAS Level 1 (SAE) – Assisted Driving – Minimal Safety Impact</a:t>
+            </a:r>
+          </a:p>
+          <a:p>
+            <a:pPr lvl="1"/>
+            <a:r>
+              <a:rPr lang="en-US" dirty="0" smtClean="0"/>
+              <a:t>System has no direct control of the vehicle</a:t>
+            </a:r>
+          </a:p>
+          <a:p>
+            <a:pPr lvl="1"/>
+            <a:r>
+              <a:rPr lang="en-US" dirty="0" smtClean="0"/>
+              <a:t>False Alarms: Will increase driver workload, may result in anomalous driver reaction</a:t>
+            </a:r>
+            <a:endParaRPr lang="en-US" dirty="0" smtClean="0"/>
+          </a:p>
+          <a:p>
+            <a:r>
+              <a:rPr lang="en-US" b="1" u="sng" dirty="0" smtClean="0"/>
+              <a:t>Reliability</a:t>
+            </a:r>
+            <a:r>
+              <a:rPr lang="en-US" dirty="0" smtClean="0"/>
+              <a:t>: Degree to which the system is accurate, consistent and available</a:t>
+            </a:r>
+          </a:p>
+          <a:p>
+            <a:pPr lvl="1"/>
+            <a:r>
+              <a:rPr lang="en-US" dirty="0" smtClean="0"/>
+              <a:t>As an aid, the system does not need to have strict reliability objectives</a:t>
+            </a:r>
+          </a:p>
+          <a:p>
+            <a:pPr lvl="1"/>
+            <a:r>
+              <a:rPr lang="en-US" u="sng" dirty="0" smtClean="0"/>
+              <a:t>Accuracy Goal</a:t>
+            </a:r>
+            <a:r>
+              <a:rPr lang="en-US" dirty="0" smtClean="0"/>
+              <a:t>: 75% of detections/alerts are valid and timely</a:t>
+            </a:r>
+          </a:p>
+          <a:p>
+            <a:pPr lvl="1"/>
+            <a:r>
+              <a:rPr lang="en-US" u="sng" dirty="0" smtClean="0"/>
+              <a:t>Consistency Goal</a:t>
+            </a:r>
+            <a:r>
+              <a:rPr lang="en-US" dirty="0" smtClean="0"/>
+              <a:t>: 90% of similar events are detected</a:t>
+            </a:r>
+          </a:p>
+          <a:p>
+            <a:pPr lvl="1"/>
+            <a:r>
+              <a:rPr lang="en-US" u="sng" dirty="0" smtClean="0"/>
+              <a:t>Availability Goal</a:t>
+            </a:r>
+            <a:r>
+              <a:rPr lang="en-US" dirty="0" smtClean="0"/>
+              <a:t>: Operational 90% of the time in normal daylight driving</a:t>
+            </a:r>
+          </a:p>
+          <a:p>
+            <a:pPr lvl="2"/>
+            <a:r>
+              <a:rPr lang="en-US" dirty="0" smtClean="0"/>
+              <a:t>Excludes nighttime and bright sunlight/glare conditions</a:t>
             </a:r>
             <a:endParaRPr lang="en-US" dirty="0"/>
-          </a:p>
-          <a:p>
-            <a:pPr lvl="1"/>
-            <a:r>
-              <a:rPr lang="en-US" dirty="0"/>
-              <a:t>Average driver reaction brake time is </a:t>
-            </a:r>
-            <a:r>
-              <a:rPr lang="en-US" b="1" dirty="0"/>
-              <a:t>2.3 seconds</a:t>
-            </a:r>
-            <a:r>
-              <a:rPr lang="en-US" dirty="0"/>
-              <a:t> </a:t>
-            </a:r>
-          </a:p>
-          <a:p>
-            <a:pPr lvl="2"/>
-            <a:r>
-              <a:rPr lang="en-US" dirty="0">
-                <a:hlinkClick r:id="rId2"/>
-              </a:rPr>
-              <a:t>https://copradar.com/redlight/factors/index.html</a:t>
-            </a:r>
-            <a:r>
-              <a:rPr lang="en-US" dirty="0"/>
-              <a:t> </a:t>
-            </a:r>
-          </a:p>
-          <a:p>
-            <a:pPr lvl="1"/>
-            <a:r>
-              <a:rPr lang="en-US" dirty="0"/>
-              <a:t>Average reaction time in general:</a:t>
-            </a:r>
-          </a:p>
-          <a:p>
-            <a:pPr lvl="2"/>
-            <a:r>
-              <a:rPr lang="en-US" dirty="0"/>
-              <a:t>0.25 seconds for visual stimulus</a:t>
-            </a:r>
-          </a:p>
-          <a:p>
-            <a:pPr lvl="2"/>
-            <a:r>
-              <a:rPr lang="en-US" dirty="0"/>
-              <a:t>0.17 for audio stimulus</a:t>
-            </a:r>
-          </a:p>
-          <a:p>
-            <a:pPr lvl="2"/>
-            <a:r>
-              <a:rPr lang="en-US" dirty="0"/>
-              <a:t>0.15 seconds for touch stimulus</a:t>
-            </a:r>
-          </a:p>
-          <a:p>
-            <a:pPr lvl="2"/>
-            <a:r>
-              <a:rPr lang="en-US" dirty="0">
-                <a:hlinkClick r:id="rId3"/>
-              </a:rPr>
-              <a:t>https://backyardbrains.com/experiments/reactiontime</a:t>
-            </a:r>
-            <a:r>
-              <a:rPr lang="en-US" dirty="0"/>
-              <a:t> </a:t>
-            </a:r>
           </a:p>
         </p:txBody>
       </p:sp>
     </p:spTree>
     <p:extLst>
       <p:ext uri="{BB962C8B-B14F-4D97-AF65-F5344CB8AC3E}">
-        <p14:creationId xmlns:p14="http://schemas.microsoft.com/office/powerpoint/2010/main" val="847626995"/>
+        <p14:creationId xmlns:p14="http://schemas.microsoft.com/office/powerpoint/2010/main" val="258723763"/>
       </p:ext>
     </p:extLst>
   </p:cSld>
@@ -13696,7 +13924,7 @@
           <p:cNvPr id="2" name="Title 1">
             <a:extLst>
               <a:ext uri="{FF2B5EF4-FFF2-40B4-BE49-F238E27FC236}">
-                <a16:creationId xmlns:a16="http://schemas.microsoft.com/office/drawing/2014/main" id="{9A49EC41-9B0B-40CB-9E1E-85D4384B9E7A}"/>
+                <a16:creationId xmlns:a16="http://schemas.microsoft.com/office/drawing/2014/main" xmlns="" id="{9A49EC41-9B0B-40CB-9E1E-85D4384B9E7A}"/>
               </a:ext>
             </a:extLst>
           </p:cNvPr>
@@ -13724,7 +13952,7 @@
           <p:cNvPr id="3" name="Content Placeholder 2">
             <a:extLst>
               <a:ext uri="{FF2B5EF4-FFF2-40B4-BE49-F238E27FC236}">
-                <a16:creationId xmlns:a16="http://schemas.microsoft.com/office/drawing/2014/main" id="{A022F38E-8C72-47DE-836C-4A96E047F639}"/>
+                <a16:creationId xmlns:a16="http://schemas.microsoft.com/office/drawing/2014/main" xmlns="" id="{A022F38E-8C72-47DE-836C-4A96E047F639}"/>
               </a:ext>
             </a:extLst>
           </p:cNvPr>

</xml_diff>

<commit_message>
Updated the presentation with feedback from team standup meeting
</commit_message>
<xml_diff>
--- a/docs/Presentations/Computer Vision Driving Aids Project Overview.pptx
+++ b/docs/Presentations/Computer Vision Driving Aids Project Overview.pptx
@@ -4,6 +4,9 @@
   <p:sldMasterIdLst>
     <p:sldMasterId id="2147483648" r:id="rId1"/>
   </p:sldMasterIdLst>
+  <p:notesMasterIdLst>
+    <p:notesMasterId r:id="rId16"/>
+  </p:notesMasterIdLst>
   <p:sldIdLst>
     <p:sldId id="256" r:id="rId2"/>
     <p:sldId id="257" r:id="rId3"/>
@@ -119,7 +122,7 @@
   </p:defaultTextStyle>
   <p:extLst>
     <p:ext uri="{EFAFB233-063F-42B5-8137-9DF3F51BA10A}">
-      <p15:sldGuideLst xmlns="" xmlns:p15="http://schemas.microsoft.com/office/powerpoint/2012/main">
+      <p15:sldGuideLst xmlns:p15="http://schemas.microsoft.com/office/powerpoint/2012/main">
         <p15:guide id="1" orient="horz" pos="2160">
           <p15:clr>
             <a:srgbClr val="A4A3A4"/>
@@ -138,10 +141,1611 @@
 
 <file path=ppt/commentAuthors.xml><?xml version="1.0" encoding="utf-8"?>
 <p:cmAuthorLst xmlns:a="http://schemas.openxmlformats.org/drawingml/2006/main" xmlns:r="http://schemas.openxmlformats.org/officeDocument/2006/relationships" xmlns:p="http://schemas.openxmlformats.org/presentationml/2006/main">
-  <p:cmAuthor id="1" name="Keith Roseberry" initials="KR" lastIdx="2" clrIdx="0">
+  <p:cmAuthor id="1" name="Keith Roseberry" initials="KR" lastIdx="4" clrIdx="0">
     <p:extLst/>
   </p:cmAuthor>
 </p:cmAuthorLst>
+</file>
+
+<file path=ppt/comments/comment1.xml><?xml version="1.0" encoding="utf-8"?>
+<p:cmLst xmlns:a="http://schemas.openxmlformats.org/drawingml/2006/main" xmlns:r="http://schemas.openxmlformats.org/officeDocument/2006/relationships" xmlns:p="http://schemas.openxmlformats.org/presentationml/2006/main">
+  <p:cm authorId="1" dt="2018-09-02T19:09:57.300" idx="3">
+    <p:pos x="10" y="10"/>
+    <p:text>1) Add an audio output
+2) Arrows are directional (input from camera, output to display/audio).</p:text>
+    <p:extLst>
+      <p:ext uri="{C676402C-5697-4E1C-873F-D02D1690AC5C}">
+        <p15:threadingInfo xmlns:p15="http://schemas.microsoft.com/office/powerpoint/2012/main" timeZoneBias="240"/>
+      </p:ext>
+    </p:extLst>
+  </p:cm>
+</p:cmLst>
+</file>
+
+<file path=ppt/comments/comment2.xml><?xml version="1.0" encoding="utf-8"?>
+<p:cmLst xmlns:a="http://schemas.openxmlformats.org/drawingml/2006/main" xmlns:r="http://schemas.openxmlformats.org/officeDocument/2006/relationships" xmlns:p="http://schemas.openxmlformats.org/presentationml/2006/main">
+  <p:cm authorId="1" dt="2018-09-02T19:25:35.491" idx="4">
+    <p:pos x="6443" y="2262"/>
+    <p:text>May not be able to use this exclusively - might get our own meeting space.</p:text>
+    <p:extLst>
+      <p:ext uri="{C676402C-5697-4E1C-873F-D02D1690AC5C}">
+        <p15:threadingInfo xmlns:p15="http://schemas.microsoft.com/office/powerpoint/2012/main" timeZoneBias="240"/>
+      </p:ext>
+    </p:extLst>
+  </p:cm>
+</p:cmLst>
+</file>
+
+<file path=ppt/notesMasters/notesMaster1.xml><?xml version="1.0" encoding="utf-8"?>
+<p:notesMaster xmlns:a="http://schemas.openxmlformats.org/drawingml/2006/main" xmlns:r="http://schemas.openxmlformats.org/officeDocument/2006/relationships" xmlns:p="http://schemas.openxmlformats.org/presentationml/2006/main">
+  <p:cSld>
+    <p:bg>
+      <p:bgRef idx="1001">
+        <a:schemeClr val="bg1"/>
+      </p:bgRef>
+    </p:bg>
+    <p:spTree>
+      <p:nvGrpSpPr>
+        <p:cNvPr id="1" name=""/>
+        <p:cNvGrpSpPr/>
+        <p:nvPr/>
+      </p:nvGrpSpPr>
+      <p:grpSpPr>
+        <a:xfrm>
+          <a:off x="0" y="0"/>
+          <a:ext cx="0" cy="0"/>
+          <a:chOff x="0" y="0"/>
+          <a:chExt cx="0" cy="0"/>
+        </a:xfrm>
+      </p:grpSpPr>
+      <p:sp>
+        <p:nvSpPr>
+          <p:cNvPr id="2" name="Header Placeholder 1"/>
+          <p:cNvSpPr>
+            <a:spLocks noGrp="1"/>
+          </p:cNvSpPr>
+          <p:nvPr>
+            <p:ph type="hdr" sz="quarter"/>
+          </p:nvPr>
+        </p:nvSpPr>
+        <p:spPr>
+          <a:xfrm>
+            <a:off x="0" y="0"/>
+            <a:ext cx="2971800" cy="458788"/>
+          </a:xfrm>
+          <a:prstGeom prst="rect">
+            <a:avLst/>
+          </a:prstGeom>
+        </p:spPr>
+        <p:txBody>
+          <a:bodyPr vert="horz" lIns="91440" tIns="45720" rIns="91440" bIns="45720" rtlCol="0"/>
+          <a:lstStyle>
+            <a:lvl1pPr algn="l">
+              <a:defRPr sz="1200"/>
+            </a:lvl1pPr>
+          </a:lstStyle>
+          <a:p>
+            <a:endParaRPr lang="en-US"/>
+          </a:p>
+        </p:txBody>
+      </p:sp>
+      <p:sp>
+        <p:nvSpPr>
+          <p:cNvPr id="3" name="Date Placeholder 2"/>
+          <p:cNvSpPr>
+            <a:spLocks noGrp="1"/>
+          </p:cNvSpPr>
+          <p:nvPr>
+            <p:ph type="dt" idx="1"/>
+          </p:nvPr>
+        </p:nvSpPr>
+        <p:spPr>
+          <a:xfrm>
+            <a:off x="3884613" y="0"/>
+            <a:ext cx="2971800" cy="458788"/>
+          </a:xfrm>
+          <a:prstGeom prst="rect">
+            <a:avLst/>
+          </a:prstGeom>
+        </p:spPr>
+        <p:txBody>
+          <a:bodyPr vert="horz" lIns="91440" tIns="45720" rIns="91440" bIns="45720" rtlCol="0"/>
+          <a:lstStyle>
+            <a:lvl1pPr algn="r">
+              <a:defRPr sz="1200"/>
+            </a:lvl1pPr>
+          </a:lstStyle>
+          <a:p>
+            <a:fld id="{28882E47-54AA-4A5F-AB75-03E44D1874A1}" type="datetimeFigureOut">
+              <a:rPr lang="en-US" smtClean="0"/>
+              <a:t>9/2/2018</a:t>
+            </a:fld>
+            <a:endParaRPr lang="en-US"/>
+          </a:p>
+        </p:txBody>
+      </p:sp>
+      <p:sp>
+        <p:nvSpPr>
+          <p:cNvPr id="4" name="Slide Image Placeholder 3"/>
+          <p:cNvSpPr>
+            <a:spLocks noGrp="1" noRot="1" noChangeAspect="1"/>
+          </p:cNvSpPr>
+          <p:nvPr>
+            <p:ph type="sldImg" idx="2"/>
+          </p:nvPr>
+        </p:nvSpPr>
+        <p:spPr>
+          <a:xfrm>
+            <a:off x="685800" y="1143000"/>
+            <a:ext cx="5486400" cy="3086100"/>
+          </a:xfrm>
+          <a:prstGeom prst="rect">
+            <a:avLst/>
+          </a:prstGeom>
+          <a:noFill/>
+          <a:ln w="12700">
+            <a:solidFill>
+              <a:prstClr val="black"/>
+            </a:solidFill>
+          </a:ln>
+        </p:spPr>
+        <p:txBody>
+          <a:bodyPr vert="horz" lIns="91440" tIns="45720" rIns="91440" bIns="45720" rtlCol="0" anchor="ctr"/>
+          <a:lstStyle/>
+          <a:p>
+            <a:endParaRPr lang="en-US"/>
+          </a:p>
+        </p:txBody>
+      </p:sp>
+      <p:sp>
+        <p:nvSpPr>
+          <p:cNvPr id="5" name="Notes Placeholder 4"/>
+          <p:cNvSpPr>
+            <a:spLocks noGrp="1"/>
+          </p:cNvSpPr>
+          <p:nvPr>
+            <p:ph type="body" sz="quarter" idx="3"/>
+          </p:nvPr>
+        </p:nvSpPr>
+        <p:spPr>
+          <a:xfrm>
+            <a:off x="685800" y="4400550"/>
+            <a:ext cx="5486400" cy="3600450"/>
+          </a:xfrm>
+          <a:prstGeom prst="rect">
+            <a:avLst/>
+          </a:prstGeom>
+        </p:spPr>
+        <p:txBody>
+          <a:bodyPr vert="horz" lIns="91440" tIns="45720" rIns="91440" bIns="45720" rtlCol="0"/>
+          <a:lstStyle/>
+          <a:p>
+            <a:pPr lvl="0"/>
+            <a:r>
+              <a:rPr lang="en-US"/>
+              <a:t>Edit Master text styles</a:t>
+            </a:r>
+          </a:p>
+          <a:p>
+            <a:pPr lvl="1"/>
+            <a:r>
+              <a:rPr lang="en-US"/>
+              <a:t>Second level</a:t>
+            </a:r>
+          </a:p>
+          <a:p>
+            <a:pPr lvl="2"/>
+            <a:r>
+              <a:rPr lang="en-US"/>
+              <a:t>Third level</a:t>
+            </a:r>
+          </a:p>
+          <a:p>
+            <a:pPr lvl="3"/>
+            <a:r>
+              <a:rPr lang="en-US"/>
+              <a:t>Fourth level</a:t>
+            </a:r>
+          </a:p>
+          <a:p>
+            <a:pPr lvl="4"/>
+            <a:r>
+              <a:rPr lang="en-US"/>
+              <a:t>Fifth level</a:t>
+            </a:r>
+          </a:p>
+        </p:txBody>
+      </p:sp>
+      <p:sp>
+        <p:nvSpPr>
+          <p:cNvPr id="6" name="Footer Placeholder 5"/>
+          <p:cNvSpPr>
+            <a:spLocks noGrp="1"/>
+          </p:cNvSpPr>
+          <p:nvPr>
+            <p:ph type="ftr" sz="quarter" idx="4"/>
+          </p:nvPr>
+        </p:nvSpPr>
+        <p:spPr>
+          <a:xfrm>
+            <a:off x="0" y="8685213"/>
+            <a:ext cx="2971800" cy="458787"/>
+          </a:xfrm>
+          <a:prstGeom prst="rect">
+            <a:avLst/>
+          </a:prstGeom>
+        </p:spPr>
+        <p:txBody>
+          <a:bodyPr vert="horz" lIns="91440" tIns="45720" rIns="91440" bIns="45720" rtlCol="0" anchor="b"/>
+          <a:lstStyle>
+            <a:lvl1pPr algn="l">
+              <a:defRPr sz="1200"/>
+            </a:lvl1pPr>
+          </a:lstStyle>
+          <a:p>
+            <a:endParaRPr lang="en-US"/>
+          </a:p>
+        </p:txBody>
+      </p:sp>
+      <p:sp>
+        <p:nvSpPr>
+          <p:cNvPr id="7" name="Slide Number Placeholder 6"/>
+          <p:cNvSpPr>
+            <a:spLocks noGrp="1"/>
+          </p:cNvSpPr>
+          <p:nvPr>
+            <p:ph type="sldNum" sz="quarter" idx="5"/>
+          </p:nvPr>
+        </p:nvSpPr>
+        <p:spPr>
+          <a:xfrm>
+            <a:off x="3884613" y="8685213"/>
+            <a:ext cx="2971800" cy="458787"/>
+          </a:xfrm>
+          <a:prstGeom prst="rect">
+            <a:avLst/>
+          </a:prstGeom>
+        </p:spPr>
+        <p:txBody>
+          <a:bodyPr vert="horz" lIns="91440" tIns="45720" rIns="91440" bIns="45720" rtlCol="0" anchor="b"/>
+          <a:lstStyle>
+            <a:lvl1pPr algn="r">
+              <a:defRPr sz="1200"/>
+            </a:lvl1pPr>
+          </a:lstStyle>
+          <a:p>
+            <a:fld id="{040055AD-5A33-45C2-86FC-1D5AA03A95C4}" type="slidenum">
+              <a:rPr lang="en-US" smtClean="0"/>
+              <a:t>‹#›</a:t>
+            </a:fld>
+            <a:endParaRPr lang="en-US"/>
+          </a:p>
+        </p:txBody>
+      </p:sp>
+    </p:spTree>
+    <p:extLst>
+      <p:ext uri="{BB962C8B-B14F-4D97-AF65-F5344CB8AC3E}">
+        <p14:creationId xmlns:p14="http://schemas.microsoft.com/office/powerpoint/2010/main" val="3457895206"/>
+      </p:ext>
+    </p:extLst>
+  </p:cSld>
+  <p:clrMap bg1="lt1" tx1="dk1" bg2="lt2" tx2="dk2" accent1="accent1" accent2="accent2" accent3="accent3" accent4="accent4" accent5="accent5" accent6="accent6" hlink="hlink" folHlink="folHlink"/>
+  <p:notesStyle>
+    <a:lvl1pPr marL="0" algn="l" defTabSz="914400" rtl="0" eaLnBrk="1" latinLnBrk="0" hangingPunct="1">
+      <a:defRPr sz="1200" kern="1200">
+        <a:solidFill>
+          <a:schemeClr val="tx1"/>
+        </a:solidFill>
+        <a:latin typeface="+mn-lt"/>
+        <a:ea typeface="+mn-ea"/>
+        <a:cs typeface="+mn-cs"/>
+      </a:defRPr>
+    </a:lvl1pPr>
+    <a:lvl2pPr marL="457200" algn="l" defTabSz="914400" rtl="0" eaLnBrk="1" latinLnBrk="0" hangingPunct="1">
+      <a:defRPr sz="1200" kern="1200">
+        <a:solidFill>
+          <a:schemeClr val="tx1"/>
+        </a:solidFill>
+        <a:latin typeface="+mn-lt"/>
+        <a:ea typeface="+mn-ea"/>
+        <a:cs typeface="+mn-cs"/>
+      </a:defRPr>
+    </a:lvl2pPr>
+    <a:lvl3pPr marL="914400" algn="l" defTabSz="914400" rtl="0" eaLnBrk="1" latinLnBrk="0" hangingPunct="1">
+      <a:defRPr sz="1200" kern="1200">
+        <a:solidFill>
+          <a:schemeClr val="tx1"/>
+        </a:solidFill>
+        <a:latin typeface="+mn-lt"/>
+        <a:ea typeface="+mn-ea"/>
+        <a:cs typeface="+mn-cs"/>
+      </a:defRPr>
+    </a:lvl3pPr>
+    <a:lvl4pPr marL="1371600" algn="l" defTabSz="914400" rtl="0" eaLnBrk="1" latinLnBrk="0" hangingPunct="1">
+      <a:defRPr sz="1200" kern="1200">
+        <a:solidFill>
+          <a:schemeClr val="tx1"/>
+        </a:solidFill>
+        <a:latin typeface="+mn-lt"/>
+        <a:ea typeface="+mn-ea"/>
+        <a:cs typeface="+mn-cs"/>
+      </a:defRPr>
+    </a:lvl4pPr>
+    <a:lvl5pPr marL="1828800" algn="l" defTabSz="914400" rtl="0" eaLnBrk="1" latinLnBrk="0" hangingPunct="1">
+      <a:defRPr sz="1200" kern="1200">
+        <a:solidFill>
+          <a:schemeClr val="tx1"/>
+        </a:solidFill>
+        <a:latin typeface="+mn-lt"/>
+        <a:ea typeface="+mn-ea"/>
+        <a:cs typeface="+mn-cs"/>
+      </a:defRPr>
+    </a:lvl5pPr>
+    <a:lvl6pPr marL="2286000" algn="l" defTabSz="914400" rtl="0" eaLnBrk="1" latinLnBrk="0" hangingPunct="1">
+      <a:defRPr sz="1200" kern="1200">
+        <a:solidFill>
+          <a:schemeClr val="tx1"/>
+        </a:solidFill>
+        <a:latin typeface="+mn-lt"/>
+        <a:ea typeface="+mn-ea"/>
+        <a:cs typeface="+mn-cs"/>
+      </a:defRPr>
+    </a:lvl6pPr>
+    <a:lvl7pPr marL="2743200" algn="l" defTabSz="914400" rtl="0" eaLnBrk="1" latinLnBrk="0" hangingPunct="1">
+      <a:defRPr sz="1200" kern="1200">
+        <a:solidFill>
+          <a:schemeClr val="tx1"/>
+        </a:solidFill>
+        <a:latin typeface="+mn-lt"/>
+        <a:ea typeface="+mn-ea"/>
+        <a:cs typeface="+mn-cs"/>
+      </a:defRPr>
+    </a:lvl7pPr>
+    <a:lvl8pPr marL="3200400" algn="l" defTabSz="914400" rtl="0" eaLnBrk="1" latinLnBrk="0" hangingPunct="1">
+      <a:defRPr sz="1200" kern="1200">
+        <a:solidFill>
+          <a:schemeClr val="tx1"/>
+        </a:solidFill>
+        <a:latin typeface="+mn-lt"/>
+        <a:ea typeface="+mn-ea"/>
+        <a:cs typeface="+mn-cs"/>
+      </a:defRPr>
+    </a:lvl8pPr>
+    <a:lvl9pPr marL="3657600" algn="l" defTabSz="914400" rtl="0" eaLnBrk="1" latinLnBrk="0" hangingPunct="1">
+      <a:defRPr sz="1200" kern="1200">
+        <a:solidFill>
+          <a:schemeClr val="tx1"/>
+        </a:solidFill>
+        <a:latin typeface="+mn-lt"/>
+        <a:ea typeface="+mn-ea"/>
+        <a:cs typeface="+mn-cs"/>
+      </a:defRPr>
+    </a:lvl9pPr>
+  </p:notesStyle>
+</p:notesMaster>
+</file>
+
+<file path=ppt/notesSlides/notesSlide1.xml><?xml version="1.0" encoding="utf-8"?>
+<p:notes xmlns:a="http://schemas.openxmlformats.org/drawingml/2006/main" xmlns:r="http://schemas.openxmlformats.org/officeDocument/2006/relationships" xmlns:p="http://schemas.openxmlformats.org/presentationml/2006/main">
+  <p:cSld>
+    <p:spTree>
+      <p:nvGrpSpPr>
+        <p:cNvPr id="1" name=""/>
+        <p:cNvGrpSpPr/>
+        <p:nvPr/>
+      </p:nvGrpSpPr>
+      <p:grpSpPr>
+        <a:xfrm>
+          <a:off x="0" y="0"/>
+          <a:ext cx="0" cy="0"/>
+          <a:chOff x="0" y="0"/>
+          <a:chExt cx="0" cy="0"/>
+        </a:xfrm>
+      </p:grpSpPr>
+      <p:sp>
+        <p:nvSpPr>
+          <p:cNvPr id="2" name="Slide Image Placeholder 1"/>
+          <p:cNvSpPr>
+            <a:spLocks noGrp="1" noRot="1" noChangeAspect="1"/>
+          </p:cNvSpPr>
+          <p:nvPr>
+            <p:ph type="sldImg"/>
+          </p:nvPr>
+        </p:nvSpPr>
+        <p:spPr/>
+      </p:sp>
+      <p:sp>
+        <p:nvSpPr>
+          <p:cNvPr id="3" name="Notes Placeholder 2"/>
+          <p:cNvSpPr>
+            <a:spLocks noGrp="1"/>
+          </p:cNvSpPr>
+          <p:nvPr>
+            <p:ph type="body" idx="1"/>
+          </p:nvPr>
+        </p:nvSpPr>
+        <p:spPr/>
+        <p:txBody>
+          <a:bodyPr/>
+          <a:lstStyle/>
+          <a:p>
+            <a:r>
+              <a:rPr lang="en-US" dirty="0"/>
+              <a:t>Adam</a:t>
+            </a:r>
+          </a:p>
+        </p:txBody>
+      </p:sp>
+      <p:sp>
+        <p:nvSpPr>
+          <p:cNvPr id="4" name="Slide Number Placeholder 3"/>
+          <p:cNvSpPr>
+            <a:spLocks noGrp="1"/>
+          </p:cNvSpPr>
+          <p:nvPr>
+            <p:ph type="sldNum" sz="quarter" idx="10"/>
+          </p:nvPr>
+        </p:nvSpPr>
+        <p:spPr/>
+        <p:txBody>
+          <a:bodyPr/>
+          <a:lstStyle/>
+          <a:p>
+            <a:fld id="{040055AD-5A33-45C2-86FC-1D5AA03A95C4}" type="slidenum">
+              <a:rPr lang="en-US" smtClean="0"/>
+              <a:t>1</a:t>
+            </a:fld>
+            <a:endParaRPr lang="en-US"/>
+          </a:p>
+        </p:txBody>
+      </p:sp>
+    </p:spTree>
+    <p:extLst>
+      <p:ext uri="{BB962C8B-B14F-4D97-AF65-F5344CB8AC3E}">
+        <p14:creationId xmlns:p14="http://schemas.microsoft.com/office/powerpoint/2010/main" val="2643998442"/>
+      </p:ext>
+    </p:extLst>
+  </p:cSld>
+  <p:clrMapOvr>
+    <a:masterClrMapping/>
+  </p:clrMapOvr>
+</p:notes>
+</file>
+
+<file path=ppt/notesSlides/notesSlide10.xml><?xml version="1.0" encoding="utf-8"?>
+<p:notes xmlns:a="http://schemas.openxmlformats.org/drawingml/2006/main" xmlns:r="http://schemas.openxmlformats.org/officeDocument/2006/relationships" xmlns:p="http://schemas.openxmlformats.org/presentationml/2006/main">
+  <p:cSld>
+    <p:spTree>
+      <p:nvGrpSpPr>
+        <p:cNvPr id="1" name=""/>
+        <p:cNvGrpSpPr/>
+        <p:nvPr/>
+      </p:nvGrpSpPr>
+      <p:grpSpPr>
+        <a:xfrm>
+          <a:off x="0" y="0"/>
+          <a:ext cx="0" cy="0"/>
+          <a:chOff x="0" y="0"/>
+          <a:chExt cx="0" cy="0"/>
+        </a:xfrm>
+      </p:grpSpPr>
+      <p:sp>
+        <p:nvSpPr>
+          <p:cNvPr id="2" name="Slide Image Placeholder 1"/>
+          <p:cNvSpPr>
+            <a:spLocks noGrp="1" noRot="1" noChangeAspect="1"/>
+          </p:cNvSpPr>
+          <p:nvPr>
+            <p:ph type="sldImg"/>
+          </p:nvPr>
+        </p:nvSpPr>
+        <p:spPr/>
+      </p:sp>
+      <p:sp>
+        <p:nvSpPr>
+          <p:cNvPr id="3" name="Notes Placeholder 2"/>
+          <p:cNvSpPr>
+            <a:spLocks noGrp="1"/>
+          </p:cNvSpPr>
+          <p:nvPr>
+            <p:ph type="body" idx="1"/>
+          </p:nvPr>
+        </p:nvSpPr>
+        <p:spPr/>
+        <p:txBody>
+          <a:bodyPr/>
+          <a:lstStyle/>
+          <a:p>
+            <a:r>
+              <a:rPr lang="en-US" dirty="0" err="1"/>
+              <a:t>Sapana</a:t>
+            </a:r>
+            <a:endParaRPr lang="en-US" dirty="0"/>
+          </a:p>
+        </p:txBody>
+      </p:sp>
+      <p:sp>
+        <p:nvSpPr>
+          <p:cNvPr id="4" name="Slide Number Placeholder 3"/>
+          <p:cNvSpPr>
+            <a:spLocks noGrp="1"/>
+          </p:cNvSpPr>
+          <p:nvPr>
+            <p:ph type="sldNum" sz="quarter" idx="10"/>
+          </p:nvPr>
+        </p:nvSpPr>
+        <p:spPr/>
+        <p:txBody>
+          <a:bodyPr/>
+          <a:lstStyle/>
+          <a:p>
+            <a:fld id="{040055AD-5A33-45C2-86FC-1D5AA03A95C4}" type="slidenum">
+              <a:rPr lang="en-US" smtClean="0"/>
+              <a:t>10</a:t>
+            </a:fld>
+            <a:endParaRPr lang="en-US"/>
+          </a:p>
+        </p:txBody>
+      </p:sp>
+    </p:spTree>
+    <p:extLst>
+      <p:ext uri="{BB962C8B-B14F-4D97-AF65-F5344CB8AC3E}">
+        <p14:creationId xmlns:p14="http://schemas.microsoft.com/office/powerpoint/2010/main" val="3478586359"/>
+      </p:ext>
+    </p:extLst>
+  </p:cSld>
+  <p:clrMapOvr>
+    <a:masterClrMapping/>
+  </p:clrMapOvr>
+</p:notes>
+</file>
+
+<file path=ppt/notesSlides/notesSlide11.xml><?xml version="1.0" encoding="utf-8"?>
+<p:notes xmlns:a="http://schemas.openxmlformats.org/drawingml/2006/main" xmlns:r="http://schemas.openxmlformats.org/officeDocument/2006/relationships" xmlns:p="http://schemas.openxmlformats.org/presentationml/2006/main">
+  <p:cSld>
+    <p:spTree>
+      <p:nvGrpSpPr>
+        <p:cNvPr id="1" name=""/>
+        <p:cNvGrpSpPr/>
+        <p:nvPr/>
+      </p:nvGrpSpPr>
+      <p:grpSpPr>
+        <a:xfrm>
+          <a:off x="0" y="0"/>
+          <a:ext cx="0" cy="0"/>
+          <a:chOff x="0" y="0"/>
+          <a:chExt cx="0" cy="0"/>
+        </a:xfrm>
+      </p:grpSpPr>
+      <p:sp>
+        <p:nvSpPr>
+          <p:cNvPr id="2" name="Slide Image Placeholder 1"/>
+          <p:cNvSpPr>
+            <a:spLocks noGrp="1" noRot="1" noChangeAspect="1"/>
+          </p:cNvSpPr>
+          <p:nvPr>
+            <p:ph type="sldImg"/>
+          </p:nvPr>
+        </p:nvSpPr>
+        <p:spPr/>
+      </p:sp>
+      <p:sp>
+        <p:nvSpPr>
+          <p:cNvPr id="3" name="Notes Placeholder 2"/>
+          <p:cNvSpPr>
+            <a:spLocks noGrp="1"/>
+          </p:cNvSpPr>
+          <p:nvPr>
+            <p:ph type="body" idx="1"/>
+          </p:nvPr>
+        </p:nvSpPr>
+        <p:spPr/>
+        <p:txBody>
+          <a:bodyPr/>
+          <a:lstStyle/>
+          <a:p>
+            <a:r>
+              <a:rPr lang="en-US" dirty="0" err="1"/>
+              <a:t>Sapana</a:t>
+            </a:r>
+            <a:endParaRPr lang="en-US" dirty="0"/>
+          </a:p>
+        </p:txBody>
+      </p:sp>
+      <p:sp>
+        <p:nvSpPr>
+          <p:cNvPr id="4" name="Slide Number Placeholder 3"/>
+          <p:cNvSpPr>
+            <a:spLocks noGrp="1"/>
+          </p:cNvSpPr>
+          <p:nvPr>
+            <p:ph type="sldNum" sz="quarter" idx="10"/>
+          </p:nvPr>
+        </p:nvSpPr>
+        <p:spPr/>
+        <p:txBody>
+          <a:bodyPr/>
+          <a:lstStyle/>
+          <a:p>
+            <a:fld id="{040055AD-5A33-45C2-86FC-1D5AA03A95C4}" type="slidenum">
+              <a:rPr lang="en-US" smtClean="0"/>
+              <a:t>11</a:t>
+            </a:fld>
+            <a:endParaRPr lang="en-US"/>
+          </a:p>
+        </p:txBody>
+      </p:sp>
+    </p:spTree>
+    <p:extLst>
+      <p:ext uri="{BB962C8B-B14F-4D97-AF65-F5344CB8AC3E}">
+        <p14:creationId xmlns:p14="http://schemas.microsoft.com/office/powerpoint/2010/main" val="4158932050"/>
+      </p:ext>
+    </p:extLst>
+  </p:cSld>
+  <p:clrMapOvr>
+    <a:masterClrMapping/>
+  </p:clrMapOvr>
+</p:notes>
+</file>
+
+<file path=ppt/notesSlides/notesSlide12.xml><?xml version="1.0" encoding="utf-8"?>
+<p:notes xmlns:a="http://schemas.openxmlformats.org/drawingml/2006/main" xmlns:r="http://schemas.openxmlformats.org/officeDocument/2006/relationships" xmlns:p="http://schemas.openxmlformats.org/presentationml/2006/main">
+  <p:cSld>
+    <p:spTree>
+      <p:nvGrpSpPr>
+        <p:cNvPr id="1" name=""/>
+        <p:cNvGrpSpPr/>
+        <p:nvPr/>
+      </p:nvGrpSpPr>
+      <p:grpSpPr>
+        <a:xfrm>
+          <a:off x="0" y="0"/>
+          <a:ext cx="0" cy="0"/>
+          <a:chOff x="0" y="0"/>
+          <a:chExt cx="0" cy="0"/>
+        </a:xfrm>
+      </p:grpSpPr>
+      <p:sp>
+        <p:nvSpPr>
+          <p:cNvPr id="2" name="Slide Image Placeholder 1"/>
+          <p:cNvSpPr>
+            <a:spLocks noGrp="1" noRot="1" noChangeAspect="1"/>
+          </p:cNvSpPr>
+          <p:nvPr>
+            <p:ph type="sldImg"/>
+          </p:nvPr>
+        </p:nvSpPr>
+        <p:spPr/>
+      </p:sp>
+      <p:sp>
+        <p:nvSpPr>
+          <p:cNvPr id="3" name="Notes Placeholder 2"/>
+          <p:cNvSpPr>
+            <a:spLocks noGrp="1"/>
+          </p:cNvSpPr>
+          <p:nvPr>
+            <p:ph type="body" idx="1"/>
+          </p:nvPr>
+        </p:nvSpPr>
+        <p:spPr/>
+        <p:txBody>
+          <a:bodyPr/>
+          <a:lstStyle/>
+          <a:p>
+            <a:r>
+              <a:rPr lang="en-US" dirty="0"/>
+              <a:t>Keith</a:t>
+            </a:r>
+          </a:p>
+        </p:txBody>
+      </p:sp>
+      <p:sp>
+        <p:nvSpPr>
+          <p:cNvPr id="4" name="Slide Number Placeholder 3"/>
+          <p:cNvSpPr>
+            <a:spLocks noGrp="1"/>
+          </p:cNvSpPr>
+          <p:nvPr>
+            <p:ph type="sldNum" sz="quarter" idx="10"/>
+          </p:nvPr>
+        </p:nvSpPr>
+        <p:spPr/>
+        <p:txBody>
+          <a:bodyPr/>
+          <a:lstStyle/>
+          <a:p>
+            <a:fld id="{040055AD-5A33-45C2-86FC-1D5AA03A95C4}" type="slidenum">
+              <a:rPr lang="en-US" smtClean="0"/>
+              <a:t>12</a:t>
+            </a:fld>
+            <a:endParaRPr lang="en-US"/>
+          </a:p>
+        </p:txBody>
+      </p:sp>
+    </p:spTree>
+    <p:extLst>
+      <p:ext uri="{BB962C8B-B14F-4D97-AF65-F5344CB8AC3E}">
+        <p14:creationId xmlns:p14="http://schemas.microsoft.com/office/powerpoint/2010/main" val="3878007889"/>
+      </p:ext>
+    </p:extLst>
+  </p:cSld>
+  <p:clrMapOvr>
+    <a:masterClrMapping/>
+  </p:clrMapOvr>
+</p:notes>
+</file>
+
+<file path=ppt/notesSlides/notesSlide13.xml><?xml version="1.0" encoding="utf-8"?>
+<p:notes xmlns:a="http://schemas.openxmlformats.org/drawingml/2006/main" xmlns:r="http://schemas.openxmlformats.org/officeDocument/2006/relationships" xmlns:p="http://schemas.openxmlformats.org/presentationml/2006/main">
+  <p:cSld>
+    <p:spTree>
+      <p:nvGrpSpPr>
+        <p:cNvPr id="1" name=""/>
+        <p:cNvGrpSpPr/>
+        <p:nvPr/>
+      </p:nvGrpSpPr>
+      <p:grpSpPr>
+        <a:xfrm>
+          <a:off x="0" y="0"/>
+          <a:ext cx="0" cy="0"/>
+          <a:chOff x="0" y="0"/>
+          <a:chExt cx="0" cy="0"/>
+        </a:xfrm>
+      </p:grpSpPr>
+      <p:sp>
+        <p:nvSpPr>
+          <p:cNvPr id="2" name="Slide Image Placeholder 1"/>
+          <p:cNvSpPr>
+            <a:spLocks noGrp="1" noRot="1" noChangeAspect="1"/>
+          </p:cNvSpPr>
+          <p:nvPr>
+            <p:ph type="sldImg"/>
+          </p:nvPr>
+        </p:nvSpPr>
+        <p:spPr/>
+      </p:sp>
+      <p:sp>
+        <p:nvSpPr>
+          <p:cNvPr id="3" name="Notes Placeholder 2"/>
+          <p:cNvSpPr>
+            <a:spLocks noGrp="1"/>
+          </p:cNvSpPr>
+          <p:nvPr>
+            <p:ph type="body" idx="1"/>
+          </p:nvPr>
+        </p:nvSpPr>
+        <p:spPr/>
+        <p:txBody>
+          <a:bodyPr/>
+          <a:lstStyle/>
+          <a:p>
+            <a:r>
+              <a:rPr lang="en-US" dirty="0"/>
+              <a:t>Adam</a:t>
+            </a:r>
+          </a:p>
+        </p:txBody>
+      </p:sp>
+      <p:sp>
+        <p:nvSpPr>
+          <p:cNvPr id="4" name="Slide Number Placeholder 3"/>
+          <p:cNvSpPr>
+            <a:spLocks noGrp="1"/>
+          </p:cNvSpPr>
+          <p:nvPr>
+            <p:ph type="sldNum" sz="quarter" idx="10"/>
+          </p:nvPr>
+        </p:nvSpPr>
+        <p:spPr/>
+        <p:txBody>
+          <a:bodyPr/>
+          <a:lstStyle/>
+          <a:p>
+            <a:fld id="{040055AD-5A33-45C2-86FC-1D5AA03A95C4}" type="slidenum">
+              <a:rPr lang="en-US" smtClean="0"/>
+              <a:t>13</a:t>
+            </a:fld>
+            <a:endParaRPr lang="en-US"/>
+          </a:p>
+        </p:txBody>
+      </p:sp>
+    </p:spTree>
+    <p:extLst>
+      <p:ext uri="{BB962C8B-B14F-4D97-AF65-F5344CB8AC3E}">
+        <p14:creationId xmlns:p14="http://schemas.microsoft.com/office/powerpoint/2010/main" val="1735552487"/>
+      </p:ext>
+    </p:extLst>
+  </p:cSld>
+  <p:clrMapOvr>
+    <a:masterClrMapping/>
+  </p:clrMapOvr>
+</p:notes>
+</file>
+
+<file path=ppt/notesSlides/notesSlide14.xml><?xml version="1.0" encoding="utf-8"?>
+<p:notes xmlns:a="http://schemas.openxmlformats.org/drawingml/2006/main" xmlns:r="http://schemas.openxmlformats.org/officeDocument/2006/relationships" xmlns:p="http://schemas.openxmlformats.org/presentationml/2006/main">
+  <p:cSld>
+    <p:spTree>
+      <p:nvGrpSpPr>
+        <p:cNvPr id="1" name=""/>
+        <p:cNvGrpSpPr/>
+        <p:nvPr/>
+      </p:nvGrpSpPr>
+      <p:grpSpPr>
+        <a:xfrm>
+          <a:off x="0" y="0"/>
+          <a:ext cx="0" cy="0"/>
+          <a:chOff x="0" y="0"/>
+          <a:chExt cx="0" cy="0"/>
+        </a:xfrm>
+      </p:grpSpPr>
+      <p:sp>
+        <p:nvSpPr>
+          <p:cNvPr id="2" name="Slide Image Placeholder 1"/>
+          <p:cNvSpPr>
+            <a:spLocks noGrp="1" noRot="1" noChangeAspect="1"/>
+          </p:cNvSpPr>
+          <p:nvPr>
+            <p:ph type="sldImg"/>
+          </p:nvPr>
+        </p:nvSpPr>
+        <p:spPr/>
+      </p:sp>
+      <p:sp>
+        <p:nvSpPr>
+          <p:cNvPr id="3" name="Notes Placeholder 2"/>
+          <p:cNvSpPr>
+            <a:spLocks noGrp="1"/>
+          </p:cNvSpPr>
+          <p:nvPr>
+            <p:ph type="body" idx="1"/>
+          </p:nvPr>
+        </p:nvSpPr>
+        <p:spPr/>
+        <p:txBody>
+          <a:bodyPr/>
+          <a:lstStyle/>
+          <a:p>
+            <a:r>
+              <a:rPr lang="en-US" dirty="0"/>
+              <a:t>Adam</a:t>
+            </a:r>
+          </a:p>
+        </p:txBody>
+      </p:sp>
+      <p:sp>
+        <p:nvSpPr>
+          <p:cNvPr id="4" name="Slide Number Placeholder 3"/>
+          <p:cNvSpPr>
+            <a:spLocks noGrp="1"/>
+          </p:cNvSpPr>
+          <p:nvPr>
+            <p:ph type="sldNum" sz="quarter" idx="10"/>
+          </p:nvPr>
+        </p:nvSpPr>
+        <p:spPr/>
+        <p:txBody>
+          <a:bodyPr/>
+          <a:lstStyle/>
+          <a:p>
+            <a:fld id="{040055AD-5A33-45C2-86FC-1D5AA03A95C4}" type="slidenum">
+              <a:rPr lang="en-US" smtClean="0"/>
+              <a:t>14</a:t>
+            </a:fld>
+            <a:endParaRPr lang="en-US"/>
+          </a:p>
+        </p:txBody>
+      </p:sp>
+    </p:spTree>
+    <p:extLst>
+      <p:ext uri="{BB962C8B-B14F-4D97-AF65-F5344CB8AC3E}">
+        <p14:creationId xmlns:p14="http://schemas.microsoft.com/office/powerpoint/2010/main" val="1384635867"/>
+      </p:ext>
+    </p:extLst>
+  </p:cSld>
+  <p:clrMapOvr>
+    <a:masterClrMapping/>
+  </p:clrMapOvr>
+</p:notes>
+</file>
+
+<file path=ppt/notesSlides/notesSlide2.xml><?xml version="1.0" encoding="utf-8"?>
+<p:notes xmlns:a="http://schemas.openxmlformats.org/drawingml/2006/main" xmlns:r="http://schemas.openxmlformats.org/officeDocument/2006/relationships" xmlns:p="http://schemas.openxmlformats.org/presentationml/2006/main">
+  <p:cSld>
+    <p:spTree>
+      <p:nvGrpSpPr>
+        <p:cNvPr id="1" name=""/>
+        <p:cNvGrpSpPr/>
+        <p:nvPr/>
+      </p:nvGrpSpPr>
+      <p:grpSpPr>
+        <a:xfrm>
+          <a:off x="0" y="0"/>
+          <a:ext cx="0" cy="0"/>
+          <a:chOff x="0" y="0"/>
+          <a:chExt cx="0" cy="0"/>
+        </a:xfrm>
+      </p:grpSpPr>
+      <p:sp>
+        <p:nvSpPr>
+          <p:cNvPr id="2" name="Slide Image Placeholder 1"/>
+          <p:cNvSpPr>
+            <a:spLocks noGrp="1" noRot="1" noChangeAspect="1"/>
+          </p:cNvSpPr>
+          <p:nvPr>
+            <p:ph type="sldImg"/>
+          </p:nvPr>
+        </p:nvSpPr>
+        <p:spPr/>
+      </p:sp>
+      <p:sp>
+        <p:nvSpPr>
+          <p:cNvPr id="3" name="Notes Placeholder 2"/>
+          <p:cNvSpPr>
+            <a:spLocks noGrp="1"/>
+          </p:cNvSpPr>
+          <p:nvPr>
+            <p:ph type="body" idx="1"/>
+          </p:nvPr>
+        </p:nvSpPr>
+        <p:spPr/>
+        <p:txBody>
+          <a:bodyPr/>
+          <a:lstStyle/>
+          <a:p>
+            <a:r>
+              <a:rPr lang="en-US" dirty="0"/>
+              <a:t>Adam</a:t>
+            </a:r>
+          </a:p>
+        </p:txBody>
+      </p:sp>
+      <p:sp>
+        <p:nvSpPr>
+          <p:cNvPr id="4" name="Slide Number Placeholder 3"/>
+          <p:cNvSpPr>
+            <a:spLocks noGrp="1"/>
+          </p:cNvSpPr>
+          <p:nvPr>
+            <p:ph type="sldNum" sz="quarter" idx="10"/>
+          </p:nvPr>
+        </p:nvSpPr>
+        <p:spPr/>
+        <p:txBody>
+          <a:bodyPr/>
+          <a:lstStyle/>
+          <a:p>
+            <a:fld id="{040055AD-5A33-45C2-86FC-1D5AA03A95C4}" type="slidenum">
+              <a:rPr lang="en-US" smtClean="0"/>
+              <a:t>2</a:t>
+            </a:fld>
+            <a:endParaRPr lang="en-US"/>
+          </a:p>
+        </p:txBody>
+      </p:sp>
+    </p:spTree>
+    <p:extLst>
+      <p:ext uri="{BB962C8B-B14F-4D97-AF65-F5344CB8AC3E}">
+        <p14:creationId xmlns:p14="http://schemas.microsoft.com/office/powerpoint/2010/main" val="363728670"/>
+      </p:ext>
+    </p:extLst>
+  </p:cSld>
+  <p:clrMapOvr>
+    <a:masterClrMapping/>
+  </p:clrMapOvr>
+</p:notes>
+</file>
+
+<file path=ppt/notesSlides/notesSlide3.xml><?xml version="1.0" encoding="utf-8"?>
+<p:notes xmlns:a="http://schemas.openxmlformats.org/drawingml/2006/main" xmlns:r="http://schemas.openxmlformats.org/officeDocument/2006/relationships" xmlns:p="http://schemas.openxmlformats.org/presentationml/2006/main">
+  <p:cSld>
+    <p:spTree>
+      <p:nvGrpSpPr>
+        <p:cNvPr id="1" name=""/>
+        <p:cNvGrpSpPr/>
+        <p:nvPr/>
+      </p:nvGrpSpPr>
+      <p:grpSpPr>
+        <a:xfrm>
+          <a:off x="0" y="0"/>
+          <a:ext cx="0" cy="0"/>
+          <a:chOff x="0" y="0"/>
+          <a:chExt cx="0" cy="0"/>
+        </a:xfrm>
+      </p:grpSpPr>
+      <p:sp>
+        <p:nvSpPr>
+          <p:cNvPr id="2" name="Slide Image Placeholder 1"/>
+          <p:cNvSpPr>
+            <a:spLocks noGrp="1" noRot="1" noChangeAspect="1"/>
+          </p:cNvSpPr>
+          <p:nvPr>
+            <p:ph type="sldImg"/>
+          </p:nvPr>
+        </p:nvSpPr>
+        <p:spPr/>
+      </p:sp>
+      <p:sp>
+        <p:nvSpPr>
+          <p:cNvPr id="3" name="Notes Placeholder 2"/>
+          <p:cNvSpPr>
+            <a:spLocks noGrp="1"/>
+          </p:cNvSpPr>
+          <p:nvPr>
+            <p:ph type="body" idx="1"/>
+          </p:nvPr>
+        </p:nvSpPr>
+        <p:spPr/>
+        <p:txBody>
+          <a:bodyPr/>
+          <a:lstStyle/>
+          <a:p>
+            <a:r>
+              <a:rPr lang="en-US" dirty="0"/>
+              <a:t>Adam</a:t>
+            </a:r>
+          </a:p>
+        </p:txBody>
+      </p:sp>
+      <p:sp>
+        <p:nvSpPr>
+          <p:cNvPr id="4" name="Slide Number Placeholder 3"/>
+          <p:cNvSpPr>
+            <a:spLocks noGrp="1"/>
+          </p:cNvSpPr>
+          <p:nvPr>
+            <p:ph type="sldNum" sz="quarter" idx="10"/>
+          </p:nvPr>
+        </p:nvSpPr>
+        <p:spPr/>
+        <p:txBody>
+          <a:bodyPr/>
+          <a:lstStyle/>
+          <a:p>
+            <a:fld id="{040055AD-5A33-45C2-86FC-1D5AA03A95C4}" type="slidenum">
+              <a:rPr lang="en-US" smtClean="0"/>
+              <a:t>3</a:t>
+            </a:fld>
+            <a:endParaRPr lang="en-US"/>
+          </a:p>
+        </p:txBody>
+      </p:sp>
+    </p:spTree>
+    <p:extLst>
+      <p:ext uri="{BB962C8B-B14F-4D97-AF65-F5344CB8AC3E}">
+        <p14:creationId xmlns:p14="http://schemas.microsoft.com/office/powerpoint/2010/main" val="1315812396"/>
+      </p:ext>
+    </p:extLst>
+  </p:cSld>
+  <p:clrMapOvr>
+    <a:masterClrMapping/>
+  </p:clrMapOvr>
+</p:notes>
+</file>
+
+<file path=ppt/notesSlides/notesSlide4.xml><?xml version="1.0" encoding="utf-8"?>
+<p:notes xmlns:a="http://schemas.openxmlformats.org/drawingml/2006/main" xmlns:r="http://schemas.openxmlformats.org/officeDocument/2006/relationships" xmlns:p="http://schemas.openxmlformats.org/presentationml/2006/main">
+  <p:cSld>
+    <p:spTree>
+      <p:nvGrpSpPr>
+        <p:cNvPr id="1" name=""/>
+        <p:cNvGrpSpPr/>
+        <p:nvPr/>
+      </p:nvGrpSpPr>
+      <p:grpSpPr>
+        <a:xfrm>
+          <a:off x="0" y="0"/>
+          <a:ext cx="0" cy="0"/>
+          <a:chOff x="0" y="0"/>
+          <a:chExt cx="0" cy="0"/>
+        </a:xfrm>
+      </p:grpSpPr>
+      <p:sp>
+        <p:nvSpPr>
+          <p:cNvPr id="2" name="Slide Image Placeholder 1"/>
+          <p:cNvSpPr>
+            <a:spLocks noGrp="1" noRot="1" noChangeAspect="1"/>
+          </p:cNvSpPr>
+          <p:nvPr>
+            <p:ph type="sldImg"/>
+          </p:nvPr>
+        </p:nvSpPr>
+        <p:spPr/>
+      </p:sp>
+      <p:sp>
+        <p:nvSpPr>
+          <p:cNvPr id="3" name="Notes Placeholder 2"/>
+          <p:cNvSpPr>
+            <a:spLocks noGrp="1"/>
+          </p:cNvSpPr>
+          <p:nvPr>
+            <p:ph type="body" idx="1"/>
+          </p:nvPr>
+        </p:nvSpPr>
+        <p:spPr/>
+        <p:txBody>
+          <a:bodyPr/>
+          <a:lstStyle/>
+          <a:p>
+            <a:r>
+              <a:rPr lang="en-US" dirty="0"/>
+              <a:t>Keith</a:t>
+            </a:r>
+          </a:p>
+        </p:txBody>
+      </p:sp>
+      <p:sp>
+        <p:nvSpPr>
+          <p:cNvPr id="4" name="Slide Number Placeholder 3"/>
+          <p:cNvSpPr>
+            <a:spLocks noGrp="1"/>
+          </p:cNvSpPr>
+          <p:nvPr>
+            <p:ph type="sldNum" sz="quarter" idx="10"/>
+          </p:nvPr>
+        </p:nvSpPr>
+        <p:spPr/>
+        <p:txBody>
+          <a:bodyPr/>
+          <a:lstStyle/>
+          <a:p>
+            <a:fld id="{040055AD-5A33-45C2-86FC-1D5AA03A95C4}" type="slidenum">
+              <a:rPr lang="en-US" smtClean="0"/>
+              <a:t>4</a:t>
+            </a:fld>
+            <a:endParaRPr lang="en-US"/>
+          </a:p>
+        </p:txBody>
+      </p:sp>
+    </p:spTree>
+    <p:extLst>
+      <p:ext uri="{BB962C8B-B14F-4D97-AF65-F5344CB8AC3E}">
+        <p14:creationId xmlns:p14="http://schemas.microsoft.com/office/powerpoint/2010/main" val="3154512088"/>
+      </p:ext>
+    </p:extLst>
+  </p:cSld>
+  <p:clrMapOvr>
+    <a:masterClrMapping/>
+  </p:clrMapOvr>
+</p:notes>
+</file>
+
+<file path=ppt/notesSlides/notesSlide5.xml><?xml version="1.0" encoding="utf-8"?>
+<p:notes xmlns:a="http://schemas.openxmlformats.org/drawingml/2006/main" xmlns:r="http://schemas.openxmlformats.org/officeDocument/2006/relationships" xmlns:p="http://schemas.openxmlformats.org/presentationml/2006/main">
+  <p:cSld>
+    <p:spTree>
+      <p:nvGrpSpPr>
+        <p:cNvPr id="1" name=""/>
+        <p:cNvGrpSpPr/>
+        <p:nvPr/>
+      </p:nvGrpSpPr>
+      <p:grpSpPr>
+        <a:xfrm>
+          <a:off x="0" y="0"/>
+          <a:ext cx="0" cy="0"/>
+          <a:chOff x="0" y="0"/>
+          <a:chExt cx="0" cy="0"/>
+        </a:xfrm>
+      </p:grpSpPr>
+      <p:sp>
+        <p:nvSpPr>
+          <p:cNvPr id="2" name="Slide Image Placeholder 1"/>
+          <p:cNvSpPr>
+            <a:spLocks noGrp="1" noRot="1" noChangeAspect="1"/>
+          </p:cNvSpPr>
+          <p:nvPr>
+            <p:ph type="sldImg"/>
+          </p:nvPr>
+        </p:nvSpPr>
+        <p:spPr/>
+      </p:sp>
+      <p:sp>
+        <p:nvSpPr>
+          <p:cNvPr id="3" name="Notes Placeholder 2"/>
+          <p:cNvSpPr>
+            <a:spLocks noGrp="1"/>
+          </p:cNvSpPr>
+          <p:nvPr>
+            <p:ph type="body" idx="1"/>
+          </p:nvPr>
+        </p:nvSpPr>
+        <p:spPr/>
+        <p:txBody>
+          <a:bodyPr/>
+          <a:lstStyle/>
+          <a:p>
+            <a:r>
+              <a:rPr lang="en-US" dirty="0" err="1"/>
+              <a:t>Rak</a:t>
+            </a:r>
+            <a:endParaRPr lang="en-US" dirty="0"/>
+          </a:p>
+        </p:txBody>
+      </p:sp>
+      <p:sp>
+        <p:nvSpPr>
+          <p:cNvPr id="4" name="Slide Number Placeholder 3"/>
+          <p:cNvSpPr>
+            <a:spLocks noGrp="1"/>
+          </p:cNvSpPr>
+          <p:nvPr>
+            <p:ph type="sldNum" sz="quarter" idx="10"/>
+          </p:nvPr>
+        </p:nvSpPr>
+        <p:spPr/>
+        <p:txBody>
+          <a:bodyPr/>
+          <a:lstStyle/>
+          <a:p>
+            <a:fld id="{040055AD-5A33-45C2-86FC-1D5AA03A95C4}" type="slidenum">
+              <a:rPr lang="en-US" smtClean="0"/>
+              <a:t>5</a:t>
+            </a:fld>
+            <a:endParaRPr lang="en-US"/>
+          </a:p>
+        </p:txBody>
+      </p:sp>
+    </p:spTree>
+    <p:extLst>
+      <p:ext uri="{BB962C8B-B14F-4D97-AF65-F5344CB8AC3E}">
+        <p14:creationId xmlns:p14="http://schemas.microsoft.com/office/powerpoint/2010/main" val="2647904866"/>
+      </p:ext>
+    </p:extLst>
+  </p:cSld>
+  <p:clrMapOvr>
+    <a:masterClrMapping/>
+  </p:clrMapOvr>
+</p:notes>
+</file>
+
+<file path=ppt/notesSlides/notesSlide6.xml><?xml version="1.0" encoding="utf-8"?>
+<p:notes xmlns:a="http://schemas.openxmlformats.org/drawingml/2006/main" xmlns:r="http://schemas.openxmlformats.org/officeDocument/2006/relationships" xmlns:p="http://schemas.openxmlformats.org/presentationml/2006/main">
+  <p:cSld>
+    <p:spTree>
+      <p:nvGrpSpPr>
+        <p:cNvPr id="1" name=""/>
+        <p:cNvGrpSpPr/>
+        <p:nvPr/>
+      </p:nvGrpSpPr>
+      <p:grpSpPr>
+        <a:xfrm>
+          <a:off x="0" y="0"/>
+          <a:ext cx="0" cy="0"/>
+          <a:chOff x="0" y="0"/>
+          <a:chExt cx="0" cy="0"/>
+        </a:xfrm>
+      </p:grpSpPr>
+      <p:sp>
+        <p:nvSpPr>
+          <p:cNvPr id="2" name="Slide Image Placeholder 1"/>
+          <p:cNvSpPr>
+            <a:spLocks noGrp="1" noRot="1" noChangeAspect="1"/>
+          </p:cNvSpPr>
+          <p:nvPr>
+            <p:ph type="sldImg"/>
+          </p:nvPr>
+        </p:nvSpPr>
+        <p:spPr/>
+      </p:sp>
+      <p:sp>
+        <p:nvSpPr>
+          <p:cNvPr id="3" name="Notes Placeholder 2"/>
+          <p:cNvSpPr>
+            <a:spLocks noGrp="1"/>
+          </p:cNvSpPr>
+          <p:nvPr>
+            <p:ph type="body" idx="1"/>
+          </p:nvPr>
+        </p:nvSpPr>
+        <p:spPr/>
+        <p:txBody>
+          <a:bodyPr/>
+          <a:lstStyle/>
+          <a:p>
+            <a:r>
+              <a:rPr lang="en-US" dirty="0" err="1"/>
+              <a:t>Rak</a:t>
+            </a:r>
+            <a:endParaRPr lang="en-US" dirty="0"/>
+          </a:p>
+        </p:txBody>
+      </p:sp>
+      <p:sp>
+        <p:nvSpPr>
+          <p:cNvPr id="4" name="Slide Number Placeholder 3"/>
+          <p:cNvSpPr>
+            <a:spLocks noGrp="1"/>
+          </p:cNvSpPr>
+          <p:nvPr>
+            <p:ph type="sldNum" sz="quarter" idx="10"/>
+          </p:nvPr>
+        </p:nvSpPr>
+        <p:spPr/>
+        <p:txBody>
+          <a:bodyPr/>
+          <a:lstStyle/>
+          <a:p>
+            <a:fld id="{040055AD-5A33-45C2-86FC-1D5AA03A95C4}" type="slidenum">
+              <a:rPr lang="en-US" smtClean="0"/>
+              <a:t>6</a:t>
+            </a:fld>
+            <a:endParaRPr lang="en-US"/>
+          </a:p>
+        </p:txBody>
+      </p:sp>
+    </p:spTree>
+    <p:extLst>
+      <p:ext uri="{BB962C8B-B14F-4D97-AF65-F5344CB8AC3E}">
+        <p14:creationId xmlns:p14="http://schemas.microsoft.com/office/powerpoint/2010/main" val="3171891504"/>
+      </p:ext>
+    </p:extLst>
+  </p:cSld>
+  <p:clrMapOvr>
+    <a:masterClrMapping/>
+  </p:clrMapOvr>
+</p:notes>
+</file>
+
+<file path=ppt/notesSlides/notesSlide7.xml><?xml version="1.0" encoding="utf-8"?>
+<p:notes xmlns:a="http://schemas.openxmlformats.org/drawingml/2006/main" xmlns:r="http://schemas.openxmlformats.org/officeDocument/2006/relationships" xmlns:p="http://schemas.openxmlformats.org/presentationml/2006/main">
+  <p:cSld>
+    <p:spTree>
+      <p:nvGrpSpPr>
+        <p:cNvPr id="1" name=""/>
+        <p:cNvGrpSpPr/>
+        <p:nvPr/>
+      </p:nvGrpSpPr>
+      <p:grpSpPr>
+        <a:xfrm>
+          <a:off x="0" y="0"/>
+          <a:ext cx="0" cy="0"/>
+          <a:chOff x="0" y="0"/>
+          <a:chExt cx="0" cy="0"/>
+        </a:xfrm>
+      </p:grpSpPr>
+      <p:sp>
+        <p:nvSpPr>
+          <p:cNvPr id="2" name="Slide Image Placeholder 1"/>
+          <p:cNvSpPr>
+            <a:spLocks noGrp="1" noRot="1" noChangeAspect="1"/>
+          </p:cNvSpPr>
+          <p:nvPr>
+            <p:ph type="sldImg"/>
+          </p:nvPr>
+        </p:nvSpPr>
+        <p:spPr/>
+      </p:sp>
+      <p:sp>
+        <p:nvSpPr>
+          <p:cNvPr id="3" name="Notes Placeholder 2"/>
+          <p:cNvSpPr>
+            <a:spLocks noGrp="1"/>
+          </p:cNvSpPr>
+          <p:nvPr>
+            <p:ph type="body" idx="1"/>
+          </p:nvPr>
+        </p:nvSpPr>
+        <p:spPr/>
+        <p:txBody>
+          <a:bodyPr/>
+          <a:lstStyle/>
+          <a:p>
+            <a:r>
+              <a:rPr lang="en-US" dirty="0"/>
+              <a:t>Adam</a:t>
+            </a:r>
+          </a:p>
+        </p:txBody>
+      </p:sp>
+      <p:sp>
+        <p:nvSpPr>
+          <p:cNvPr id="4" name="Slide Number Placeholder 3"/>
+          <p:cNvSpPr>
+            <a:spLocks noGrp="1"/>
+          </p:cNvSpPr>
+          <p:nvPr>
+            <p:ph type="sldNum" sz="quarter" idx="10"/>
+          </p:nvPr>
+        </p:nvSpPr>
+        <p:spPr/>
+        <p:txBody>
+          <a:bodyPr/>
+          <a:lstStyle/>
+          <a:p>
+            <a:fld id="{040055AD-5A33-45C2-86FC-1D5AA03A95C4}" type="slidenum">
+              <a:rPr lang="en-US" smtClean="0"/>
+              <a:t>7</a:t>
+            </a:fld>
+            <a:endParaRPr lang="en-US"/>
+          </a:p>
+        </p:txBody>
+      </p:sp>
+    </p:spTree>
+    <p:extLst>
+      <p:ext uri="{BB962C8B-B14F-4D97-AF65-F5344CB8AC3E}">
+        <p14:creationId xmlns:p14="http://schemas.microsoft.com/office/powerpoint/2010/main" val="972977736"/>
+      </p:ext>
+    </p:extLst>
+  </p:cSld>
+  <p:clrMapOvr>
+    <a:masterClrMapping/>
+  </p:clrMapOvr>
+</p:notes>
+</file>
+
+<file path=ppt/notesSlides/notesSlide8.xml><?xml version="1.0" encoding="utf-8"?>
+<p:notes xmlns:a="http://schemas.openxmlformats.org/drawingml/2006/main" xmlns:r="http://schemas.openxmlformats.org/officeDocument/2006/relationships" xmlns:p="http://schemas.openxmlformats.org/presentationml/2006/main">
+  <p:cSld>
+    <p:spTree>
+      <p:nvGrpSpPr>
+        <p:cNvPr id="1" name=""/>
+        <p:cNvGrpSpPr/>
+        <p:nvPr/>
+      </p:nvGrpSpPr>
+      <p:grpSpPr>
+        <a:xfrm>
+          <a:off x="0" y="0"/>
+          <a:ext cx="0" cy="0"/>
+          <a:chOff x="0" y="0"/>
+          <a:chExt cx="0" cy="0"/>
+        </a:xfrm>
+      </p:grpSpPr>
+      <p:sp>
+        <p:nvSpPr>
+          <p:cNvPr id="2" name="Slide Image Placeholder 1"/>
+          <p:cNvSpPr>
+            <a:spLocks noGrp="1" noRot="1" noChangeAspect="1"/>
+          </p:cNvSpPr>
+          <p:nvPr>
+            <p:ph type="sldImg"/>
+          </p:nvPr>
+        </p:nvSpPr>
+        <p:spPr/>
+      </p:sp>
+      <p:sp>
+        <p:nvSpPr>
+          <p:cNvPr id="3" name="Notes Placeholder 2"/>
+          <p:cNvSpPr>
+            <a:spLocks noGrp="1"/>
+          </p:cNvSpPr>
+          <p:nvPr>
+            <p:ph type="body" idx="1"/>
+          </p:nvPr>
+        </p:nvSpPr>
+        <p:spPr/>
+        <p:txBody>
+          <a:bodyPr/>
+          <a:lstStyle/>
+          <a:p>
+            <a:r>
+              <a:rPr lang="en-US" dirty="0"/>
+              <a:t>Keith</a:t>
+            </a:r>
+          </a:p>
+        </p:txBody>
+      </p:sp>
+      <p:sp>
+        <p:nvSpPr>
+          <p:cNvPr id="4" name="Slide Number Placeholder 3"/>
+          <p:cNvSpPr>
+            <a:spLocks noGrp="1"/>
+          </p:cNvSpPr>
+          <p:nvPr>
+            <p:ph type="sldNum" sz="quarter" idx="10"/>
+          </p:nvPr>
+        </p:nvSpPr>
+        <p:spPr/>
+        <p:txBody>
+          <a:bodyPr/>
+          <a:lstStyle/>
+          <a:p>
+            <a:fld id="{040055AD-5A33-45C2-86FC-1D5AA03A95C4}" type="slidenum">
+              <a:rPr lang="en-US" smtClean="0"/>
+              <a:t>8</a:t>
+            </a:fld>
+            <a:endParaRPr lang="en-US"/>
+          </a:p>
+        </p:txBody>
+      </p:sp>
+    </p:spTree>
+    <p:extLst>
+      <p:ext uri="{BB962C8B-B14F-4D97-AF65-F5344CB8AC3E}">
+        <p14:creationId xmlns:p14="http://schemas.microsoft.com/office/powerpoint/2010/main" val="2495481140"/>
+      </p:ext>
+    </p:extLst>
+  </p:cSld>
+  <p:clrMapOvr>
+    <a:masterClrMapping/>
+  </p:clrMapOvr>
+</p:notes>
+</file>
+
+<file path=ppt/notesSlides/notesSlide9.xml><?xml version="1.0" encoding="utf-8"?>
+<p:notes xmlns:a="http://schemas.openxmlformats.org/drawingml/2006/main" xmlns:r="http://schemas.openxmlformats.org/officeDocument/2006/relationships" xmlns:p="http://schemas.openxmlformats.org/presentationml/2006/main">
+  <p:cSld>
+    <p:spTree>
+      <p:nvGrpSpPr>
+        <p:cNvPr id="1" name=""/>
+        <p:cNvGrpSpPr/>
+        <p:nvPr/>
+      </p:nvGrpSpPr>
+      <p:grpSpPr>
+        <a:xfrm>
+          <a:off x="0" y="0"/>
+          <a:ext cx="0" cy="0"/>
+          <a:chOff x="0" y="0"/>
+          <a:chExt cx="0" cy="0"/>
+        </a:xfrm>
+      </p:grpSpPr>
+      <p:sp>
+        <p:nvSpPr>
+          <p:cNvPr id="2" name="Slide Image Placeholder 1"/>
+          <p:cNvSpPr>
+            <a:spLocks noGrp="1" noRot="1" noChangeAspect="1"/>
+          </p:cNvSpPr>
+          <p:nvPr>
+            <p:ph type="sldImg"/>
+          </p:nvPr>
+        </p:nvSpPr>
+        <p:spPr/>
+      </p:sp>
+      <p:sp>
+        <p:nvSpPr>
+          <p:cNvPr id="3" name="Notes Placeholder 2"/>
+          <p:cNvSpPr>
+            <a:spLocks noGrp="1"/>
+          </p:cNvSpPr>
+          <p:nvPr>
+            <p:ph type="body" idx="1"/>
+          </p:nvPr>
+        </p:nvSpPr>
+        <p:spPr/>
+        <p:txBody>
+          <a:bodyPr/>
+          <a:lstStyle/>
+          <a:p>
+            <a:r>
+              <a:rPr lang="en-US" dirty="0" err="1"/>
+              <a:t>Sapana</a:t>
+            </a:r>
+            <a:endParaRPr lang="en-US" dirty="0"/>
+          </a:p>
+        </p:txBody>
+      </p:sp>
+      <p:sp>
+        <p:nvSpPr>
+          <p:cNvPr id="4" name="Slide Number Placeholder 3"/>
+          <p:cNvSpPr>
+            <a:spLocks noGrp="1"/>
+          </p:cNvSpPr>
+          <p:nvPr>
+            <p:ph type="sldNum" sz="quarter" idx="10"/>
+          </p:nvPr>
+        </p:nvSpPr>
+        <p:spPr/>
+        <p:txBody>
+          <a:bodyPr/>
+          <a:lstStyle/>
+          <a:p>
+            <a:fld id="{040055AD-5A33-45C2-86FC-1D5AA03A95C4}" type="slidenum">
+              <a:rPr lang="en-US" smtClean="0"/>
+              <a:t>9</a:t>
+            </a:fld>
+            <a:endParaRPr lang="en-US"/>
+          </a:p>
+        </p:txBody>
+      </p:sp>
+    </p:spTree>
+    <p:extLst>
+      <p:ext uri="{BB962C8B-B14F-4D97-AF65-F5344CB8AC3E}">
+        <p14:creationId xmlns:p14="http://schemas.microsoft.com/office/powerpoint/2010/main" val="1224869671"/>
+      </p:ext>
+    </p:extLst>
+  </p:cSld>
+  <p:clrMapOvr>
+    <a:masterClrMapping/>
+  </p:clrMapOvr>
+</p:notes>
 </file>
 
 <file path=ppt/slideLayouts/slideLayout1.xml><?xml version="1.0" encoding="utf-8"?>
@@ -12380,7 +13984,7 @@
           <p:cNvPr id="2" name="Title 1">
             <a:extLst>
               <a:ext uri="{FF2B5EF4-FFF2-40B4-BE49-F238E27FC236}">
-                <a16:creationId xmlns="" xmlns:a16="http://schemas.microsoft.com/office/drawing/2014/main" id="{78629773-1F2F-4DEA-A804-323B3E4F7636}"/>
+                <a16:creationId xmlns:a16="http://schemas.microsoft.com/office/drawing/2014/main" id="{78629773-1F2F-4DEA-A804-323B3E4F7636}"/>
               </a:ext>
             </a:extLst>
           </p:cNvPr>
@@ -12416,7 +14020,7 @@
           <p:cNvPr id="3" name="Subtitle 2">
             <a:extLst>
               <a:ext uri="{FF2B5EF4-FFF2-40B4-BE49-F238E27FC236}">
-                <a16:creationId xmlns="" xmlns:a16="http://schemas.microsoft.com/office/drawing/2014/main" id="{236AD9E0-AFB8-49D5-852F-5BFFF4F9DA95}"/>
+                <a16:creationId xmlns:a16="http://schemas.microsoft.com/office/drawing/2014/main" id="{236AD9E0-AFB8-49D5-852F-5BFFF4F9DA95}"/>
               </a:ext>
             </a:extLst>
           </p:cNvPr>
@@ -12473,13 +14077,6 @@
   <p:clrMapOvr>
     <a:masterClrMapping/>
   </p:clrMapOvr>
-  <p:timing>
-    <p:tnLst>
-      <p:par>
-        <p:cTn id="1" dur="indefinite" restart="never" nodeType="tmRoot"/>
-      </p:par>
-    </p:tnLst>
-  </p:timing>
 </p:sld>
 </file>
 
@@ -12505,7 +14102,7 @@
           <p:cNvPr id="2" name="Title 1">
             <a:extLst>
               <a:ext uri="{FF2B5EF4-FFF2-40B4-BE49-F238E27FC236}">
-                <a16:creationId xmlns="" xmlns:a16="http://schemas.microsoft.com/office/drawing/2014/main" id="{9A49EC41-9B0B-40CB-9E1E-85D4384B9E7A}"/>
+                <a16:creationId xmlns:a16="http://schemas.microsoft.com/office/drawing/2014/main" id="{9A49EC41-9B0B-40CB-9E1E-85D4384B9E7A}"/>
               </a:ext>
             </a:extLst>
           </p:cNvPr>
@@ -12533,7 +14130,7 @@
           <p:cNvPr id="3" name="Content Placeholder 2">
             <a:extLst>
               <a:ext uri="{FF2B5EF4-FFF2-40B4-BE49-F238E27FC236}">
-                <a16:creationId xmlns="" xmlns:a16="http://schemas.microsoft.com/office/drawing/2014/main" id="{A022F38E-8C72-47DE-836C-4A96E047F639}"/>
+                <a16:creationId xmlns:a16="http://schemas.microsoft.com/office/drawing/2014/main" id="{A022F38E-8C72-47DE-836C-4A96E047F639}"/>
               </a:ext>
             </a:extLst>
           </p:cNvPr>
@@ -12551,29 +14148,45 @@
           <a:p>
             <a:pPr fontAlgn="base"/>
             <a:r>
+              <a:rPr lang="en-US" b="1" u="sng" dirty="0"/>
+              <a:t>Auto Manufactures</a:t>
+            </a:r>
+            <a:r>
               <a:rPr lang="en-US" dirty="0"/>
-              <a:t>Auto Manufactures - Big selling point as it increases car safety </a:t>
+              <a:t> - Big selling point as it increases car safety </a:t>
             </a:r>
           </a:p>
           <a:p>
             <a:pPr fontAlgn="base"/>
             <a:r>
+              <a:rPr lang="en-US" b="1" u="sng" dirty="0"/>
+              <a:t>Auto Insurance Companies</a:t>
+            </a:r>
+            <a:r>
               <a:rPr lang="en-US" dirty="0"/>
-              <a:t>Auto Insurance Companies - If a car could detect danger and stop before accident happens, saves life and property</a:t>
+              <a:t> - If a car could detect danger and stop before accident happens, saves life and property</a:t>
             </a:r>
           </a:p>
           <a:p>
             <a:pPr fontAlgn="base"/>
             <a:r>
+              <a:rPr lang="en-US" b="1" u="sng" dirty="0"/>
+              <a:t>Everyone who operates car</a:t>
+            </a:r>
+            <a:r>
               <a:rPr lang="en-US" dirty="0"/>
-              <a:t>Everyone who owns car - Safety of the driver and family members, reduces the car insurance because of safety discount</a:t>
+              <a:t> - Safety of the driver and family members, reduces the car insurance because of safety discount</a:t>
             </a:r>
           </a:p>
           <a:p>
             <a:pPr fontAlgn="base"/>
             <a:r>
+              <a:rPr lang="en-US" b="1" u="sng" dirty="0"/>
+              <a:t>Law Enforcement</a:t>
+            </a:r>
+            <a:r>
               <a:rPr lang="en-US" dirty="0"/>
-              <a:t>Law Enforcement - Less accidents, less law enforcement involvement</a:t>
+              <a:t> - Less accidents, less law enforcement involvement</a:t>
             </a:r>
           </a:p>
           <a:p>
@@ -12591,13 +14204,6 @@
   <p:clrMapOvr>
     <a:masterClrMapping/>
   </p:clrMapOvr>
-  <p:timing>
-    <p:tnLst>
-      <p:par>
-        <p:cTn id="1" dur="indefinite" restart="never" nodeType="tmRoot"/>
-      </p:par>
-    </p:tnLst>
-  </p:timing>
 </p:sld>
 </file>
 
@@ -12623,7 +14229,7 @@
           <p:cNvPr id="2" name="Title 1">
             <a:extLst>
               <a:ext uri="{FF2B5EF4-FFF2-40B4-BE49-F238E27FC236}">
-                <a16:creationId xmlns="" xmlns:a16="http://schemas.microsoft.com/office/drawing/2014/main" id="{9A49EC41-9B0B-40CB-9E1E-85D4384B9E7A}"/>
+                <a16:creationId xmlns:a16="http://schemas.microsoft.com/office/drawing/2014/main" id="{9A49EC41-9B0B-40CB-9E1E-85D4384B9E7A}"/>
               </a:ext>
             </a:extLst>
           </p:cNvPr>
@@ -12641,7 +14247,7 @@
           <a:p>
             <a:r>
               <a:rPr lang="en-US" dirty="0"/>
-              <a:t>impact</a:t>
+              <a:t>Impact – reduce accident cost/fatalities</a:t>
             </a:r>
           </a:p>
         </p:txBody>
@@ -12651,7 +14257,7 @@
           <p:cNvPr id="3" name="Content Placeholder 2">
             <a:extLst>
               <a:ext uri="{FF2B5EF4-FFF2-40B4-BE49-F238E27FC236}">
-                <a16:creationId xmlns="" xmlns:a16="http://schemas.microsoft.com/office/drawing/2014/main" id="{A022F38E-8C72-47DE-836C-4A96E047F639}"/>
+                <a16:creationId xmlns:a16="http://schemas.microsoft.com/office/drawing/2014/main" id="{A022F38E-8C72-47DE-836C-4A96E047F639}"/>
               </a:ext>
             </a:extLst>
           </p:cNvPr>
@@ -12702,13 +14308,6 @@
   <p:clrMapOvr>
     <a:masterClrMapping/>
   </p:clrMapOvr>
-  <p:timing>
-    <p:tnLst>
-      <p:par>
-        <p:cTn id="1" dur="indefinite" restart="never" nodeType="tmRoot"/>
-      </p:par>
-    </p:tnLst>
-  </p:timing>
 </p:sld>
 </file>
 
@@ -12734,7 +14333,7 @@
           <p:cNvPr id="2" name="Title 1">
             <a:extLst>
               <a:ext uri="{FF2B5EF4-FFF2-40B4-BE49-F238E27FC236}">
-                <a16:creationId xmlns="" xmlns:a16="http://schemas.microsoft.com/office/drawing/2014/main" id="{F1B978BA-83B7-49DD-AA89-E0B2140251EF}"/>
+                <a16:creationId xmlns:a16="http://schemas.microsoft.com/office/drawing/2014/main" id="{F1B978BA-83B7-49DD-AA89-E0B2140251EF}"/>
               </a:ext>
             </a:extLst>
           </p:cNvPr>
@@ -12762,7 +14361,7 @@
           <p:cNvPr id="3" name="Content Placeholder 2">
             <a:extLst>
               <a:ext uri="{FF2B5EF4-FFF2-40B4-BE49-F238E27FC236}">
-                <a16:creationId xmlns="" xmlns:a16="http://schemas.microsoft.com/office/drawing/2014/main" id="{1F59F962-AF4D-410A-B933-7A6CEB775654}"/>
+                <a16:creationId xmlns:a16="http://schemas.microsoft.com/office/drawing/2014/main" id="{1F59F962-AF4D-410A-B933-7A6CEB775654}"/>
               </a:ext>
             </a:extLst>
           </p:cNvPr>
@@ -12782,7 +14381,11 @@
           <a:p>
             <a:r>
               <a:rPr lang="en-US" b="1" u="sng" dirty="0"/>
-              <a:t>New platform: </a:t>
+              <a:t>New platform:</a:t>
+            </a:r>
+            <a:r>
+              <a:rPr lang="en-US" b="1" dirty="0"/>
+              <a:t> </a:t>
             </a:r>
             <a:r>
               <a:rPr lang="en-US" dirty="0"/>
@@ -12811,7 +14414,7 @@
           </a:p>
           <a:p>
             <a:r>
-              <a:rPr lang="en-US" u="sng" dirty="0"/>
+              <a:rPr lang="en-US" b="1" u="sng" dirty="0"/>
               <a:t>Distributed Team:</a:t>
             </a:r>
             <a:r>
@@ -12832,13 +14435,6 @@
   <p:clrMapOvr>
     <a:masterClrMapping/>
   </p:clrMapOvr>
-  <p:timing>
-    <p:tnLst>
-      <p:par>
-        <p:cTn id="1" dur="indefinite" restart="never" nodeType="tmRoot"/>
-      </p:par>
-    </p:tnLst>
-  </p:timing>
 </p:sld>
 </file>
 
@@ -12864,7 +14460,7 @@
           <p:cNvPr id="2" name="Title 1">
             <a:extLst>
               <a:ext uri="{FF2B5EF4-FFF2-40B4-BE49-F238E27FC236}">
-                <a16:creationId xmlns="" xmlns:a16="http://schemas.microsoft.com/office/drawing/2014/main" id="{F1B978BA-83B7-49DD-AA89-E0B2140251EF}"/>
+                <a16:creationId xmlns:a16="http://schemas.microsoft.com/office/drawing/2014/main" id="{F1B978BA-83B7-49DD-AA89-E0B2140251EF}"/>
               </a:ext>
             </a:extLst>
           </p:cNvPr>
@@ -12892,7 +14488,7 @@
           <p:cNvPr id="3" name="Content Placeholder 2">
             <a:extLst>
               <a:ext uri="{FF2B5EF4-FFF2-40B4-BE49-F238E27FC236}">
-                <a16:creationId xmlns="" xmlns:a16="http://schemas.microsoft.com/office/drawing/2014/main" id="{1F59F962-AF4D-410A-B933-7A6CEB775654}"/>
+                <a16:creationId xmlns:a16="http://schemas.microsoft.com/office/drawing/2014/main" id="{1F59F962-AF4D-410A-B933-7A6CEB775654}"/>
               </a:ext>
             </a:extLst>
           </p:cNvPr>
@@ -12964,7 +14560,7 @@
             </a:r>
             <a:r>
               <a:rPr lang="en-US" dirty="0">
-                <a:hlinkClick r:id="rId2"/>
+                <a:hlinkClick r:id="rId3"/>
               </a:rPr>
               <a:t>https://github.com/Scarabyte/SSW690-Project</a:t>
             </a:r>
@@ -12982,13 +14578,6 @@
   <p:clrMapOvr>
     <a:masterClrMapping/>
   </p:clrMapOvr>
-  <p:timing>
-    <p:tnLst>
-      <p:par>
-        <p:cTn id="1" dur="indefinite" restart="never" nodeType="tmRoot"/>
-      </p:par>
-    </p:tnLst>
-  </p:timing>
 </p:sld>
 </file>
 
@@ -13065,7 +14654,7 @@
             </a:r>
             <a:r>
               <a:rPr lang="en-US" sz="1400" dirty="0">
-                <a:hlinkClick r:id="rId2"/>
+                <a:hlinkClick r:id="rId3"/>
               </a:rPr>
               <a:t>http://unearthedcomics.com/comics/distracted-driving/</a:t>
             </a:r>
@@ -13087,7 +14676,7 @@
           </p:nvPr>
         </p:nvPicPr>
         <p:blipFill>
-          <a:blip r:embed="rId3">
+          <a:blip r:embed="rId4">
             <a:extLst>
               <a:ext uri="{28A0092B-C50C-407E-A947-70E740481C1C}">
                 <a14:useLocalDpi xmlns:a14="http://schemas.microsoft.com/office/drawing/2010/main" val="0"/>
@@ -13154,7 +14743,7 @@
           <p:cNvPr id="2" name="Title 1">
             <a:extLst>
               <a:ext uri="{FF2B5EF4-FFF2-40B4-BE49-F238E27FC236}">
-                <a16:creationId xmlns="" xmlns:a16="http://schemas.microsoft.com/office/drawing/2014/main" id="{5F163758-F730-4FFD-9F9E-F0FC8CDDB240}"/>
+                <a16:creationId xmlns:a16="http://schemas.microsoft.com/office/drawing/2014/main" id="{5F163758-F730-4FFD-9F9E-F0FC8CDDB240}"/>
               </a:ext>
             </a:extLst>
           </p:cNvPr>
@@ -13182,7 +14771,7 @@
           <p:cNvPr id="3" name="Content Placeholder 2">
             <a:extLst>
               <a:ext uri="{FF2B5EF4-FFF2-40B4-BE49-F238E27FC236}">
-                <a16:creationId xmlns="" xmlns:a16="http://schemas.microsoft.com/office/drawing/2014/main" id="{C5EBD364-4FCA-4AC5-A62F-1E06EC8240DE}"/>
+                <a16:creationId xmlns:a16="http://schemas.microsoft.com/office/drawing/2014/main" id="{C5EBD364-4FCA-4AC5-A62F-1E06EC8240DE}"/>
               </a:ext>
             </a:extLst>
           </p:cNvPr>
@@ -13204,10 +14793,6 @@
               <a:rPr lang="en-US" u="sng" dirty="0"/>
               <a:t>Belorkar, Sapana</a:t>
             </a:r>
-            <a:r>
-              <a:rPr lang="en-US" dirty="0"/>
-              <a:t/>
-            </a:r>
             <a:br>
               <a:rPr lang="en-US" dirty="0"/>
             </a:br>
@@ -13238,10 +14823,6 @@
               <a:rPr lang="en-US" u="sng" dirty="0"/>
               <a:t>Roseberry, Keith</a:t>
             </a:r>
-            <a:r>
-              <a:rPr lang="en-US" dirty="0"/>
-              <a:t/>
-            </a:r>
             <a:br>
               <a:rPr lang="en-US" dirty="0"/>
             </a:br>
@@ -13254,10 +14835,6 @@
             <a:r>
               <a:rPr lang="en-US" u="sng" dirty="0"/>
               <a:t>Varadaraju, Rakshith</a:t>
-            </a:r>
-            <a:r>
-              <a:rPr lang="en-US" dirty="0"/>
-              <a:t/>
             </a:r>
             <a:br>
               <a:rPr lang="en-US" dirty="0"/>
@@ -13279,13 +14856,6 @@
   <p:clrMapOvr>
     <a:masterClrMapping/>
   </p:clrMapOvr>
-  <p:timing>
-    <p:tnLst>
-      <p:par>
-        <p:cTn id="1" dur="indefinite" restart="never" nodeType="tmRoot"/>
-      </p:par>
-    </p:tnLst>
-  </p:timing>
 </p:sld>
 </file>
 
@@ -13311,7 +14881,7 @@
           <p:cNvPr id="2" name="Title 1">
             <a:extLst>
               <a:ext uri="{FF2B5EF4-FFF2-40B4-BE49-F238E27FC236}">
-                <a16:creationId xmlns="" xmlns:a16="http://schemas.microsoft.com/office/drawing/2014/main" id="{948A0E38-AB97-4175-B372-9627013E206C}"/>
+                <a16:creationId xmlns:a16="http://schemas.microsoft.com/office/drawing/2014/main" id="{948A0E38-AB97-4175-B372-9627013E206C}"/>
               </a:ext>
             </a:extLst>
           </p:cNvPr>
@@ -13339,7 +14909,7 @@
           <p:cNvPr id="3" name="Content Placeholder 2">
             <a:extLst>
               <a:ext uri="{FF2B5EF4-FFF2-40B4-BE49-F238E27FC236}">
-                <a16:creationId xmlns="" xmlns:a16="http://schemas.microsoft.com/office/drawing/2014/main" id="{1CAB4BB1-33CD-4BB7-BA3A-A13ECB37D4A2}"/>
+                <a16:creationId xmlns:a16="http://schemas.microsoft.com/office/drawing/2014/main" id="{1CAB4BB1-33CD-4BB7-BA3A-A13ECB37D4A2}"/>
               </a:ext>
             </a:extLst>
           </p:cNvPr>
@@ -13352,7 +14922,9 @@
         </p:nvSpPr>
         <p:spPr/>
         <p:txBody>
-          <a:bodyPr/>
+          <a:bodyPr>
+            <a:normAutofit fontScale="92500" lnSpcReduction="10000"/>
+          </a:bodyPr>
           <a:lstStyle/>
           <a:p>
             <a:r>
@@ -13361,6 +14933,23 @@
             </a:r>
           </a:p>
           <a:p>
+            <a:r>
+              <a:rPr lang="en-US" dirty="0"/>
+              <a:t>Project will attempt one or more of:</a:t>
+            </a:r>
+          </a:p>
+          <a:p>
+            <a:pPr lvl="1"/>
+            <a:r>
+              <a:rPr lang="en-US" b="1" u="sng" dirty="0"/>
+              <a:t>Collision and Obstacle Avoidance:</a:t>
+            </a:r>
+            <a:r>
+              <a:rPr lang="en-US" dirty="0"/>
+              <a:t> Detect obstacles in the path of the vehicle to predict collisions and warn the operator.</a:t>
+            </a:r>
+          </a:p>
+          <a:p>
             <a:pPr lvl="1"/>
             <a:r>
               <a:rPr lang="en-US" b="1" u="sng" dirty="0"/>
@@ -13380,17 +14969,6 @@
             <a:r>
               <a:rPr lang="en-US" dirty="0"/>
               <a:t> Determine when the vehicle is departing from its travel lane and warn the operator. Requires recognition of a travel lane.</a:t>
-            </a:r>
-          </a:p>
-          <a:p>
-            <a:pPr lvl="1"/>
-            <a:r>
-              <a:rPr lang="en-US" b="1" u="sng" dirty="0"/>
-              <a:t>Collision and Obstacle Avoidance:</a:t>
-            </a:r>
-            <a:r>
-              <a:rPr lang="en-US" dirty="0"/>
-              <a:t> Detect obstacles in the path of the vehicle to predict collisions and warn the operator.</a:t>
             </a:r>
           </a:p>
         </p:txBody>
@@ -13405,13 +14983,6 @@
   <p:clrMapOvr>
     <a:masterClrMapping/>
   </p:clrMapOvr>
-  <p:timing>
-    <p:tnLst>
-      <p:par>
-        <p:cTn id="1" dur="indefinite" restart="never" nodeType="tmRoot"/>
-      </p:par>
-    </p:tnLst>
-  </p:timing>
 </p:sld>
 </file>
 
@@ -13437,7 +15008,7 @@
           <p:cNvPr id="2" name="Title 1">
             <a:extLst>
               <a:ext uri="{FF2B5EF4-FFF2-40B4-BE49-F238E27FC236}">
-                <a16:creationId xmlns="" xmlns:a16="http://schemas.microsoft.com/office/drawing/2014/main" id="{B0E04909-FB5A-4AD9-BC1D-52CB8571C410}"/>
+                <a16:creationId xmlns:a16="http://schemas.microsoft.com/office/drawing/2014/main" id="{B0E04909-FB5A-4AD9-BC1D-52CB8571C410}"/>
               </a:ext>
             </a:extLst>
           </p:cNvPr>
@@ -13471,7 +15042,7 @@
           </p:nvPr>
         </p:nvPicPr>
         <p:blipFill>
-          <a:blip r:embed="rId2">
+          <a:blip r:embed="rId3">
             <a:extLst>
               <a:ext uri="{28A0092B-C50C-407E-A947-70E740481C1C}">
                 <a14:useLocalDpi xmlns:a14="http://schemas.microsoft.com/office/drawing/2010/main" val="0"/>
@@ -13499,13 +15070,6 @@
   <p:clrMapOvr>
     <a:masterClrMapping/>
   </p:clrMapOvr>
-  <p:timing>
-    <p:tnLst>
-      <p:par>
-        <p:cTn id="1" dur="indefinite" restart="never" nodeType="tmRoot"/>
-      </p:par>
-    </p:tnLst>
-  </p:timing>
 </p:sld>
 </file>
 
@@ -13531,7 +15095,7 @@
           <p:cNvPr id="2" name="Title 1">
             <a:extLst>
               <a:ext uri="{FF2B5EF4-FFF2-40B4-BE49-F238E27FC236}">
-                <a16:creationId xmlns="" xmlns:a16="http://schemas.microsoft.com/office/drawing/2014/main" id="{2F9C508A-2D2E-40EA-AB1F-43041265C737}"/>
+                <a16:creationId xmlns:a16="http://schemas.microsoft.com/office/drawing/2014/main" id="{2F9C508A-2D2E-40EA-AB1F-43041265C737}"/>
               </a:ext>
             </a:extLst>
           </p:cNvPr>
@@ -13559,7 +15123,7 @@
           <p:cNvPr id="3" name="Content Placeholder 2">
             <a:extLst>
               <a:ext uri="{FF2B5EF4-FFF2-40B4-BE49-F238E27FC236}">
-                <a16:creationId xmlns="" xmlns:a16="http://schemas.microsoft.com/office/drawing/2014/main" id="{106A0B8A-4FAA-4568-A060-1D584F6F45C1}"/>
+                <a16:creationId xmlns:a16="http://schemas.microsoft.com/office/drawing/2014/main" id="{106A0B8A-4FAA-4568-A060-1D584F6F45C1}"/>
               </a:ext>
             </a:extLst>
           </p:cNvPr>
@@ -13583,7 +15147,7 @@
             </a:r>
             <a:r>
               <a:rPr lang="en-US" dirty="0"/>
-              <a:t> An OO architecture will help to create an encapsulated, modular software system that can be built on. OO architecture will also help distribute the work across the team members.</a:t>
+              <a:t> An OO architecture will help to create an encapsulated, modular software system that can be built on. OO architecture will also help distribute the work across the team members</a:t>
             </a:r>
           </a:p>
           <a:p>
@@ -13599,7 +15163,7 @@
           <a:p>
             <a:r>
               <a:rPr lang="en-US" u="sng" dirty="0"/>
-              <a:t>Processing Optimizations:</a:t>
+              <a:t>Processing Optimization:</a:t>
             </a:r>
             <a:r>
               <a:rPr lang="en-US" dirty="0"/>
@@ -13619,13 +15183,6 @@
   <p:clrMapOvr>
     <a:masterClrMapping/>
   </p:clrMapOvr>
-  <p:timing>
-    <p:tnLst>
-      <p:par>
-        <p:cTn id="1" dur="indefinite" restart="never" nodeType="tmRoot"/>
-      </p:par>
-    </p:tnLst>
-  </p:timing>
 </p:sld>
 </file>
 
@@ -13651,7 +15208,7 @@
           <p:cNvPr id="2" name="Title 1">
             <a:extLst>
               <a:ext uri="{FF2B5EF4-FFF2-40B4-BE49-F238E27FC236}">
-                <a16:creationId xmlns="" xmlns:a16="http://schemas.microsoft.com/office/drawing/2014/main" id="{30E1123C-963D-45A1-979B-3FACC9F01257}"/>
+                <a16:creationId xmlns:a16="http://schemas.microsoft.com/office/drawing/2014/main" id="{30E1123C-963D-45A1-979B-3FACC9F01257}"/>
               </a:ext>
             </a:extLst>
           </p:cNvPr>
@@ -13679,7 +15236,7 @@
           <p:cNvPr id="3" name="Content Placeholder 2">
             <a:extLst>
               <a:ext uri="{FF2B5EF4-FFF2-40B4-BE49-F238E27FC236}">
-                <a16:creationId xmlns="" xmlns:a16="http://schemas.microsoft.com/office/drawing/2014/main" id="{B9A684A9-BC2F-4302-BF2F-FFE0E47DB328}"/>
+                <a16:creationId xmlns:a16="http://schemas.microsoft.com/office/drawing/2014/main" id="{B9A684A9-BC2F-4302-BF2F-FFE0E47DB328}"/>
               </a:ext>
             </a:extLst>
           </p:cNvPr>
@@ -13703,45 +15260,32 @@
           <a:lstStyle/>
           <a:p>
             <a:r>
-              <a:rPr lang="en-US" b="1" u="sng" dirty="0" smtClean="0"/>
+              <a:rPr lang="en-US" b="1" u="sng" dirty="0"/>
               <a:t>Modular structure:</a:t>
             </a:r>
             <a:r>
-              <a:rPr lang="en-US" dirty="0" smtClean="0"/>
+              <a:rPr lang="en-US" dirty="0"/>
               <a:t> With an OO architecture, each independent function can be partitioned into its own module</a:t>
             </a:r>
           </a:p>
           <a:p>
             <a:pPr lvl="1"/>
             <a:r>
-              <a:rPr lang="en-US" dirty="0" smtClean="0"/>
-              <a:t>This allows for simultaneous </a:t>
-            </a:r>
-            <a:r>
               <a:rPr lang="en-US" dirty="0"/>
-              <a:t>development and </a:t>
-            </a:r>
-            <a:r>
-              <a:rPr lang="en-US" dirty="0" smtClean="0"/>
-              <a:t>independent verification activities</a:t>
+              <a:t>This allows for simultaneous development and independent verification activities</a:t>
             </a:r>
           </a:p>
           <a:p>
             <a:pPr lvl="1"/>
             <a:r>
-              <a:rPr lang="en-US" dirty="0" smtClean="0"/>
-              <a:t>Some high-level functions are common across system functions and will need to be completed prior to lower-level functions</a:t>
-            </a:r>
-            <a:endParaRPr lang="en-US" dirty="0"/>
-          </a:p>
-          <a:p>
-            <a:r>
-              <a:rPr lang="en-US" b="1" u="sng" dirty="0" smtClean="0"/>
-              <a:t>Common functions </a:t>
-            </a:r>
+              <a:rPr lang="en-US" dirty="0"/>
+              <a:t>Some high-level functions are common across system functions and may need to be completed prior to lower-level functions</a:t>
+            </a:r>
+          </a:p>
+          <a:p>
             <a:r>
               <a:rPr lang="en-US" b="1" u="sng" dirty="0"/>
-              <a:t>the system performs:</a:t>
+              <a:t>Common functions the system performs:</a:t>
             </a:r>
             <a:endParaRPr lang="en-US" dirty="0"/>
           </a:p>
@@ -13756,64 +15300,22 @@
             <a:pPr lvl="1"/>
             <a:r>
               <a:rPr lang="en-US" dirty="0"/>
-              <a:t>Object </a:t>
-            </a:r>
-            <a:r>
-              <a:rPr lang="en-US" dirty="0" smtClean="0"/>
-              <a:t>recognition</a:t>
-            </a:r>
+              <a:t>Object recognition: Once an object is identified, the system classifies it and calls the appropriate sub-function to handle the event</a:t>
+            </a:r>
+          </a:p>
+          <a:p>
+            <a:pPr lvl="2"/>
             <a:r>
               <a:rPr lang="en-US" dirty="0"/>
-              <a:t>: Once an object </a:t>
-            </a:r>
-            <a:r>
-              <a:rPr lang="en-US" dirty="0" smtClean="0"/>
-              <a:t>is </a:t>
-            </a:r>
+              <a:t>For example, a lane marker is in the picture frame; is there a lane departure event?</a:t>
+            </a:r>
+          </a:p>
+          <a:p>
+            <a:pPr lvl="1"/>
             <a:r>
               <a:rPr lang="en-US" dirty="0"/>
-              <a:t>identified, the system classifies </a:t>
-            </a:r>
-            <a:r>
-              <a:rPr lang="en-US" dirty="0" smtClean="0"/>
-              <a:t>it and calls the appropriate sub-function to handle the event</a:t>
-            </a:r>
-          </a:p>
-          <a:p>
-            <a:pPr lvl="2"/>
-            <a:r>
-              <a:rPr lang="en-US" dirty="0" smtClean="0"/>
-              <a:t>For example, a lane marker is in the picture frame; is there a lane departure event?</a:t>
-            </a:r>
-            <a:endParaRPr lang="en-US" dirty="0"/>
-          </a:p>
-          <a:p>
-            <a:pPr lvl="1"/>
-            <a:r>
-              <a:rPr lang="en-US" dirty="0"/>
-              <a:t>Notification: When a significant object </a:t>
-            </a:r>
-            <a:r>
-              <a:rPr lang="en-US" dirty="0" smtClean="0"/>
-              <a:t>or event </a:t>
-            </a:r>
-            <a:r>
-              <a:rPr lang="en-US" dirty="0"/>
-              <a:t>is confirmed, </a:t>
-            </a:r>
-            <a:r>
-              <a:rPr lang="en-US" dirty="0" smtClean="0"/>
-              <a:t>the sub-function returns the results so the system can notify </a:t>
-            </a:r>
-            <a:r>
-              <a:rPr lang="en-US" dirty="0"/>
-              <a:t>the </a:t>
-            </a:r>
-            <a:r>
-              <a:rPr lang="en-US" dirty="0" smtClean="0"/>
-              <a:t>driver</a:t>
-            </a:r>
-            <a:endParaRPr lang="en-US" dirty="0"/>
+              <a:t>Notification: When a significant object or event is confirmed, the sub-function returns the results so the system can notify the driver</a:t>
+            </a:r>
           </a:p>
         </p:txBody>
       </p:sp>
@@ -13827,13 +15329,6 @@
   <p:clrMapOvr>
     <a:masterClrMapping/>
   </p:clrMapOvr>
-  <p:timing>
-    <p:tnLst>
-      <p:par>
-        <p:cTn id="1" dur="indefinite" restart="never" nodeType="tmRoot"/>
-      </p:par>
-    </p:tnLst>
-  </p:timing>
 </p:sld>
 </file>
 
@@ -13859,7 +15354,7 @@
           <p:cNvPr id="2" name="Title 1">
             <a:extLst>
               <a:ext uri="{FF2B5EF4-FFF2-40B4-BE49-F238E27FC236}">
-                <a16:creationId xmlns="" xmlns:a16="http://schemas.microsoft.com/office/drawing/2014/main" id="{30E1123C-963D-45A1-979B-3FACC9F01257}"/>
+                <a16:creationId xmlns:a16="http://schemas.microsoft.com/office/drawing/2014/main" id="{30E1123C-963D-45A1-979B-3FACC9F01257}"/>
               </a:ext>
             </a:extLst>
           </p:cNvPr>
@@ -13887,7 +15382,7 @@
           <p:cNvPr id="3" name="Content Placeholder 2">
             <a:extLst>
               <a:ext uri="{FF2B5EF4-FFF2-40B4-BE49-F238E27FC236}">
-                <a16:creationId xmlns="" xmlns:a16="http://schemas.microsoft.com/office/drawing/2014/main" id="{B9A684A9-BC2F-4302-BF2F-FFE0E47DB328}"/>
+                <a16:creationId xmlns:a16="http://schemas.microsoft.com/office/drawing/2014/main" id="{B9A684A9-BC2F-4302-BF2F-FFE0E47DB328}"/>
               </a:ext>
             </a:extLst>
           </p:cNvPr>
@@ -13911,12 +15406,8 @@
           <a:lstStyle/>
           <a:p>
             <a:r>
-              <a:rPr lang="en-US" b="1" u="sng" dirty="0" smtClean="0"/>
-              <a:t>Needs </a:t>
-            </a:r>
-            <a:r>
               <a:rPr lang="en-US" b="1" u="sng" dirty="0"/>
-              <a:t>to yield results fast enough to improve driver safety:</a:t>
+              <a:t>Needs to yield results fast enough to improve driver safety:</a:t>
             </a:r>
             <a:endParaRPr lang="en-US" dirty="0"/>
           </a:p>
@@ -13933,47 +15424,6 @@
             <a:r>
               <a:rPr lang="en-US" dirty="0"/>
               <a:t> </a:t>
-            </a:r>
-          </a:p>
-          <a:p>
-            <a:pPr lvl="2"/>
-            <a:r>
-              <a:rPr lang="en-US" dirty="0">
-                <a:hlinkClick r:id="rId2"/>
-              </a:rPr>
-              <a:t>https://copradar.com/redlight/factors/index.html</a:t>
-            </a:r>
-            <a:r>
-              <a:rPr lang="en-US" dirty="0"/>
-              <a:t> </a:t>
-            </a:r>
-          </a:p>
-          <a:p>
-            <a:pPr lvl="1"/>
-            <a:r>
-              <a:rPr lang="en-US" dirty="0"/>
-              <a:t>Average reaction time in general:</a:t>
-            </a:r>
-          </a:p>
-          <a:p>
-            <a:pPr lvl="2"/>
-            <a:r>
-              <a:rPr lang="en-US" dirty="0"/>
-              <a:t>0.25 seconds for visual stimulus</a:t>
-            </a:r>
-          </a:p>
-          <a:p>
-            <a:pPr lvl="2"/>
-            <a:r>
-              <a:rPr lang="en-US" dirty="0"/>
-              <a:t>0.17 for audio stimulus</a:t>
-            </a:r>
-          </a:p>
-          <a:p>
-            <a:pPr lvl="2"/>
-            <a:r>
-              <a:rPr lang="en-US" dirty="0"/>
-              <a:t>0.15 seconds for touch stimulus</a:t>
             </a:r>
           </a:p>
           <a:p>
@@ -13982,41 +15432,80 @@
               <a:rPr lang="en-US" dirty="0">
                 <a:hlinkClick r:id="rId3"/>
               </a:rPr>
-              <a:t>https://backyardbrains.com/experiments/reactiontime</a:t>
+              <a:t>https://copradar.com/redlight/factors/index.html</a:t>
             </a:r>
             <a:r>
               <a:rPr lang="en-US" dirty="0"/>
               <a:t> </a:t>
             </a:r>
-            <a:endParaRPr lang="en-US" dirty="0" smtClean="0"/>
-          </a:p>
-          <a:p>
-            <a:r>
-              <a:rPr lang="en-US" dirty="0" smtClean="0"/>
+          </a:p>
+          <a:p>
+            <a:pPr lvl="1"/>
+            <a:r>
+              <a:rPr lang="en-US" dirty="0"/>
+              <a:t>Average reaction time in general:</a:t>
+            </a:r>
+          </a:p>
+          <a:p>
+            <a:pPr lvl="2"/>
+            <a:r>
+              <a:rPr lang="en-US" dirty="0"/>
+              <a:t>0.25 seconds for visual stimulus</a:t>
+            </a:r>
+          </a:p>
+          <a:p>
+            <a:pPr lvl="2"/>
+            <a:r>
+              <a:rPr lang="en-US" dirty="0"/>
+              <a:t>0.17 for audio stimulus</a:t>
+            </a:r>
+          </a:p>
+          <a:p>
+            <a:pPr lvl="2"/>
+            <a:r>
+              <a:rPr lang="en-US" dirty="0"/>
+              <a:t>0.15 seconds for touch stimulus</a:t>
+            </a:r>
+          </a:p>
+          <a:p>
+            <a:pPr lvl="2"/>
+            <a:r>
+              <a:rPr lang="en-US" dirty="0">
+                <a:hlinkClick r:id="rId4"/>
+              </a:rPr>
+              <a:t>https://backyardbrains.com/experiments/reactiontime</a:t>
+            </a:r>
+            <a:r>
+              <a:rPr lang="en-US" dirty="0"/>
+              <a:t> </a:t>
+            </a:r>
+          </a:p>
+          <a:p>
+            <a:r>
+              <a:rPr lang="en-US" dirty="0"/>
               <a:t>These are the minimum results needed to allow human to react to stimuli</a:t>
             </a:r>
           </a:p>
           <a:p>
             <a:pPr lvl="1"/>
             <a:r>
-              <a:rPr lang="en-US" dirty="0" smtClean="0"/>
+              <a:rPr lang="en-US" dirty="0"/>
               <a:t>Can the target environment support a sufficient response rate?</a:t>
             </a:r>
           </a:p>
           <a:p>
             <a:pPr lvl="2"/>
             <a:r>
-              <a:rPr lang="en-US" dirty="0" smtClean="0"/>
+              <a:rPr lang="en-US" dirty="0"/>
               <a:t>Raspberry Pi has limited processing power; suitable for real-time video processing?</a:t>
             </a:r>
           </a:p>
           <a:p>
             <a:pPr lvl="2"/>
             <a:r>
-              <a:rPr lang="en-US" dirty="0" smtClean="0"/>
+              <a:rPr lang="en-US" dirty="0"/>
               <a:t>Mobile Android platforms represent many configurations; can we guarantee performance results?</a:t>
             </a:r>
-            <a:endParaRPr lang="en-US" dirty="0"/>
           </a:p>
         </p:txBody>
       </p:sp>
@@ -14030,13 +15519,6 @@
   <p:clrMapOvr>
     <a:masterClrMapping/>
   </p:clrMapOvr>
-  <p:timing>
-    <p:tnLst>
-      <p:par>
-        <p:cTn id="1" dur="indefinite" restart="never" nodeType="tmRoot"/>
-      </p:par>
-    </p:tnLst>
-  </p:timing>
 </p:sld>
 </file>
 
@@ -14062,7 +15544,7 @@
           <p:cNvPr id="2" name="Title 1">
             <a:extLst>
               <a:ext uri="{FF2B5EF4-FFF2-40B4-BE49-F238E27FC236}">
-                <a16:creationId xmlns="" xmlns:a16="http://schemas.microsoft.com/office/drawing/2014/main" id="{30E1123C-963D-45A1-979B-3FACC9F01257}"/>
+                <a16:creationId xmlns:a16="http://schemas.microsoft.com/office/drawing/2014/main" id="{30E1123C-963D-45A1-979B-3FACC9F01257}"/>
               </a:ext>
             </a:extLst>
           </p:cNvPr>
@@ -14090,7 +15572,7 @@
           <p:cNvPr id="3" name="Content Placeholder 2">
             <a:extLst>
               <a:ext uri="{FF2B5EF4-FFF2-40B4-BE49-F238E27FC236}">
-                <a16:creationId xmlns="" xmlns:a16="http://schemas.microsoft.com/office/drawing/2014/main" id="{B9A684A9-BC2F-4302-BF2F-FFE0E47DB328}"/>
+                <a16:creationId xmlns:a16="http://schemas.microsoft.com/office/drawing/2014/main" id="{B9A684A9-BC2F-4302-BF2F-FFE0E47DB328}"/>
               </a:ext>
             </a:extLst>
           </p:cNvPr>
@@ -14190,7 +15672,7 @@
             <a:pPr lvl="2"/>
             <a:r>
               <a:rPr lang="en-US" dirty="0"/>
-              <a:t>Excludes nighttime and bright sunlight/glare conditions</a:t>
+              <a:t>Excludes nighttime, adverse weather and bright sunlight/glare conditions</a:t>
             </a:r>
           </a:p>
         </p:txBody>
@@ -14205,13 +15687,6 @@
   <p:clrMapOvr>
     <a:masterClrMapping/>
   </p:clrMapOvr>
-  <p:timing>
-    <p:tnLst>
-      <p:par>
-        <p:cTn id="1" dur="indefinite" restart="never" nodeType="tmRoot"/>
-      </p:par>
-    </p:tnLst>
-  </p:timing>
 </p:sld>
 </file>
 
@@ -14237,7 +15712,7 @@
           <p:cNvPr id="2" name="Title 1">
             <a:extLst>
               <a:ext uri="{FF2B5EF4-FFF2-40B4-BE49-F238E27FC236}">
-                <a16:creationId xmlns="" xmlns:a16="http://schemas.microsoft.com/office/drawing/2014/main" id="{9A49EC41-9B0B-40CB-9E1E-85D4384B9E7A}"/>
+                <a16:creationId xmlns:a16="http://schemas.microsoft.com/office/drawing/2014/main" id="{9A49EC41-9B0B-40CB-9E1E-85D4384B9E7A}"/>
               </a:ext>
             </a:extLst>
           </p:cNvPr>
@@ -14265,7 +15740,7 @@
           <p:cNvPr id="3" name="Content Placeholder 2">
             <a:extLst>
               <a:ext uri="{FF2B5EF4-FFF2-40B4-BE49-F238E27FC236}">
-                <a16:creationId xmlns="" xmlns:a16="http://schemas.microsoft.com/office/drawing/2014/main" id="{A022F38E-8C72-47DE-836C-4A96E047F639}"/>
+                <a16:creationId xmlns:a16="http://schemas.microsoft.com/office/drawing/2014/main" id="{A022F38E-8C72-47DE-836C-4A96E047F639}"/>
               </a:ext>
             </a:extLst>
           </p:cNvPr>
@@ -14283,15 +15758,31 @@
           <a:p>
             <a:pPr fontAlgn="base"/>
             <a:r>
+              <a:rPr lang="en-US" b="1" u="sng" dirty="0"/>
+              <a:t>Auto Manufacturers</a:t>
+            </a:r>
+            <a:r>
+              <a:rPr lang="en-US" b="1" dirty="0"/>
+              <a:t> </a:t>
+            </a:r>
+            <a:r>
               <a:rPr lang="en-US" dirty="0"/>
-              <a:t>Auto Manufacturers - Computer Vision driving aids can be used as an important safety feature in all types of vehicles. It plays major role in autonomous vehicles</a:t>
+              <a:t>- Computer Vision driving aids can be used as an important safety feature in all types of vehicles. It plays major role in autonomous vehicles</a:t>
             </a:r>
           </a:p>
           <a:p>
             <a:pPr fontAlgn="base"/>
             <a:r>
+              <a:rPr lang="en-US" b="1" u="sng" dirty="0"/>
+              <a:t>Visually impaired(VI) assistance technology manufacturers</a:t>
+            </a:r>
+            <a:r>
+              <a:rPr lang="en-US" b="1" dirty="0"/>
+              <a:t> </a:t>
+            </a:r>
+            <a:r>
               <a:rPr lang="en-US" dirty="0"/>
-              <a:t>Visually impaired(VI) assistance technology manufacturers - To provide additional support, or possibly replace the long cane and the guide dog</a:t>
+              <a:t>- To provide additional support, or possibly replace the long cane and the guide dog</a:t>
             </a:r>
           </a:p>
           <a:p>
@@ -14309,13 +15800,6 @@
   <p:clrMapOvr>
     <a:masterClrMapping/>
   </p:clrMapOvr>
-  <p:timing>
-    <p:tnLst>
-      <p:par>
-        <p:cTn id="1" dur="indefinite" restart="never" nodeType="tmRoot"/>
-      </p:par>
-    </p:tnLst>
-  </p:timing>
 </p:sld>
 </file>
 
@@ -14564,7 +16048,302 @@
   <a:extraClrSchemeLst/>
   <a:extLst>
     <a:ext uri="{05A4C25C-085E-4340-85A3-A5531E510DB2}">
-      <thm15:themeFamily xmlns="" xmlns:thm15="http://schemas.microsoft.com/office/thememl/2012/main" name="Circuit" id="{0AC2F7E7-15F5-431C-B2A2-456FE929F56C}" vid="{0911B802-464C-4241-8DD9-B60FF88E379F}"/>
+      <thm15:themeFamily xmlns:thm15="http://schemas.microsoft.com/office/thememl/2012/main" name="Circuit" id="{0AC2F7E7-15F5-431C-B2A2-456FE929F56C}" vid="{0911B802-464C-4241-8DD9-B60FF88E379F}"/>
+    </a:ext>
+  </a:extLst>
+</a:theme>
+</file>
+
+<file path=ppt/theme/theme2.xml><?xml version="1.0" encoding="utf-8"?>
+<a:theme xmlns:a="http://schemas.openxmlformats.org/drawingml/2006/main" name="Office Theme">
+  <a:themeElements>
+    <a:clrScheme name="Office">
+      <a:dk1>
+        <a:sysClr val="windowText" lastClr="000000"/>
+      </a:dk1>
+      <a:lt1>
+        <a:sysClr val="window" lastClr="FFFFFF"/>
+      </a:lt1>
+      <a:dk2>
+        <a:srgbClr val="44546A"/>
+      </a:dk2>
+      <a:lt2>
+        <a:srgbClr val="E7E6E6"/>
+      </a:lt2>
+      <a:accent1>
+        <a:srgbClr val="4472C4"/>
+      </a:accent1>
+      <a:accent2>
+        <a:srgbClr val="ED7D31"/>
+      </a:accent2>
+      <a:accent3>
+        <a:srgbClr val="A5A5A5"/>
+      </a:accent3>
+      <a:accent4>
+        <a:srgbClr val="FFC000"/>
+      </a:accent4>
+      <a:accent5>
+        <a:srgbClr val="5B9BD5"/>
+      </a:accent5>
+      <a:accent6>
+        <a:srgbClr val="70AD47"/>
+      </a:accent6>
+      <a:hlink>
+        <a:srgbClr val="0563C1"/>
+      </a:hlink>
+      <a:folHlink>
+        <a:srgbClr val="954F72"/>
+      </a:folHlink>
+    </a:clrScheme>
+    <a:fontScheme name="Office">
+      <a:majorFont>
+        <a:latin typeface="Calibri Light" panose="020F0302020204030204"/>
+        <a:ea typeface=""/>
+        <a:cs typeface=""/>
+        <a:font script="Jpan" typeface="游ゴシック Light"/>
+        <a:font script="Hang" typeface="맑은 고딕"/>
+        <a:font script="Hans" typeface="等线 Light"/>
+        <a:font script="Hant" typeface="新細明體"/>
+        <a:font script="Arab" typeface="Times New Roman"/>
+        <a:font script="Hebr" typeface="Times New Roman"/>
+        <a:font script="Thai" typeface="Angsana New"/>
+        <a:font script="Ethi" typeface="Nyala"/>
+        <a:font script="Beng" typeface="Vrinda"/>
+        <a:font script="Gujr" typeface="Shruti"/>
+        <a:font script="Khmr" typeface="MoolBoran"/>
+        <a:font script="Knda" typeface="Tunga"/>
+        <a:font script="Guru" typeface="Raavi"/>
+        <a:font script="Cans" typeface="Euphemia"/>
+        <a:font script="Cher" typeface="Plantagenet Cherokee"/>
+        <a:font script="Yiii" typeface="Microsoft Yi Baiti"/>
+        <a:font script="Tibt" typeface="Microsoft Himalaya"/>
+        <a:font script="Thaa" typeface="MV Boli"/>
+        <a:font script="Deva" typeface="Mangal"/>
+        <a:font script="Telu" typeface="Gautami"/>
+        <a:font script="Taml" typeface="Latha"/>
+        <a:font script="Syrc" typeface="Estrangelo Edessa"/>
+        <a:font script="Orya" typeface="Kalinga"/>
+        <a:font script="Mlym" typeface="Kartika"/>
+        <a:font script="Laoo" typeface="DokChampa"/>
+        <a:font script="Sinh" typeface="Iskoola Pota"/>
+        <a:font script="Mong" typeface="Mongolian Baiti"/>
+        <a:font script="Viet" typeface="Times New Roman"/>
+        <a:font script="Uigh" typeface="Microsoft Uighur"/>
+        <a:font script="Geor" typeface="Sylfaen"/>
+        <a:font script="Armn" typeface="Arial"/>
+        <a:font script="Bugi" typeface="Leelawadee UI"/>
+        <a:font script="Bopo" typeface="Microsoft JhengHei"/>
+        <a:font script="Java" typeface="Javanese Text"/>
+        <a:font script="Lisu" typeface="Segoe UI"/>
+        <a:font script="Mymr" typeface="Myanmar Text"/>
+        <a:font script="Nkoo" typeface="Ebrima"/>
+        <a:font script="Olck" typeface="Nirmala UI"/>
+        <a:font script="Osma" typeface="Ebrima"/>
+        <a:font script="Phag" typeface="Phagspa"/>
+        <a:font script="Syrn" typeface="Estrangelo Edessa"/>
+        <a:font script="Syrj" typeface="Estrangelo Edessa"/>
+        <a:font script="Syre" typeface="Estrangelo Edessa"/>
+        <a:font script="Sora" typeface="Nirmala UI"/>
+        <a:font script="Tale" typeface="Microsoft Tai Le"/>
+        <a:font script="Talu" typeface="Microsoft New Tai Lue"/>
+        <a:font script="Tfng" typeface="Ebrima"/>
+      </a:majorFont>
+      <a:minorFont>
+        <a:latin typeface="Calibri" panose="020F0502020204030204"/>
+        <a:ea typeface=""/>
+        <a:cs typeface=""/>
+        <a:font script="Jpan" typeface="游ゴシック"/>
+        <a:font script="Hang" typeface="맑은 고딕"/>
+        <a:font script="Hans" typeface="等线"/>
+        <a:font script="Hant" typeface="新細明體"/>
+        <a:font script="Arab" typeface="Arial"/>
+        <a:font script="Hebr" typeface="Arial"/>
+        <a:font script="Thai" typeface="Cordia New"/>
+        <a:font script="Ethi" typeface="Nyala"/>
+        <a:font script="Beng" typeface="Vrinda"/>
+        <a:font script="Gujr" typeface="Shruti"/>
+        <a:font script="Khmr" typeface="DaunPenh"/>
+        <a:font script="Knda" typeface="Tunga"/>
+        <a:font script="Guru" typeface="Raavi"/>
+        <a:font script="Cans" typeface="Euphemia"/>
+        <a:font script="Cher" typeface="Plantagenet Cherokee"/>
+        <a:font script="Yiii" typeface="Microsoft Yi Baiti"/>
+        <a:font script="Tibt" typeface="Microsoft Himalaya"/>
+        <a:font script="Thaa" typeface="MV Boli"/>
+        <a:font script="Deva" typeface="Mangal"/>
+        <a:font script="Telu" typeface="Gautami"/>
+        <a:font script="Taml" typeface="Latha"/>
+        <a:font script="Syrc" typeface="Estrangelo Edessa"/>
+        <a:font script="Orya" typeface="Kalinga"/>
+        <a:font script="Mlym" typeface="Kartika"/>
+        <a:font script="Laoo" typeface="DokChampa"/>
+        <a:font script="Sinh" typeface="Iskoola Pota"/>
+        <a:font script="Mong" typeface="Mongolian Baiti"/>
+        <a:font script="Viet" typeface="Arial"/>
+        <a:font script="Uigh" typeface="Microsoft Uighur"/>
+        <a:font script="Geor" typeface="Sylfaen"/>
+        <a:font script="Armn" typeface="Arial"/>
+        <a:font script="Bugi" typeface="Leelawadee UI"/>
+        <a:font script="Bopo" typeface="Microsoft JhengHei"/>
+        <a:font script="Java" typeface="Javanese Text"/>
+        <a:font script="Lisu" typeface="Segoe UI"/>
+        <a:font script="Mymr" typeface="Myanmar Text"/>
+        <a:font script="Nkoo" typeface="Ebrima"/>
+        <a:font script="Olck" typeface="Nirmala UI"/>
+        <a:font script="Osma" typeface="Ebrima"/>
+        <a:font script="Phag" typeface="Phagspa"/>
+        <a:font script="Syrn" typeface="Estrangelo Edessa"/>
+        <a:font script="Syrj" typeface="Estrangelo Edessa"/>
+        <a:font script="Syre" typeface="Estrangelo Edessa"/>
+        <a:font script="Sora" typeface="Nirmala UI"/>
+        <a:font script="Tale" typeface="Microsoft Tai Le"/>
+        <a:font script="Talu" typeface="Microsoft New Tai Lue"/>
+        <a:font script="Tfng" typeface="Ebrima"/>
+      </a:minorFont>
+    </a:fontScheme>
+    <a:fmtScheme name="Office">
+      <a:fillStyleLst>
+        <a:solidFill>
+          <a:schemeClr val="phClr"/>
+        </a:solidFill>
+        <a:gradFill rotWithShape="1">
+          <a:gsLst>
+            <a:gs pos="0">
+              <a:schemeClr val="phClr">
+                <a:lumMod val="110000"/>
+                <a:satMod val="105000"/>
+                <a:tint val="67000"/>
+              </a:schemeClr>
+            </a:gs>
+            <a:gs pos="50000">
+              <a:schemeClr val="phClr">
+                <a:lumMod val="105000"/>
+                <a:satMod val="103000"/>
+                <a:tint val="73000"/>
+              </a:schemeClr>
+            </a:gs>
+            <a:gs pos="100000">
+              <a:schemeClr val="phClr">
+                <a:lumMod val="105000"/>
+                <a:satMod val="109000"/>
+                <a:tint val="81000"/>
+              </a:schemeClr>
+            </a:gs>
+          </a:gsLst>
+          <a:lin ang="5400000" scaled="0"/>
+        </a:gradFill>
+        <a:gradFill rotWithShape="1">
+          <a:gsLst>
+            <a:gs pos="0">
+              <a:schemeClr val="phClr">
+                <a:satMod val="103000"/>
+                <a:lumMod val="102000"/>
+                <a:tint val="94000"/>
+              </a:schemeClr>
+            </a:gs>
+            <a:gs pos="50000">
+              <a:schemeClr val="phClr">
+                <a:satMod val="110000"/>
+                <a:lumMod val="100000"/>
+                <a:shade val="100000"/>
+              </a:schemeClr>
+            </a:gs>
+            <a:gs pos="100000">
+              <a:schemeClr val="phClr">
+                <a:lumMod val="99000"/>
+                <a:satMod val="120000"/>
+                <a:shade val="78000"/>
+              </a:schemeClr>
+            </a:gs>
+          </a:gsLst>
+          <a:lin ang="5400000" scaled="0"/>
+        </a:gradFill>
+      </a:fillStyleLst>
+      <a:lnStyleLst>
+        <a:ln w="6350" cap="flat" cmpd="sng" algn="ctr">
+          <a:solidFill>
+            <a:schemeClr val="phClr"/>
+          </a:solidFill>
+          <a:prstDash val="solid"/>
+          <a:miter lim="800000"/>
+        </a:ln>
+        <a:ln w="12700" cap="flat" cmpd="sng" algn="ctr">
+          <a:solidFill>
+            <a:schemeClr val="phClr"/>
+          </a:solidFill>
+          <a:prstDash val="solid"/>
+          <a:miter lim="800000"/>
+        </a:ln>
+        <a:ln w="19050" cap="flat" cmpd="sng" algn="ctr">
+          <a:solidFill>
+            <a:schemeClr val="phClr"/>
+          </a:solidFill>
+          <a:prstDash val="solid"/>
+          <a:miter lim="800000"/>
+        </a:ln>
+      </a:lnStyleLst>
+      <a:effectStyleLst>
+        <a:effectStyle>
+          <a:effectLst/>
+        </a:effectStyle>
+        <a:effectStyle>
+          <a:effectLst/>
+        </a:effectStyle>
+        <a:effectStyle>
+          <a:effectLst>
+            <a:outerShdw blurRad="57150" dist="19050" dir="5400000" algn="ctr" rotWithShape="0">
+              <a:srgbClr val="000000">
+                <a:alpha val="63000"/>
+              </a:srgbClr>
+            </a:outerShdw>
+          </a:effectLst>
+        </a:effectStyle>
+      </a:effectStyleLst>
+      <a:bgFillStyleLst>
+        <a:solidFill>
+          <a:schemeClr val="phClr"/>
+        </a:solidFill>
+        <a:solidFill>
+          <a:schemeClr val="phClr">
+            <a:tint val="95000"/>
+            <a:satMod val="170000"/>
+          </a:schemeClr>
+        </a:solidFill>
+        <a:gradFill rotWithShape="1">
+          <a:gsLst>
+            <a:gs pos="0">
+              <a:schemeClr val="phClr">
+                <a:tint val="93000"/>
+                <a:satMod val="150000"/>
+                <a:shade val="98000"/>
+                <a:lumMod val="102000"/>
+              </a:schemeClr>
+            </a:gs>
+            <a:gs pos="50000">
+              <a:schemeClr val="phClr">
+                <a:tint val="98000"/>
+                <a:satMod val="130000"/>
+                <a:shade val="90000"/>
+                <a:lumMod val="103000"/>
+              </a:schemeClr>
+            </a:gs>
+            <a:gs pos="100000">
+              <a:schemeClr val="phClr">
+                <a:shade val="63000"/>
+                <a:satMod val="120000"/>
+              </a:schemeClr>
+            </a:gs>
+          </a:gsLst>
+          <a:lin ang="5400000" scaled="0"/>
+        </a:gradFill>
+      </a:bgFillStyleLst>
+    </a:fmtScheme>
+  </a:themeElements>
+  <a:objectDefaults/>
+  <a:extraClrSchemeLst/>
+  <a:extLst>
+    <a:ext uri="{05A4C25C-085E-4340-85A3-A5531E510DB2}">
+      <thm15:themeFamily xmlns:thm15="http://schemas.microsoft.com/office/thememl/2012/main" name="Office Theme" id="{62F939B6-93AF-4DB8-9C6B-D6C7DFDC589F}" vid="{4A3C46E8-61CC-4603-A589-7422A47A8E4A}"/>
     </a:ext>
   </a:extLst>
 </a:theme>

</xml_diff>

<commit_message>
added link in Impact slide
</commit_message>
<xml_diff>
--- a/docs/Presentations/Computer Vision Driving Aids Project Overview.pptx
+++ b/docs/Presentations/Computer Vision Driving Aids Project Overview.pptx
@@ -258,7 +258,7 @@
           <a:p>
             <a:fld id="{28882E47-54AA-4A5F-AB75-03E44D1874A1}" type="datetimeFigureOut">
               <a:rPr lang="en-US" smtClean="0"/>
-              <a:t>9/2/2018</a:t>
+              <a:t>9/4/2018</a:t>
             </a:fld>
             <a:endParaRPr lang="en-US"/>
           </a:p>
@@ -6024,7 +6024,7 @@
           <a:p>
             <a:fld id="{48A87A34-81AB-432B-8DAE-1953F412C126}" type="datetimeFigureOut">
               <a:rPr lang="en-US" dirty="0"/>
-              <a:t>9/2/2018</a:t>
+              <a:t>9/4/2018</a:t>
             </a:fld>
             <a:endParaRPr lang="en-US" dirty="0"/>
           </a:p>
@@ -6285,7 +6285,7 @@
           <a:p>
             <a:fld id="{48A87A34-81AB-432B-8DAE-1953F412C126}" type="datetimeFigureOut">
               <a:rPr lang="en-US" dirty="0"/>
-              <a:t>9/2/2018</a:t>
+              <a:t>9/4/2018</a:t>
             </a:fld>
             <a:endParaRPr lang="en-US" dirty="0"/>
           </a:p>
@@ -6476,7 +6476,7 @@
           <a:p>
             <a:fld id="{48A87A34-81AB-432B-8DAE-1953F412C126}" type="datetimeFigureOut">
               <a:rPr lang="en-US" dirty="0"/>
-              <a:t>9/2/2018</a:t>
+              <a:t>9/4/2018</a:t>
             </a:fld>
             <a:endParaRPr lang="en-US" dirty="0"/>
           </a:p>
@@ -6734,7 +6734,7 @@
           <a:p>
             <a:fld id="{48A87A34-81AB-432B-8DAE-1953F412C126}" type="datetimeFigureOut">
               <a:rPr lang="en-US" dirty="0"/>
-              <a:t>9/2/2018</a:t>
+              <a:t>9/4/2018</a:t>
             </a:fld>
             <a:endParaRPr lang="en-US" dirty="0"/>
           </a:p>
@@ -7163,7 +7163,7 @@
           <a:p>
             <a:fld id="{48A87A34-81AB-432B-8DAE-1953F412C126}" type="datetimeFigureOut">
               <a:rPr lang="en-US" dirty="0"/>
-              <a:t>9/2/2018</a:t>
+              <a:t>9/4/2018</a:t>
             </a:fld>
             <a:endParaRPr lang="en-US" dirty="0"/>
           </a:p>
@@ -7704,7 +7704,7 @@
           <a:p>
             <a:fld id="{48A87A34-81AB-432B-8DAE-1953F412C126}" type="datetimeFigureOut">
               <a:rPr lang="en-US" dirty="0"/>
-              <a:t>9/2/2018</a:t>
+              <a:t>9/4/2018</a:t>
             </a:fld>
             <a:endParaRPr lang="en-US" dirty="0"/>
           </a:p>
@@ -8416,7 +8416,7 @@
           <a:p>
             <a:fld id="{48A87A34-81AB-432B-8DAE-1953F412C126}" type="datetimeFigureOut">
               <a:rPr lang="en-US" dirty="0"/>
-              <a:t>9/2/2018</a:t>
+              <a:t>9/4/2018</a:t>
             </a:fld>
             <a:endParaRPr lang="en-US" dirty="0"/>
           </a:p>
@@ -8581,7 +8581,7 @@
           <a:p>
             <a:fld id="{48A87A34-81AB-432B-8DAE-1953F412C126}" type="datetimeFigureOut">
               <a:rPr lang="en-US" dirty="0"/>
-              <a:t>9/2/2018</a:t>
+              <a:t>9/4/2018</a:t>
             </a:fld>
             <a:endParaRPr lang="en-US" dirty="0"/>
           </a:p>
@@ -8756,7 +8756,7 @@
           <a:p>
             <a:fld id="{48A87A34-81AB-432B-8DAE-1953F412C126}" type="datetimeFigureOut">
               <a:rPr lang="en-US" dirty="0"/>
-              <a:t>9/2/2018</a:t>
+              <a:t>9/4/2018</a:t>
             </a:fld>
             <a:endParaRPr lang="en-US" dirty="0"/>
           </a:p>
@@ -8921,7 +8921,7 @@
           <a:p>
             <a:fld id="{48A87A34-81AB-432B-8DAE-1953F412C126}" type="datetimeFigureOut">
               <a:rPr lang="en-US" dirty="0"/>
-              <a:t>9/2/2018</a:t>
+              <a:t>9/4/2018</a:t>
             </a:fld>
             <a:endParaRPr lang="en-US" dirty="0"/>
           </a:p>
@@ -9166,7 +9166,7 @@
           <a:p>
             <a:fld id="{48A87A34-81AB-432B-8DAE-1953F412C126}" type="datetimeFigureOut">
               <a:rPr lang="en-US" dirty="0"/>
-              <a:t>9/2/2018</a:t>
+              <a:t>9/4/2018</a:t>
             </a:fld>
             <a:endParaRPr lang="en-US" dirty="0"/>
           </a:p>
@@ -9393,7 +9393,7 @@
           <a:p>
             <a:fld id="{48A87A34-81AB-432B-8DAE-1953F412C126}" type="datetimeFigureOut">
               <a:rPr lang="en-US" dirty="0"/>
-              <a:t>9/2/2018</a:t>
+              <a:t>9/4/2018</a:t>
             </a:fld>
             <a:endParaRPr lang="en-US" dirty="0"/>
           </a:p>
@@ -9769,7 +9769,7 @@
           <a:p>
             <a:fld id="{48A87A34-81AB-432B-8DAE-1953F412C126}" type="datetimeFigureOut">
               <a:rPr lang="en-US" dirty="0"/>
-              <a:t>9/2/2018</a:t>
+              <a:t>9/4/2018</a:t>
             </a:fld>
             <a:endParaRPr lang="en-US" dirty="0"/>
           </a:p>
@@ -9882,7 +9882,7 @@
           <a:p>
             <a:fld id="{48A87A34-81AB-432B-8DAE-1953F412C126}" type="datetimeFigureOut">
               <a:rPr lang="en-US" dirty="0"/>
-              <a:t>9/2/2018</a:t>
+              <a:t>9/4/2018</a:t>
             </a:fld>
             <a:endParaRPr lang="en-US" dirty="0"/>
           </a:p>
@@ -9972,7 +9972,7 @@
           <a:p>
             <a:fld id="{48A87A34-81AB-432B-8DAE-1953F412C126}" type="datetimeFigureOut">
               <a:rPr lang="en-US" dirty="0"/>
-              <a:t>9/2/2018</a:t>
+              <a:t>9/4/2018</a:t>
             </a:fld>
             <a:endParaRPr lang="en-US" dirty="0"/>
           </a:p>
@@ -10216,7 +10216,7 @@
           <a:p>
             <a:fld id="{48A87A34-81AB-432B-8DAE-1953F412C126}" type="datetimeFigureOut">
               <a:rPr lang="en-US" dirty="0"/>
-              <a:t>9/2/2018</a:t>
+              <a:t>9/4/2018</a:t>
             </a:fld>
             <a:endParaRPr lang="en-US" dirty="0"/>
           </a:p>
@@ -10490,7 +10490,7 @@
           <a:p>
             <a:fld id="{48A87A34-81AB-432B-8DAE-1953F412C126}" type="datetimeFigureOut">
               <a:rPr lang="en-US" dirty="0"/>
-              <a:t>9/2/2018</a:t>
+              <a:t>9/4/2018</a:t>
             </a:fld>
             <a:endParaRPr lang="en-US" dirty="0"/>
           </a:p>
@@ -13563,7 +13563,7 @@
             <a:fld id="{48A87A34-81AB-432B-8DAE-1953F412C126}" type="datetimeFigureOut">
               <a:rPr lang="en-US" dirty="0"/>
               <a:pPr/>
-              <a:t>9/2/2018</a:t>
+              <a:t>9/4/2018</a:t>
             </a:fld>
             <a:endParaRPr lang="en-US" dirty="0"/>
           </a:p>
@@ -14288,6 +14288,18 @@
               <a:rPr lang="en-US" dirty="0"/>
               <a:t>A lane departure fatality occurs every 21 minutes. Total nationwide fatalities in 2006 were 25,082 which is 58% of total crash fatalities.</a:t>
             </a:r>
+          </a:p>
+          <a:p>
+            <a:pPr marL="457200" lvl="1" indent="0" fontAlgn="base">
+              <a:buNone/>
+            </a:pPr>
+            <a:r>
+              <a:rPr lang="en-US" sz="1300" dirty="0">
+                <a:hlinkClick r:id="rId3"/>
+              </a:rPr>
+              <a:t>https://www.crab.wa.gov/LibraryData/RESEARCH_and_REFERENCE_MATERIAL/County_Road_Safety/080401AASHTOLaneDepartureCrashes.pdf</a:t>
+            </a:r>
+            <a:endParaRPr lang="en-US" sz="1300" dirty="0"/>
           </a:p>
           <a:p>
             <a:pPr fontAlgn="base"/>

</xml_diff>